<commit_message>
Bugs fixed. Pre-release ready.
</commit_message>
<xml_diff>
--- a/docs/images/SchematicFigures.pptx
+++ b/docs/images/SchematicFigures.pptx
@@ -13996,10 +13996,10 @@
       </p:grpSpPr>
       <p:grpSp>
         <p:nvGrpSpPr>
-          <p:cNvPr id="15" name="Group 14">
+          <p:cNvPr id="199" name="Group 198">
             <a:extLst>
               <a:ext uri="{FF2B5EF4-FFF2-40B4-BE49-F238E27FC236}">
-                <a16:creationId xmlns:a16="http://schemas.microsoft.com/office/drawing/2014/main" id="{8E6042B5-2C2B-A733-D2D2-17E1B62B7C7E}"/>
+                <a16:creationId xmlns:a16="http://schemas.microsoft.com/office/drawing/2014/main" id="{A5C31640-0B47-D38D-6FD2-53529011BF8D}"/>
               </a:ext>
             </a:extLst>
           </p:cNvPr>
@@ -14008,18 +14008,70 @@
         </p:nvGrpSpPr>
         <p:grpSpPr>
           <a:xfrm>
-            <a:off x="457200" y="380026"/>
-            <a:ext cx="15967999" cy="13658605"/>
-            <a:chOff x="457200" y="380026"/>
-            <a:chExt cx="15967999" cy="13658605"/>
+            <a:off x="316993" y="315315"/>
+            <a:ext cx="15653476" cy="14173195"/>
+            <a:chOff x="316993" y="315315"/>
+            <a:chExt cx="15653476" cy="14173195"/>
           </a:xfrm>
         </p:grpSpPr>
+        <p:sp>
+          <p:nvSpPr>
+            <p:cNvPr id="8" name="Rectangle 7">
+              <a:extLst>
+                <a:ext uri="{FF2B5EF4-FFF2-40B4-BE49-F238E27FC236}">
+                  <a16:creationId xmlns:a16="http://schemas.microsoft.com/office/drawing/2014/main" id="{044AA52B-C464-1524-B063-283DE254853B}"/>
+                </a:ext>
+              </a:extLst>
+            </p:cNvPr>
+            <p:cNvSpPr/>
+            <p:nvPr/>
+          </p:nvSpPr>
+          <p:spPr>
+            <a:xfrm>
+              <a:off x="316993" y="315315"/>
+              <a:ext cx="15653476" cy="14173195"/>
+            </a:xfrm>
+            <a:prstGeom prst="rect">
+              <a:avLst/>
+            </a:prstGeom>
+            <a:solidFill>
+              <a:schemeClr val="bg1"/>
+            </a:solidFill>
+            <a:ln>
+              <a:noFill/>
+            </a:ln>
+          </p:spPr>
+          <p:style>
+            <a:lnRef idx="2">
+              <a:schemeClr val="accent1">
+                <a:shade val="15000"/>
+              </a:schemeClr>
+            </a:lnRef>
+            <a:fillRef idx="1">
+              <a:schemeClr val="accent1"/>
+            </a:fillRef>
+            <a:effectRef idx="0">
+              <a:schemeClr val="accent1"/>
+            </a:effectRef>
+            <a:fontRef idx="minor">
+              <a:schemeClr val="lt1"/>
+            </a:fontRef>
+          </p:style>
+          <p:txBody>
+            <a:bodyPr rtlCol="0" anchor="ctr"/>
+            <a:lstStyle/>
+            <a:p>
+              <a:pPr algn="ctr"/>
+              <a:endParaRPr lang="en-US"/>
+            </a:p>
+          </p:txBody>
+        </p:sp>
         <p:grpSp>
           <p:nvGrpSpPr>
-            <p:cNvPr id="9" name="Group 8">
+            <p:cNvPr id="196" name="Group 195">
               <a:extLst>
                 <a:ext uri="{FF2B5EF4-FFF2-40B4-BE49-F238E27FC236}">
-                  <a16:creationId xmlns:a16="http://schemas.microsoft.com/office/drawing/2014/main" id="{DFDC1C7E-6935-77EB-F761-2F9944C519B0}"/>
+                  <a16:creationId xmlns:a16="http://schemas.microsoft.com/office/drawing/2014/main" id="{B828AA75-CD65-7FC0-1660-4779D2310F9C}"/>
                 </a:ext>
               </a:extLst>
             </p:cNvPr>
@@ -14028,18 +14080,156 @@
           </p:nvGrpSpPr>
           <p:grpSpPr>
             <a:xfrm>
-              <a:off x="457200" y="380026"/>
-              <a:ext cx="15967999" cy="13658605"/>
-              <a:chOff x="457200" y="380026"/>
-              <a:chExt cx="15967999" cy="13658605"/>
+              <a:off x="522733" y="509603"/>
+              <a:ext cx="15131465" cy="12861111"/>
+              <a:chOff x="522733" y="194288"/>
+              <a:chExt cx="15131465" cy="12861111"/>
             </a:xfrm>
           </p:grpSpPr>
+          <p:pic>
+            <p:nvPicPr>
+              <p:cNvPr id="7" name="Picture 6">
+                <a:extLst>
+                  <a:ext uri="{FF2B5EF4-FFF2-40B4-BE49-F238E27FC236}">
+                    <a16:creationId xmlns:a16="http://schemas.microsoft.com/office/drawing/2014/main" id="{78C9D4C3-C4D6-028D-E12E-6CDD382D163C}"/>
+                  </a:ext>
+                </a:extLst>
+              </p:cNvPr>
+              <p:cNvPicPr>
+                <a:picLocks noChangeAspect="1"/>
+              </p:cNvPicPr>
+              <p:nvPr/>
+            </p:nvPicPr>
+            <p:blipFill rotWithShape="1">
+              <a:blip r:embed="rId3"/>
+              <a:srcRect l="10161" r="38058"/>
+              <a:stretch/>
+            </p:blipFill>
+            <p:spPr>
+              <a:xfrm>
+                <a:off x="12556426" y="3964794"/>
+                <a:ext cx="3097772" cy="5982520"/>
+              </a:xfrm>
+              <a:prstGeom prst="rect">
+                <a:avLst/>
+              </a:prstGeom>
+            </p:spPr>
+          </p:pic>
+          <p:pic>
+            <p:nvPicPr>
+              <p:cNvPr id="197" name="Google Shape;197;p24"/>
+              <p:cNvPicPr preferRelativeResize="0"/>
+              <p:nvPr/>
+            </p:nvPicPr>
+            <p:blipFill>
+              <a:blip r:embed="rId4">
+                <a:alphaModFix/>
+              </a:blip>
+              <a:stretch>
+                <a:fillRect/>
+              </a:stretch>
+            </p:blipFill>
+            <p:spPr>
+              <a:xfrm>
+                <a:off x="522733" y="194288"/>
+                <a:ext cx="11499204" cy="10591348"/>
+              </a:xfrm>
+              <a:prstGeom prst="rect">
+                <a:avLst/>
+              </a:prstGeom>
+              <a:noFill/>
+              <a:ln>
+                <a:noFill/>
+                <a:prstDash val="sysDot"/>
+              </a:ln>
+            </p:spPr>
+          </p:pic>
           <p:sp>
             <p:nvSpPr>
-              <p:cNvPr id="8" name="Rectangle 7">
+              <p:cNvPr id="198" name="Google Shape;198;p24"/>
+              <p:cNvSpPr txBox="1"/>
+              <p:nvPr/>
+            </p:nvSpPr>
+            <p:spPr>
+              <a:xfrm>
+                <a:off x="4570865" y="10389711"/>
+                <a:ext cx="1420511" cy="677078"/>
+              </a:xfrm>
+              <a:prstGeom prst="rect">
+                <a:avLst/>
+              </a:prstGeom>
+              <a:noFill/>
+              <a:ln>
+                <a:noFill/>
+                <a:prstDash val="sysDot"/>
+              </a:ln>
+            </p:spPr>
+            <p:txBody>
+              <a:bodyPr spcFirstLastPara="1" wrap="square" lIns="91425" tIns="91425" rIns="91425" bIns="91425" anchor="t" anchorCtr="0">
+                <a:spAutoFit/>
+              </a:bodyPr>
+              <a:lstStyle/>
+              <a:p>
+                <a:pPr algn="ctr"/>
+                <a:r>
+                  <a:rPr lang="en" sz="3200" b="1" dirty="0">
+                    <a:solidFill>
+                      <a:srgbClr val="DAC000"/>
+                    </a:solidFill>
+                    <a:latin typeface="Comfortaa"/>
+                    <a:ea typeface="Comfortaa"/>
+                    <a:cs typeface="Comfortaa"/>
+                    <a:sym typeface="Comfortaa"/>
+                  </a:rPr>
+                  <a:t>Port2</a:t>
+                </a:r>
+                <a:endParaRPr sz="3200" b="1" dirty="0">
+                  <a:solidFill>
+                    <a:srgbClr val="DAC000"/>
+                  </a:solidFill>
+                  <a:latin typeface="Comfortaa"/>
+                  <a:ea typeface="Comfortaa"/>
+                  <a:cs typeface="Comfortaa"/>
+                  <a:sym typeface="Comfortaa"/>
+                </a:endParaRPr>
+              </a:p>
+            </p:txBody>
+          </p:sp>
+          <p:pic>
+            <p:nvPicPr>
+              <p:cNvPr id="22" name="Picture 21">
                 <a:extLst>
                   <a:ext uri="{FF2B5EF4-FFF2-40B4-BE49-F238E27FC236}">
-                    <a16:creationId xmlns:a16="http://schemas.microsoft.com/office/drawing/2014/main" id="{044AA52B-C464-1524-B063-283DE254853B}"/>
+                    <a16:creationId xmlns:a16="http://schemas.microsoft.com/office/drawing/2014/main" id="{5ABC6090-6E77-44DA-2E3E-6DAF471FA58D}"/>
+                  </a:ext>
+                </a:extLst>
+              </p:cNvPr>
+              <p:cNvPicPr>
+                <a:picLocks noChangeAspect="1"/>
+              </p:cNvPicPr>
+              <p:nvPr/>
+            </p:nvPicPr>
+            <p:blipFill rotWithShape="1">
+              <a:blip r:embed="rId5"/>
+              <a:srcRect l="12808" r="52093" b="27587"/>
+              <a:stretch/>
+            </p:blipFill>
+            <p:spPr>
+              <a:xfrm>
+                <a:off x="6149485" y="10563612"/>
+                <a:ext cx="1713049" cy="2491787"/>
+              </a:xfrm>
+              <a:prstGeom prst="rect">
+                <a:avLst/>
+              </a:prstGeom>
+            </p:spPr>
+          </p:pic>
+          <p:sp>
+            <p:nvSpPr>
+              <p:cNvPr id="23" name="Oval 22">
+                <a:extLst>
+                  <a:ext uri="{FF2B5EF4-FFF2-40B4-BE49-F238E27FC236}">
+                    <a16:creationId xmlns:a16="http://schemas.microsoft.com/office/drawing/2014/main" id="{8BCCEE3C-DBBD-D34D-CA54-96C4150B50AD}"/>
                   </a:ext>
                 </a:extLst>
               </p:cNvPr>
@@ -14048,10 +14238,604 @@
             </p:nvSpPr>
             <p:spPr>
               <a:xfrm>
-                <a:off x="457200" y="380026"/>
-                <a:ext cx="15967999" cy="13658605"/>
+                <a:off x="6472192" y="12952823"/>
+                <a:ext cx="89012" cy="89012"/>
               </a:xfrm>
-              <a:prstGeom prst="rect">
+              <a:prstGeom prst="ellipse">
+                <a:avLst/>
+              </a:prstGeom>
+              <a:noFill/>
+              <a:ln>
+                <a:noFill/>
+              </a:ln>
+            </p:spPr>
+            <p:style>
+              <a:lnRef idx="2">
+                <a:schemeClr val="accent1">
+                  <a:shade val="15000"/>
+                </a:schemeClr>
+              </a:lnRef>
+              <a:fillRef idx="1">
+                <a:schemeClr val="accent1"/>
+              </a:fillRef>
+              <a:effectRef idx="0">
+                <a:schemeClr val="accent1"/>
+              </a:effectRef>
+              <a:fontRef idx="minor">
+                <a:schemeClr val="lt1"/>
+              </a:fontRef>
+            </p:style>
+            <p:txBody>
+              <a:bodyPr rtlCol="0" anchor="ctr"/>
+              <a:lstStyle/>
+              <a:p>
+                <a:pPr algn="ctr"/>
+                <a:endParaRPr lang="en-US"/>
+              </a:p>
+            </p:txBody>
+          </p:sp>
+          <p:sp>
+            <p:nvSpPr>
+              <p:cNvPr id="24" name="Oval 23">
+                <a:extLst>
+                  <a:ext uri="{FF2B5EF4-FFF2-40B4-BE49-F238E27FC236}">
+                    <a16:creationId xmlns:a16="http://schemas.microsoft.com/office/drawing/2014/main" id="{23A6A2B2-43B0-0C24-FB22-C6ABC51DF95A}"/>
+                  </a:ext>
+                </a:extLst>
+              </p:cNvPr>
+              <p:cNvSpPr/>
+              <p:nvPr/>
+            </p:nvSpPr>
+            <p:spPr>
+              <a:xfrm>
+                <a:off x="6596505" y="12952823"/>
+                <a:ext cx="89012" cy="89012"/>
+              </a:xfrm>
+              <a:prstGeom prst="ellipse">
+                <a:avLst/>
+              </a:prstGeom>
+              <a:noFill/>
+              <a:ln>
+                <a:noFill/>
+              </a:ln>
+            </p:spPr>
+            <p:style>
+              <a:lnRef idx="2">
+                <a:schemeClr val="accent1">
+                  <a:shade val="15000"/>
+                </a:schemeClr>
+              </a:lnRef>
+              <a:fillRef idx="1">
+                <a:schemeClr val="accent1"/>
+              </a:fillRef>
+              <a:effectRef idx="0">
+                <a:schemeClr val="accent1"/>
+              </a:effectRef>
+              <a:fontRef idx="minor">
+                <a:schemeClr val="lt1"/>
+              </a:fontRef>
+            </p:style>
+            <p:txBody>
+              <a:bodyPr rtlCol="0" anchor="ctr"/>
+              <a:lstStyle/>
+              <a:p>
+                <a:pPr algn="ctr"/>
+                <a:endParaRPr lang="en-US"/>
+              </a:p>
+            </p:txBody>
+          </p:sp>
+          <p:sp>
+            <p:nvSpPr>
+              <p:cNvPr id="25" name="Oval 24">
+                <a:extLst>
+                  <a:ext uri="{FF2B5EF4-FFF2-40B4-BE49-F238E27FC236}">
+                    <a16:creationId xmlns:a16="http://schemas.microsoft.com/office/drawing/2014/main" id="{3D8973B0-0201-BF68-5C40-573D629D0465}"/>
+                  </a:ext>
+                </a:extLst>
+              </p:cNvPr>
+              <p:cNvSpPr/>
+              <p:nvPr/>
+            </p:nvSpPr>
+            <p:spPr>
+              <a:xfrm>
+                <a:off x="6878534" y="12952823"/>
+                <a:ext cx="89012" cy="89012"/>
+              </a:xfrm>
+              <a:prstGeom prst="ellipse">
+                <a:avLst/>
+              </a:prstGeom>
+              <a:noFill/>
+              <a:ln>
+                <a:noFill/>
+              </a:ln>
+            </p:spPr>
+            <p:style>
+              <a:lnRef idx="2">
+                <a:schemeClr val="accent1">
+                  <a:shade val="15000"/>
+                </a:schemeClr>
+              </a:lnRef>
+              <a:fillRef idx="1">
+                <a:schemeClr val="accent1"/>
+              </a:fillRef>
+              <a:effectRef idx="0">
+                <a:schemeClr val="accent1"/>
+              </a:effectRef>
+              <a:fontRef idx="minor">
+                <a:schemeClr val="lt1"/>
+              </a:fontRef>
+            </p:style>
+            <p:txBody>
+              <a:bodyPr rtlCol="0" anchor="ctr"/>
+              <a:lstStyle/>
+              <a:p>
+                <a:pPr algn="ctr"/>
+                <a:endParaRPr lang="en-US"/>
+              </a:p>
+            </p:txBody>
+          </p:sp>
+          <p:sp>
+            <p:nvSpPr>
+              <p:cNvPr id="26" name="Oval 25">
+                <a:extLst>
+                  <a:ext uri="{FF2B5EF4-FFF2-40B4-BE49-F238E27FC236}">
+                    <a16:creationId xmlns:a16="http://schemas.microsoft.com/office/drawing/2014/main" id="{6A6366A5-C9A2-190E-83AB-1F22ED6F1FD5}"/>
+                  </a:ext>
+                </a:extLst>
+              </p:cNvPr>
+              <p:cNvSpPr/>
+              <p:nvPr/>
+            </p:nvSpPr>
+            <p:spPr>
+              <a:xfrm>
+                <a:off x="7001072" y="12952823"/>
+                <a:ext cx="89012" cy="89012"/>
+              </a:xfrm>
+              <a:prstGeom prst="ellipse">
+                <a:avLst/>
+              </a:prstGeom>
+              <a:noFill/>
+              <a:ln>
+                <a:noFill/>
+              </a:ln>
+            </p:spPr>
+            <p:style>
+              <a:lnRef idx="2">
+                <a:schemeClr val="accent1">
+                  <a:shade val="15000"/>
+                </a:schemeClr>
+              </a:lnRef>
+              <a:fillRef idx="1">
+                <a:schemeClr val="accent1"/>
+              </a:fillRef>
+              <a:effectRef idx="0">
+                <a:schemeClr val="accent1"/>
+              </a:effectRef>
+              <a:fontRef idx="minor">
+                <a:schemeClr val="lt1"/>
+              </a:fontRef>
+            </p:style>
+            <p:txBody>
+              <a:bodyPr rtlCol="0" anchor="ctr"/>
+              <a:lstStyle/>
+              <a:p>
+                <a:pPr algn="ctr"/>
+                <a:endParaRPr lang="en-US"/>
+              </a:p>
+            </p:txBody>
+          </p:sp>
+          <p:sp>
+            <p:nvSpPr>
+              <p:cNvPr id="27" name="Oval 26">
+                <a:extLst>
+                  <a:ext uri="{FF2B5EF4-FFF2-40B4-BE49-F238E27FC236}">
+                    <a16:creationId xmlns:a16="http://schemas.microsoft.com/office/drawing/2014/main" id="{703AD329-CF63-9BDE-E216-AC077058CC92}"/>
+                  </a:ext>
+                </a:extLst>
+              </p:cNvPr>
+              <p:cNvSpPr/>
+              <p:nvPr/>
+            </p:nvSpPr>
+            <p:spPr>
+              <a:xfrm>
+                <a:off x="13464594" y="9656322"/>
+                <a:ext cx="89012" cy="89012"/>
+              </a:xfrm>
+              <a:prstGeom prst="ellipse">
+                <a:avLst/>
+              </a:prstGeom>
+              <a:noFill/>
+              <a:ln>
+                <a:noFill/>
+              </a:ln>
+            </p:spPr>
+            <p:style>
+              <a:lnRef idx="2">
+                <a:schemeClr val="accent1">
+                  <a:shade val="15000"/>
+                </a:schemeClr>
+              </a:lnRef>
+              <a:fillRef idx="1">
+                <a:schemeClr val="accent1"/>
+              </a:fillRef>
+              <a:effectRef idx="0">
+                <a:schemeClr val="accent1"/>
+              </a:effectRef>
+              <a:fontRef idx="minor">
+                <a:schemeClr val="lt1"/>
+              </a:fontRef>
+            </p:style>
+            <p:txBody>
+              <a:bodyPr rtlCol="0" anchor="ctr"/>
+              <a:lstStyle/>
+              <a:p>
+                <a:pPr algn="ctr"/>
+                <a:endParaRPr lang="en-US"/>
+              </a:p>
+            </p:txBody>
+          </p:sp>
+          <p:sp>
+            <p:nvSpPr>
+              <p:cNvPr id="31" name="Oval 30">
+                <a:extLst>
+                  <a:ext uri="{FF2B5EF4-FFF2-40B4-BE49-F238E27FC236}">
+                    <a16:creationId xmlns:a16="http://schemas.microsoft.com/office/drawing/2014/main" id="{66C37D68-948F-219A-CFD0-301BED959199}"/>
+                  </a:ext>
+                </a:extLst>
+              </p:cNvPr>
+              <p:cNvSpPr/>
+              <p:nvPr/>
+            </p:nvSpPr>
+            <p:spPr>
+              <a:xfrm>
+                <a:off x="13051143" y="9546130"/>
+                <a:ext cx="89012" cy="89012"/>
+              </a:xfrm>
+              <a:prstGeom prst="ellipse">
+                <a:avLst/>
+              </a:prstGeom>
+              <a:noFill/>
+              <a:ln>
+                <a:noFill/>
+              </a:ln>
+            </p:spPr>
+            <p:style>
+              <a:lnRef idx="2">
+                <a:schemeClr val="accent1">
+                  <a:shade val="15000"/>
+                </a:schemeClr>
+              </a:lnRef>
+              <a:fillRef idx="1">
+                <a:schemeClr val="accent1"/>
+              </a:fillRef>
+              <a:effectRef idx="0">
+                <a:schemeClr val="accent1"/>
+              </a:effectRef>
+              <a:fontRef idx="minor">
+                <a:schemeClr val="lt1"/>
+              </a:fontRef>
+            </p:style>
+            <p:txBody>
+              <a:bodyPr rtlCol="0" anchor="ctr"/>
+              <a:lstStyle/>
+              <a:p>
+                <a:pPr algn="ctr"/>
+                <a:endParaRPr lang="en-US"/>
+              </a:p>
+            </p:txBody>
+          </p:sp>
+          <p:sp>
+            <p:nvSpPr>
+              <p:cNvPr id="32" name="Oval 31">
+                <a:extLst>
+                  <a:ext uri="{FF2B5EF4-FFF2-40B4-BE49-F238E27FC236}">
+                    <a16:creationId xmlns:a16="http://schemas.microsoft.com/office/drawing/2014/main" id="{185E5B51-9EA6-0168-4C34-8FDC2EF00878}"/>
+                  </a:ext>
+                </a:extLst>
+              </p:cNvPr>
+              <p:cNvSpPr/>
+              <p:nvPr/>
+            </p:nvSpPr>
+            <p:spPr>
+              <a:xfrm>
+                <a:off x="13689752" y="9717623"/>
+                <a:ext cx="89012" cy="89012"/>
+              </a:xfrm>
+              <a:prstGeom prst="ellipse">
+                <a:avLst/>
+              </a:prstGeom>
+              <a:noFill/>
+              <a:ln>
+                <a:noFill/>
+              </a:ln>
+            </p:spPr>
+            <p:style>
+              <a:lnRef idx="2">
+                <a:schemeClr val="accent1">
+                  <a:shade val="15000"/>
+                </a:schemeClr>
+              </a:lnRef>
+              <a:fillRef idx="1">
+                <a:schemeClr val="accent1"/>
+              </a:fillRef>
+              <a:effectRef idx="0">
+                <a:schemeClr val="accent1"/>
+              </a:effectRef>
+              <a:fontRef idx="minor">
+                <a:schemeClr val="lt1"/>
+              </a:fontRef>
+            </p:style>
+            <p:txBody>
+              <a:bodyPr rtlCol="0" anchor="ctr"/>
+              <a:lstStyle/>
+              <a:p>
+                <a:pPr algn="ctr"/>
+                <a:endParaRPr lang="en-US"/>
+              </a:p>
+            </p:txBody>
+          </p:sp>
+          <p:sp>
+            <p:nvSpPr>
+              <p:cNvPr id="33" name="Oval 32">
+                <a:extLst>
+                  <a:ext uri="{FF2B5EF4-FFF2-40B4-BE49-F238E27FC236}">
+                    <a16:creationId xmlns:a16="http://schemas.microsoft.com/office/drawing/2014/main" id="{B1F6F8DF-5617-A57A-E4FE-12A7223DB748}"/>
+                  </a:ext>
+                </a:extLst>
+              </p:cNvPr>
+              <p:cNvSpPr/>
+              <p:nvPr/>
+            </p:nvSpPr>
+            <p:spPr>
+              <a:xfrm>
+                <a:off x="13886736" y="9779160"/>
+                <a:ext cx="89012" cy="89012"/>
+              </a:xfrm>
+              <a:prstGeom prst="ellipse">
+                <a:avLst/>
+              </a:prstGeom>
+              <a:noFill/>
+              <a:ln>
+                <a:noFill/>
+              </a:ln>
+            </p:spPr>
+            <p:style>
+              <a:lnRef idx="2">
+                <a:schemeClr val="accent1">
+                  <a:shade val="15000"/>
+                </a:schemeClr>
+              </a:lnRef>
+              <a:fillRef idx="1">
+                <a:schemeClr val="accent1"/>
+              </a:fillRef>
+              <a:effectRef idx="0">
+                <a:schemeClr val="accent1"/>
+              </a:effectRef>
+              <a:fontRef idx="minor">
+                <a:schemeClr val="lt1"/>
+              </a:fontRef>
+            </p:style>
+            <p:txBody>
+              <a:bodyPr rtlCol="0" anchor="ctr"/>
+              <a:lstStyle/>
+              <a:p>
+                <a:pPr algn="ctr"/>
+                <a:endParaRPr lang="en-US"/>
+              </a:p>
+            </p:txBody>
+          </p:sp>
+          <p:cxnSp>
+            <p:nvCxnSpPr>
+              <p:cNvPr id="35" name="Connector: Elbow 34">
+                <a:extLst>
+                  <a:ext uri="{FF2B5EF4-FFF2-40B4-BE49-F238E27FC236}">
+                    <a16:creationId xmlns:a16="http://schemas.microsoft.com/office/drawing/2014/main" id="{059F7F98-190E-9EBF-23AE-8257B1653D15}"/>
+                  </a:ext>
+                </a:extLst>
+              </p:cNvPr>
+              <p:cNvCxnSpPr>
+                <a:cxnSpLocks/>
+                <a:stCxn id="33" idx="4"/>
+                <a:endCxn id="23" idx="4"/>
+              </p:cNvCxnSpPr>
+              <p:nvPr/>
+            </p:nvCxnSpPr>
+            <p:spPr>
+              <a:xfrm rot="5400000">
+                <a:off x="8637139" y="7747731"/>
+                <a:ext cx="3173663" cy="7414544"/>
+              </a:xfrm>
+              <a:prstGeom prst="bentConnector3">
+                <a:avLst>
+                  <a:gd name="adj1" fmla="val 126666"/>
+                </a:avLst>
+              </a:prstGeom>
+              <a:ln w="57150">
+                <a:solidFill>
+                  <a:srgbClr val="F68712"/>
+                </a:solidFill>
+                <a:prstDash val="sysDot"/>
+              </a:ln>
+            </p:spPr>
+            <p:style>
+              <a:lnRef idx="1">
+                <a:schemeClr val="accent1"/>
+              </a:lnRef>
+              <a:fillRef idx="0">
+                <a:schemeClr val="accent1"/>
+              </a:fillRef>
+              <a:effectRef idx="0">
+                <a:schemeClr val="accent1"/>
+              </a:effectRef>
+              <a:fontRef idx="minor">
+                <a:schemeClr val="tx1"/>
+              </a:fontRef>
+            </p:style>
+          </p:cxnSp>
+          <p:cxnSp>
+            <p:nvCxnSpPr>
+              <p:cNvPr id="38" name="Connector: Elbow 37">
+                <a:extLst>
+                  <a:ext uri="{FF2B5EF4-FFF2-40B4-BE49-F238E27FC236}">
+                    <a16:creationId xmlns:a16="http://schemas.microsoft.com/office/drawing/2014/main" id="{B116D393-D896-DC98-0A5F-443D2C4E22A2}"/>
+                  </a:ext>
+                </a:extLst>
+              </p:cNvPr>
+              <p:cNvCxnSpPr>
+                <a:cxnSpLocks/>
+                <a:stCxn id="27" idx="4"/>
+                <a:endCxn id="24" idx="4"/>
+              </p:cNvCxnSpPr>
+              <p:nvPr/>
+            </p:nvCxnSpPr>
+            <p:spPr>
+              <a:xfrm rot="5400000">
+                <a:off x="8426806" y="7959540"/>
+                <a:ext cx="3296501" cy="6868089"/>
+              </a:xfrm>
+              <a:prstGeom prst="bentConnector3">
+                <a:avLst>
+                  <a:gd name="adj1" fmla="val 121447"/>
+                </a:avLst>
+              </a:prstGeom>
+              <a:ln w="57150">
+                <a:solidFill>
+                  <a:srgbClr val="F68712"/>
+                </a:solidFill>
+              </a:ln>
+            </p:spPr>
+            <p:style>
+              <a:lnRef idx="1">
+                <a:schemeClr val="accent1"/>
+              </a:lnRef>
+              <a:fillRef idx="0">
+                <a:schemeClr val="accent1"/>
+              </a:fillRef>
+              <a:effectRef idx="0">
+                <a:schemeClr val="accent1"/>
+              </a:effectRef>
+              <a:fontRef idx="minor">
+                <a:schemeClr val="tx1"/>
+              </a:fontRef>
+            </p:style>
+          </p:cxnSp>
+          <p:cxnSp>
+            <p:nvCxnSpPr>
+              <p:cNvPr id="50" name="Connector: Elbow 49">
+                <a:extLst>
+                  <a:ext uri="{FF2B5EF4-FFF2-40B4-BE49-F238E27FC236}">
+                    <a16:creationId xmlns:a16="http://schemas.microsoft.com/office/drawing/2014/main" id="{16F16696-2434-C718-176A-1232D81F7A32}"/>
+                  </a:ext>
+                </a:extLst>
+              </p:cNvPr>
+              <p:cNvCxnSpPr>
+                <a:cxnSpLocks/>
+                <a:stCxn id="32" idx="4"/>
+                <a:endCxn id="25" idx="4"/>
+              </p:cNvCxnSpPr>
+              <p:nvPr/>
+            </p:nvCxnSpPr>
+            <p:spPr>
+              <a:xfrm rot="5400000">
+                <a:off x="8711049" y="8018626"/>
+                <a:ext cx="3235200" cy="6811218"/>
+              </a:xfrm>
+              <a:prstGeom prst="bentConnector3">
+                <a:avLst>
+                  <a:gd name="adj1" fmla="val 118110"/>
+                </a:avLst>
+              </a:prstGeom>
+              <a:ln w="57150">
+                <a:solidFill>
+                  <a:schemeClr val="accent1">
+                    <a:lumMod val="75000"/>
+                  </a:schemeClr>
+                </a:solidFill>
+              </a:ln>
+            </p:spPr>
+            <p:style>
+              <a:lnRef idx="1">
+                <a:schemeClr val="accent1"/>
+              </a:lnRef>
+              <a:fillRef idx="0">
+                <a:schemeClr val="accent1"/>
+              </a:fillRef>
+              <a:effectRef idx="0">
+                <a:schemeClr val="accent1"/>
+              </a:effectRef>
+              <a:fontRef idx="minor">
+                <a:schemeClr val="tx1"/>
+              </a:fontRef>
+            </p:style>
+          </p:cxnSp>
+          <p:cxnSp>
+            <p:nvCxnSpPr>
+              <p:cNvPr id="54" name="Connector: Elbow 53">
+                <a:extLst>
+                  <a:ext uri="{FF2B5EF4-FFF2-40B4-BE49-F238E27FC236}">
+                    <a16:creationId xmlns:a16="http://schemas.microsoft.com/office/drawing/2014/main" id="{B12D968F-3141-840B-4609-B18FE5096DE8}"/>
+                  </a:ext>
+                </a:extLst>
+              </p:cNvPr>
+              <p:cNvCxnSpPr>
+                <a:cxnSpLocks/>
+                <a:stCxn id="31" idx="4"/>
+                <a:endCxn id="26" idx="4"/>
+              </p:cNvCxnSpPr>
+              <p:nvPr/>
+            </p:nvCxnSpPr>
+            <p:spPr>
+              <a:xfrm rot="5400000">
+                <a:off x="8367268" y="8313453"/>
+                <a:ext cx="3406693" cy="6050071"/>
+              </a:xfrm>
+              <a:prstGeom prst="bentConnector3">
+                <a:avLst>
+                  <a:gd name="adj1" fmla="val 113287"/>
+                </a:avLst>
+              </a:prstGeom>
+              <a:ln w="57150">
+                <a:solidFill>
+                  <a:schemeClr val="accent1">
+                    <a:lumMod val="75000"/>
+                  </a:schemeClr>
+                </a:solidFill>
+                <a:prstDash val="sysDot"/>
+              </a:ln>
+            </p:spPr>
+            <p:style>
+              <a:lnRef idx="1">
+                <a:schemeClr val="accent1"/>
+              </a:lnRef>
+              <a:fillRef idx="0">
+                <a:schemeClr val="accent1"/>
+              </a:fillRef>
+              <a:effectRef idx="0">
+                <a:schemeClr val="accent1"/>
+              </a:effectRef>
+              <a:fontRef idx="minor">
+                <a:schemeClr val="tx1"/>
+              </a:fontRef>
+            </p:style>
+          </p:cxnSp>
+          <p:sp>
+            <p:nvSpPr>
+              <p:cNvPr id="14" name="Oval 13">
+                <a:extLst>
+                  <a:ext uri="{FF2B5EF4-FFF2-40B4-BE49-F238E27FC236}">
+                    <a16:creationId xmlns:a16="http://schemas.microsoft.com/office/drawing/2014/main" id="{69114BFC-EBDB-4C3F-5B9B-7C78E088B297}"/>
+                  </a:ext>
+                </a:extLst>
+              </p:cNvPr>
+              <p:cNvSpPr/>
+              <p:nvPr/>
+            </p:nvSpPr>
+            <p:spPr>
+              <a:xfrm>
+                <a:off x="13566754" y="10795578"/>
+                <a:ext cx="271211" cy="271211"/>
+              </a:xfrm>
+              <a:prstGeom prst="ellipse">
                 <a:avLst/>
               </a:prstGeom>
               <a:solidFill>
@@ -14084,502 +14868,267 @@
               <a:lstStyle/>
               <a:p>
                 <a:pPr algn="ctr"/>
-                <a:endParaRPr lang="en-US"/>
+                <a:r>
+                  <a:rPr lang="pt-PT" sz="2400" dirty="0">
+                    <a:solidFill>
+                      <a:schemeClr val="tx1"/>
+                    </a:solidFill>
+                  </a:rPr>
+                  <a:t>+</a:t>
+                </a:r>
+                <a:endParaRPr lang="en-US" sz="2400" dirty="0">
+                  <a:solidFill>
+                    <a:schemeClr val="tx1"/>
+                  </a:solidFill>
+                </a:endParaRPr>
               </a:p>
             </p:txBody>
           </p:sp>
-          <p:grpSp>
-            <p:nvGrpSpPr>
-              <p:cNvPr id="30" name="Group 29">
+          <p:sp>
+            <p:nvSpPr>
+              <p:cNvPr id="16" name="Oval 15">
                 <a:extLst>
                   <a:ext uri="{FF2B5EF4-FFF2-40B4-BE49-F238E27FC236}">
-                    <a16:creationId xmlns:a16="http://schemas.microsoft.com/office/drawing/2014/main" id="{BBDDC135-F8F0-1059-7B99-3FEB47270396}"/>
+                    <a16:creationId xmlns:a16="http://schemas.microsoft.com/office/drawing/2014/main" id="{EE23870B-1A66-2829-C506-61266633708D}"/>
                   </a:ext>
                 </a:extLst>
               </p:cNvPr>
-              <p:cNvGrpSpPr/>
+              <p:cNvSpPr/>
               <p:nvPr/>
-            </p:nvGrpSpPr>
-            <p:grpSpPr>
+            </p:nvSpPr>
+            <p:spPr>
               <a:xfrm>
-                <a:off x="694183" y="380026"/>
-                <a:ext cx="12524860" cy="10591348"/>
-                <a:chOff x="2324202" y="2268463"/>
-                <a:chExt cx="12524860" cy="10591348"/>
+                <a:off x="12983869" y="10149187"/>
+                <a:ext cx="234320" cy="234320"/>
               </a:xfrm>
-            </p:grpSpPr>
-            <p:sp>
-              <p:nvSpPr>
-                <p:cNvPr id="28" name="Freeform: Shape 27">
-                  <a:extLst>
-                    <a:ext uri="{FF2B5EF4-FFF2-40B4-BE49-F238E27FC236}">
-                      <a16:creationId xmlns:a16="http://schemas.microsoft.com/office/drawing/2014/main" id="{A65000F1-1ACA-5B03-A88D-0AFCBEE1A145}"/>
-                    </a:ext>
-                  </a:extLst>
-                </p:cNvPr>
-                <p:cNvSpPr/>
-                <p:nvPr/>
-              </p:nvSpPr>
-              <p:spPr>
-                <a:xfrm>
-                  <a:off x="12717709" y="8360557"/>
-                  <a:ext cx="2131353" cy="2363589"/>
-                </a:xfrm>
-                <a:custGeom>
-                  <a:avLst/>
-                  <a:gdLst>
-                    <a:gd name="connsiteX0" fmla="*/ 0 w 711200"/>
-                    <a:gd name="connsiteY0" fmla="*/ 589844 h 589844"/>
-                    <a:gd name="connsiteX1" fmla="*/ 0 w 711200"/>
-                    <a:gd name="connsiteY1" fmla="*/ 589844 h 589844"/>
-                    <a:gd name="connsiteX2" fmla="*/ 711200 w 711200"/>
-                    <a:gd name="connsiteY2" fmla="*/ 589844 h 589844"/>
-                    <a:gd name="connsiteX3" fmla="*/ 711200 w 711200"/>
-                    <a:gd name="connsiteY3" fmla="*/ 0 h 589844"/>
-                  </a:gdLst>
-                  <a:ahLst/>
-                  <a:cxnLst>
-                    <a:cxn ang="0">
-                      <a:pos x="connsiteX0" y="connsiteY0"/>
-                    </a:cxn>
-                    <a:cxn ang="0">
-                      <a:pos x="connsiteX1" y="connsiteY1"/>
-                    </a:cxn>
-                    <a:cxn ang="0">
-                      <a:pos x="connsiteX2" y="connsiteY2"/>
-                    </a:cxn>
-                    <a:cxn ang="0">
-                      <a:pos x="connsiteX3" y="connsiteY3"/>
-                    </a:cxn>
-                  </a:cxnLst>
-                  <a:rect l="l" t="t" r="r" b="b"/>
-                  <a:pathLst>
-                    <a:path w="711200" h="589844">
-                      <a:moveTo>
-                        <a:pt x="0" y="589844"/>
-                      </a:moveTo>
-                      <a:lnTo>
-                        <a:pt x="0" y="589844"/>
-                      </a:lnTo>
-                      <a:lnTo>
-                        <a:pt x="711200" y="589844"/>
-                      </a:lnTo>
-                      <a:lnTo>
-                        <a:pt x="711200" y="0"/>
-                      </a:lnTo>
-                    </a:path>
-                  </a:pathLst>
-                </a:custGeom>
-                <a:noFill/>
-                <a:ln w="57150">
-                  <a:solidFill>
-                    <a:schemeClr val="accent1"/>
-                  </a:solidFill>
-                </a:ln>
-              </p:spPr>
-              <p:style>
-                <a:lnRef idx="2">
-                  <a:schemeClr val="accent1">
-                    <a:shade val="15000"/>
-                  </a:schemeClr>
-                </a:lnRef>
-                <a:fillRef idx="1">
-                  <a:schemeClr val="accent1"/>
-                </a:fillRef>
-                <a:effectRef idx="0">
-                  <a:schemeClr val="accent1"/>
-                </a:effectRef>
-                <a:fontRef idx="minor">
-                  <a:schemeClr val="lt1"/>
-                </a:fontRef>
-              </p:style>
-              <p:txBody>
-                <a:bodyPr rtlCol="0" anchor="ctr"/>
-                <a:lstStyle/>
-                <a:p>
-                  <a:pPr algn="ctr"/>
-                  <a:endParaRPr lang="en-US"/>
-                </a:p>
-              </p:txBody>
-            </p:sp>
-            <p:pic>
-              <p:nvPicPr>
-                <p:cNvPr id="197" name="Google Shape;197;p24"/>
-                <p:cNvPicPr preferRelativeResize="0"/>
-                <p:nvPr/>
-              </p:nvPicPr>
-              <p:blipFill>
-                <a:blip r:embed="rId3">
-                  <a:alphaModFix/>
-                </a:blip>
-                <a:stretch>
-                  <a:fillRect/>
-                </a:stretch>
-              </p:blipFill>
-              <p:spPr>
-                <a:xfrm>
-                  <a:off x="2324202" y="2268463"/>
-                  <a:ext cx="11499204" cy="10591348"/>
-                </a:xfrm>
-                <a:prstGeom prst="rect">
-                  <a:avLst/>
-                </a:prstGeom>
-                <a:noFill/>
-                <a:ln>
-                  <a:noFill/>
-                </a:ln>
-              </p:spPr>
-            </p:pic>
-            <p:sp>
-              <p:nvSpPr>
-                <p:cNvPr id="198" name="Google Shape;198;p24"/>
-                <p:cNvSpPr txBox="1"/>
-                <p:nvPr/>
-              </p:nvSpPr>
-              <p:spPr>
-                <a:xfrm>
-                  <a:off x="12629476" y="9620529"/>
-                  <a:ext cx="1420511" cy="677078"/>
-                </a:xfrm>
-                <a:prstGeom prst="rect">
-                  <a:avLst/>
-                </a:prstGeom>
-                <a:noFill/>
-                <a:ln>
-                  <a:noFill/>
-                </a:ln>
-              </p:spPr>
-              <p:txBody>
-                <a:bodyPr spcFirstLastPara="1" wrap="square" lIns="91425" tIns="91425" rIns="91425" bIns="91425" anchor="t" anchorCtr="0">
-                  <a:spAutoFit/>
-                </a:bodyPr>
-                <a:lstStyle/>
-                <a:p>
-                  <a:pPr algn="ctr"/>
-                  <a:r>
-                    <a:rPr lang="en" sz="3200" b="1" dirty="0">
-                      <a:solidFill>
-                        <a:srgbClr val="DAC000"/>
-                      </a:solidFill>
-                      <a:latin typeface="Comfortaa"/>
-                      <a:ea typeface="Comfortaa"/>
-                      <a:cs typeface="Comfortaa"/>
-                      <a:sym typeface="Comfortaa"/>
-                    </a:rPr>
-                    <a:t>DO0</a:t>
-                  </a:r>
-                  <a:endParaRPr sz="3200" b="1" dirty="0">
+              <a:prstGeom prst="ellipse">
+                <a:avLst/>
+              </a:prstGeom>
+              <a:solidFill>
+                <a:schemeClr val="bg1"/>
+              </a:solidFill>
+              <a:ln>
+                <a:solidFill>
+                  <a:schemeClr val="bg1"/>
+                </a:solidFill>
+              </a:ln>
+            </p:spPr>
+            <p:style>
+              <a:lnRef idx="2">
+                <a:schemeClr val="accent1">
+                  <a:shade val="15000"/>
+                </a:schemeClr>
+              </a:lnRef>
+              <a:fillRef idx="1">
+                <a:schemeClr val="accent1"/>
+              </a:fillRef>
+              <a:effectRef idx="0">
+                <a:schemeClr val="accent1"/>
+              </a:effectRef>
+              <a:fontRef idx="minor">
+                <a:schemeClr val="lt1"/>
+              </a:fontRef>
+            </p:style>
+            <p:txBody>
+              <a:bodyPr rtlCol="0" anchor="ctr"/>
+              <a:lstStyle/>
+              <a:p>
+                <a:pPr algn="ctr"/>
+                <a:r>
+                  <a:rPr lang="pt-PT" sz="2400" dirty="0">
                     <a:solidFill>
-                      <a:srgbClr val="DAC000"/>
+                      <a:schemeClr val="tx1"/>
                     </a:solidFill>
-                    <a:latin typeface="Comfortaa"/>
-                    <a:ea typeface="Comfortaa"/>
-                    <a:cs typeface="Comfortaa"/>
-                    <a:sym typeface="Comfortaa"/>
-                  </a:endParaRPr>
-                </a:p>
-              </p:txBody>
-            </p:sp>
-            <p:sp>
-              <p:nvSpPr>
-                <p:cNvPr id="29" name="Freeform: Shape 28">
-                  <a:extLst>
-                    <a:ext uri="{FF2B5EF4-FFF2-40B4-BE49-F238E27FC236}">
-                      <a16:creationId xmlns:a16="http://schemas.microsoft.com/office/drawing/2014/main" id="{101CC732-AE3D-11FD-A27F-838DAAAA6EBB}"/>
-                    </a:ext>
-                  </a:extLst>
-                </p:cNvPr>
-                <p:cNvSpPr/>
-                <p:nvPr/>
-              </p:nvSpPr>
-              <p:spPr>
-                <a:xfrm>
-                  <a:off x="12717709" y="8430127"/>
-                  <a:ext cx="1420512" cy="1917032"/>
-                </a:xfrm>
-                <a:custGeom>
-                  <a:avLst/>
-                  <a:gdLst>
-                    <a:gd name="connsiteX0" fmla="*/ 0 w 711200"/>
-                    <a:gd name="connsiteY0" fmla="*/ 589844 h 589844"/>
-                    <a:gd name="connsiteX1" fmla="*/ 0 w 711200"/>
-                    <a:gd name="connsiteY1" fmla="*/ 589844 h 589844"/>
-                    <a:gd name="connsiteX2" fmla="*/ 711200 w 711200"/>
-                    <a:gd name="connsiteY2" fmla="*/ 589844 h 589844"/>
-                    <a:gd name="connsiteX3" fmla="*/ 711200 w 711200"/>
-                    <a:gd name="connsiteY3" fmla="*/ 0 h 589844"/>
-                  </a:gdLst>
-                  <a:ahLst/>
-                  <a:cxnLst>
-                    <a:cxn ang="0">
-                      <a:pos x="connsiteX0" y="connsiteY0"/>
-                    </a:cxn>
-                    <a:cxn ang="0">
-                      <a:pos x="connsiteX1" y="connsiteY1"/>
-                    </a:cxn>
-                    <a:cxn ang="0">
-                      <a:pos x="connsiteX2" y="connsiteY2"/>
-                    </a:cxn>
-                    <a:cxn ang="0">
-                      <a:pos x="connsiteX3" y="connsiteY3"/>
-                    </a:cxn>
-                  </a:cxnLst>
-                  <a:rect l="l" t="t" r="r" b="b"/>
-                  <a:pathLst>
-                    <a:path w="711200" h="589844">
-                      <a:moveTo>
-                        <a:pt x="0" y="589844"/>
-                      </a:moveTo>
-                      <a:lnTo>
-                        <a:pt x="0" y="589844"/>
-                      </a:lnTo>
-                      <a:lnTo>
-                        <a:pt x="711200" y="589844"/>
-                      </a:lnTo>
-                      <a:lnTo>
-                        <a:pt x="711200" y="0"/>
-                      </a:lnTo>
-                    </a:path>
-                  </a:pathLst>
-                </a:custGeom>
-                <a:noFill/>
-                <a:ln w="57150">
+                  </a:rPr>
+                  <a:t>-</a:t>
+                </a:r>
+                <a:endParaRPr lang="en-US" sz="2400" dirty="0">
                   <a:solidFill>
                     <a:schemeClr val="tx1"/>
                   </a:solidFill>
-                </a:ln>
-              </p:spPr>
-              <p:style>
-                <a:lnRef idx="2">
-                  <a:schemeClr val="accent1">
-                    <a:shade val="15000"/>
-                  </a:schemeClr>
-                </a:lnRef>
-                <a:fillRef idx="1">
-                  <a:schemeClr val="accent1"/>
-                </a:fillRef>
-                <a:effectRef idx="0">
-                  <a:schemeClr val="accent1"/>
-                </a:effectRef>
-                <a:fontRef idx="minor">
-                  <a:schemeClr val="lt1"/>
-                </a:fontRef>
-              </p:style>
-              <p:txBody>
-                <a:bodyPr rtlCol="0" anchor="ctr"/>
-                <a:lstStyle/>
-                <a:p>
-                  <a:pPr algn="ctr"/>
-                  <a:endParaRPr lang="en-US"/>
-                </a:p>
-              </p:txBody>
-            </p:sp>
-            <p:sp>
-              <p:nvSpPr>
-                <p:cNvPr id="6" name="Google Shape;228;p26">
-                  <a:extLst>
-                    <a:ext uri="{FF2B5EF4-FFF2-40B4-BE49-F238E27FC236}">
-                      <a16:creationId xmlns:a16="http://schemas.microsoft.com/office/drawing/2014/main" id="{F094411B-B967-268C-6A43-E41A3C532821}"/>
-                    </a:ext>
-                  </a:extLst>
-                </p:cNvPr>
-                <p:cNvSpPr/>
-                <p:nvPr/>
-              </p:nvSpPr>
-              <p:spPr>
-                <a:xfrm>
-                  <a:off x="10837448" y="10109595"/>
-                  <a:ext cx="1880261" cy="464024"/>
-                </a:xfrm>
-                <a:prstGeom prst="rect">
-                  <a:avLst/>
-                </a:prstGeom>
-                <a:noFill/>
-                <a:ln w="57150" cap="flat" cmpd="sng">
-                  <a:solidFill>
-                    <a:srgbClr val="DAC000"/>
-                  </a:solidFill>
-                  <a:prstDash val="solid"/>
-                  <a:round/>
-                  <a:headEnd type="none" w="sm" len="sm"/>
-                  <a:tailEnd type="none" w="sm" len="sm"/>
-                </a:ln>
-              </p:spPr>
-              <p:txBody>
-                <a:bodyPr spcFirstLastPara="1" wrap="square" lIns="91425" tIns="91425" rIns="91425" bIns="91425" anchor="ctr" anchorCtr="0">
-                  <a:noAutofit/>
-                </a:bodyPr>
-                <a:lstStyle/>
-                <a:p>
-                  <a:pPr algn="ctr"/>
-                  <a:endParaRPr>
-                    <a:solidFill>
-                      <a:srgbClr val="DAC000"/>
-                    </a:solidFill>
-                  </a:endParaRPr>
-                </a:p>
-              </p:txBody>
-            </p:sp>
-          </p:grpSp>
-          <p:pic>
-            <p:nvPicPr>
-              <p:cNvPr id="10246" name="Picture 6" descr="Amazon.com: Cable Matters 10Gbps Combo-Pack 90 Degree Cat 6, Cat6 Right  Angle Ethernet Cable 3 ft (90 Degree + 270 Degree Right Angle Cat6 Cable) :  Electronics">
+                </a:endParaRPr>
+              </a:p>
+            </p:txBody>
+          </p:sp>
+          <p:sp>
+            <p:nvSpPr>
+              <p:cNvPr id="17" name="Oval 16">
                 <a:extLst>
                   <a:ext uri="{FF2B5EF4-FFF2-40B4-BE49-F238E27FC236}">
-                    <a16:creationId xmlns:a16="http://schemas.microsoft.com/office/drawing/2014/main" id="{EAA5EB30-F88F-3779-68CC-3D4C9E0CD7D0}"/>
+                    <a16:creationId xmlns:a16="http://schemas.microsoft.com/office/drawing/2014/main" id="{94E78E6C-ED35-4CCD-B545-1A0DE5025702}"/>
                   </a:ext>
                 </a:extLst>
               </p:cNvPr>
-              <p:cNvPicPr>
-                <a:picLocks noChangeAspect="1" noChangeArrowheads="1"/>
-              </p:cNvPicPr>
+              <p:cNvSpPr/>
               <p:nvPr/>
-            </p:nvPicPr>
-            <p:blipFill rotWithShape="1">
-              <a:blip r:embed="rId4">
+            </p:nvSpPr>
+            <p:spPr>
+              <a:xfrm>
+                <a:off x="13387926" y="10507095"/>
+                <a:ext cx="257715" cy="257715"/>
+              </a:xfrm>
+              <a:prstGeom prst="ellipse">
+                <a:avLst/>
+              </a:prstGeom>
+              <a:solidFill>
+                <a:schemeClr val="bg1"/>
+              </a:solidFill>
+              <a:ln>
+                <a:solidFill>
+                  <a:schemeClr val="bg1"/>
+                </a:solidFill>
+              </a:ln>
+            </p:spPr>
+            <p:style>
+              <a:lnRef idx="2">
+                <a:schemeClr val="accent1">
+                  <a:shade val="15000"/>
+                </a:schemeClr>
+              </a:lnRef>
+              <a:fillRef idx="1">
+                <a:schemeClr val="accent1"/>
+              </a:fillRef>
+              <a:effectRef idx="0">
+                <a:schemeClr val="accent1"/>
+              </a:effectRef>
+              <a:fontRef idx="minor">
+                <a:schemeClr val="lt1"/>
+              </a:fontRef>
+            </p:style>
+            <p:txBody>
+              <a:bodyPr rtlCol="0" anchor="ctr"/>
+              <a:lstStyle/>
+              <a:p>
+                <a:pPr algn="ctr"/>
+                <a:r>
+                  <a:rPr lang="pt-PT" sz="2000" dirty="0">
+                    <a:solidFill>
+                      <a:schemeClr val="tx1"/>
+                    </a:solidFill>
+                  </a:rPr>
+                  <a:t>B</a:t>
+                </a:r>
+                <a:endParaRPr lang="en-US" sz="2000" dirty="0">
+                  <a:solidFill>
+                    <a:schemeClr val="tx1"/>
+                  </a:solidFill>
+                </a:endParaRPr>
+              </a:p>
+            </p:txBody>
+          </p:sp>
+          <p:sp>
+            <p:nvSpPr>
+              <p:cNvPr id="18" name="Oval 17">
                 <a:extLst>
-                  <a:ext uri="{28A0092B-C50C-407E-A947-70E740481C1C}">
-                    <a14:useLocalDpi xmlns:a14="http://schemas.microsoft.com/office/drawing/2010/main" val="0"/>
+                  <a:ext uri="{FF2B5EF4-FFF2-40B4-BE49-F238E27FC236}">
+                    <a16:creationId xmlns:a16="http://schemas.microsoft.com/office/drawing/2014/main" id="{207428FE-B1D9-5404-DCD5-FB6F33FA36B9}"/>
                   </a:ext>
                 </a:extLst>
-              </a:blip>
-              <a:srcRect l="67720" t="5321" b="61662"/>
-              <a:stretch/>
-            </p:blipFill>
-            <p:spPr bwMode="auto">
+              </p:cNvPr>
+              <p:cNvSpPr/>
+              <p:nvPr/>
+            </p:nvSpPr>
+            <p:spPr>
               <a:xfrm>
-                <a:off x="6443785" y="10732835"/>
-                <a:ext cx="3231987" cy="3305796"/>
+                <a:off x="13791129" y="11054020"/>
+                <a:ext cx="271211" cy="271211"/>
+              </a:xfrm>
+              <a:prstGeom prst="ellipse">
+                <a:avLst/>
+              </a:prstGeom>
+              <a:solidFill>
+                <a:schemeClr val="bg1"/>
+              </a:solidFill>
+              <a:ln>
+                <a:solidFill>
+                  <a:schemeClr val="bg1"/>
+                </a:solidFill>
+              </a:ln>
+            </p:spPr>
+            <p:style>
+              <a:lnRef idx="2">
+                <a:schemeClr val="accent1">
+                  <a:shade val="15000"/>
+                </a:schemeClr>
+              </a:lnRef>
+              <a:fillRef idx="1">
+                <a:schemeClr val="accent1"/>
+              </a:fillRef>
+              <a:effectRef idx="0">
+                <a:schemeClr val="accent1"/>
+              </a:effectRef>
+              <a:fontRef idx="minor">
+                <a:schemeClr val="lt1"/>
+              </a:fontRef>
+            </p:style>
+            <p:txBody>
+              <a:bodyPr rtlCol="0" anchor="ctr"/>
+              <a:lstStyle/>
+              <a:p>
+                <a:pPr algn="ctr"/>
+                <a:r>
+                  <a:rPr lang="pt-PT" sz="2000" dirty="0">
+                    <a:solidFill>
+                      <a:schemeClr val="tx1"/>
+                    </a:solidFill>
+                  </a:rPr>
+                  <a:t>A</a:t>
+                </a:r>
+                <a:endParaRPr lang="en-US" sz="2000" dirty="0">
+                  <a:solidFill>
+                    <a:schemeClr val="tx1"/>
+                  </a:solidFill>
+                </a:endParaRPr>
+              </a:p>
+            </p:txBody>
+          </p:sp>
+          <p:sp>
+            <p:nvSpPr>
+              <p:cNvPr id="6" name="Google Shape;228;p26">
+                <a:extLst>
+                  <a:ext uri="{FF2B5EF4-FFF2-40B4-BE49-F238E27FC236}">
+                    <a16:creationId xmlns:a16="http://schemas.microsoft.com/office/drawing/2014/main" id="{F094411B-B967-268C-6A43-E41A3C532821}"/>
+                  </a:ext>
+                </a:extLst>
+              </p:cNvPr>
+              <p:cNvSpPr/>
+              <p:nvPr/>
+            </p:nvSpPr>
+            <p:spPr>
+              <a:xfrm>
+                <a:off x="6053533" y="7794320"/>
+                <a:ext cx="1880261" cy="2712776"/>
               </a:xfrm>
               <a:prstGeom prst="rect">
                 <a:avLst/>
               </a:prstGeom>
               <a:noFill/>
-              <a:extLst>
-                <a:ext uri="{909E8E84-426E-40DD-AFC4-6F175D3DCCD1}">
-                  <a14:hiddenFill xmlns:a14="http://schemas.microsoft.com/office/drawing/2010/main">
-                    <a:solidFill>
-                      <a:srgbClr val="FFFFFF"/>
-                    </a:solidFill>
-                  </a14:hiddenFill>
-                </a:ext>
-              </a:extLst>
+              <a:ln w="57150" cap="flat" cmpd="sng">
+                <a:solidFill>
+                  <a:srgbClr val="DAC000"/>
+                </a:solidFill>
+                <a:prstDash val="solid"/>
+                <a:round/>
+                <a:headEnd type="none" w="sm" len="sm"/>
+                <a:tailEnd type="none" w="sm" len="sm"/>
+              </a:ln>
             </p:spPr>
-          </p:pic>
-          <p:pic>
-            <p:nvPicPr>
-              <p:cNvPr id="7" name="Picture 6">
-                <a:extLst>
-                  <a:ext uri="{FF2B5EF4-FFF2-40B4-BE49-F238E27FC236}">
-                    <a16:creationId xmlns:a16="http://schemas.microsoft.com/office/drawing/2014/main" id="{78C9D4C3-C4D6-028D-E12E-6CDD382D163C}"/>
-                  </a:ext>
-                </a:extLst>
-              </p:cNvPr>
-              <p:cNvPicPr>
-                <a:picLocks noChangeAspect="1"/>
-              </p:cNvPicPr>
-              <p:nvPr/>
-            </p:nvPicPr>
-            <p:blipFill rotWithShape="1">
-              <a:blip r:embed="rId5"/>
-              <a:srcRect l="10161" r="38058"/>
-              <a:stretch/>
-            </p:blipFill>
-            <p:spPr>
-              <a:xfrm>
-                <a:off x="13985415" y="5706237"/>
-                <a:ext cx="2439783" cy="4711790"/>
-              </a:xfrm>
-              <a:prstGeom prst="rect">
-                <a:avLst/>
-              </a:prstGeom>
-            </p:spPr>
-          </p:pic>
+            <p:txBody>
+              <a:bodyPr spcFirstLastPara="1" wrap="square" lIns="91425" tIns="91425" rIns="91425" bIns="91425" anchor="ctr" anchorCtr="0">
+                <a:noAutofit/>
+              </a:bodyPr>
+              <a:lstStyle/>
+              <a:p>
+                <a:pPr algn="ctr"/>
+                <a:endParaRPr dirty="0">
+                  <a:solidFill>
+                    <a:srgbClr val="DAC000"/>
+                  </a:solidFill>
+                </a:endParaRPr>
+              </a:p>
+            </p:txBody>
+          </p:sp>
         </p:grpSp>
-        <p:cxnSp>
-          <p:nvCxnSpPr>
-            <p:cNvPr id="11" name="Straight Connector 10">
-              <a:extLst>
-                <a:ext uri="{FF2B5EF4-FFF2-40B4-BE49-F238E27FC236}">
-                  <a16:creationId xmlns:a16="http://schemas.microsoft.com/office/drawing/2014/main" id="{93F3CC88-C641-2F51-F3A8-EBF4314F55A2}"/>
-                </a:ext>
-              </a:extLst>
-            </p:cNvPr>
-            <p:cNvCxnSpPr/>
-            <p:nvPr/>
-          </p:nvCxnSpPr>
-          <p:spPr>
-            <a:xfrm>
-              <a:off x="4247803" y="1255789"/>
-              <a:ext cx="9919252" cy="11907078"/>
-            </a:xfrm>
-            <a:prstGeom prst="line">
-              <a:avLst/>
-            </a:prstGeom>
-            <a:ln w="76200">
-              <a:solidFill>
-                <a:srgbClr val="FF0000"/>
-              </a:solidFill>
-            </a:ln>
-          </p:spPr>
-          <p:style>
-            <a:lnRef idx="1">
-              <a:schemeClr val="accent1"/>
-            </a:lnRef>
-            <a:fillRef idx="0">
-              <a:schemeClr val="accent1"/>
-            </a:fillRef>
-            <a:effectRef idx="0">
-              <a:schemeClr val="accent1"/>
-            </a:effectRef>
-            <a:fontRef idx="minor">
-              <a:schemeClr val="tx1"/>
-            </a:fontRef>
-          </p:style>
-        </p:cxnSp>
-        <p:cxnSp>
-          <p:nvCxnSpPr>
-            <p:cNvPr id="12" name="Straight Connector 11">
-              <a:extLst>
-                <a:ext uri="{FF2B5EF4-FFF2-40B4-BE49-F238E27FC236}">
-                  <a16:creationId xmlns:a16="http://schemas.microsoft.com/office/drawing/2014/main" id="{FED8F8B5-FDBA-3C68-66A9-A4BCC1E251DA}"/>
-                </a:ext>
-              </a:extLst>
-            </p:cNvPr>
-            <p:cNvCxnSpPr>
-              <a:cxnSpLocks/>
-            </p:cNvCxnSpPr>
-            <p:nvPr/>
-          </p:nvCxnSpPr>
-          <p:spPr>
-            <a:xfrm flipH="1">
-              <a:off x="6241774" y="2484783"/>
-              <a:ext cx="8636519" cy="10534244"/>
-            </a:xfrm>
-            <a:prstGeom prst="line">
-              <a:avLst/>
-            </a:prstGeom>
-            <a:ln w="76200">
-              <a:solidFill>
-                <a:srgbClr val="FF0000"/>
-              </a:solidFill>
-            </a:ln>
-          </p:spPr>
-          <p:style>
-            <a:lnRef idx="1">
-              <a:schemeClr val="accent1"/>
-            </a:lnRef>
-            <a:fillRef idx="0">
-              <a:schemeClr val="accent1"/>
-            </a:fillRef>
-            <a:effectRef idx="0">
-              <a:schemeClr val="accent1"/>
-            </a:effectRef>
-            <a:fontRef idx="minor">
-              <a:schemeClr val="tx1"/>
-            </a:fontRef>
-          </p:style>
-        </p:cxnSp>
       </p:grpSp>
     </p:spTree>
     <p:extLst>

</xml_diff>

<commit_message>
Added annotations to MP4Writer.
</commit_message>
<xml_diff>
--- a/docs/images/SchematicFigures.pptx
+++ b/docs/images/SchematicFigures.pptx
@@ -5,7 +5,7 @@
     <p:sldMasterId id="2147483659" r:id="rId1"/>
   </p:sldMasterIdLst>
   <p:notesMasterIdLst>
-    <p:notesMasterId r:id="rId16"/>
+    <p:notesMasterId r:id="rId17"/>
   </p:notesMasterIdLst>
   <p:sldIdLst>
     <p:sldId id="262" r:id="rId2"/>
@@ -16,20 +16,21 @@
     <p:sldId id="283" r:id="rId7"/>
     <p:sldId id="284" r:id="rId8"/>
     <p:sldId id="286" r:id="rId9"/>
-    <p:sldId id="278" r:id="rId10"/>
-    <p:sldId id="273" r:id="rId11"/>
-    <p:sldId id="277" r:id="rId12"/>
-    <p:sldId id="279" r:id="rId13"/>
-    <p:sldId id="275" r:id="rId14"/>
-    <p:sldId id="285" r:id="rId15"/>
+    <p:sldId id="287" r:id="rId10"/>
+    <p:sldId id="278" r:id="rId11"/>
+    <p:sldId id="273" r:id="rId12"/>
+    <p:sldId id="277" r:id="rId13"/>
+    <p:sldId id="279" r:id="rId14"/>
+    <p:sldId id="275" r:id="rId15"/>
+    <p:sldId id="285" r:id="rId16"/>
   </p:sldIdLst>
   <p:sldSz cx="21396325" cy="15179675"/>
   <p:notesSz cx="6858000" cy="9144000"/>
   <p:embeddedFontLst>
     <p:embeddedFont>
       <p:font typeface="Comfortaa" panose="020B0604020202020204" charset="0"/>
-      <p:regular r:id="rId17"/>
-      <p:bold r:id="rId18"/>
+      <p:regular r:id="rId18"/>
+      <p:bold r:id="rId19"/>
     </p:embeddedFont>
   </p:embeddedFontLst>
   <p:defaultTextStyle>
@@ -830,6 +831,115 @@
   <p:cSld>
     <p:spTree>
       <p:nvGrpSpPr>
+        <p:cNvPr id="1" name="Shape 216"/>
+        <p:cNvGrpSpPr/>
+        <p:nvPr/>
+      </p:nvGrpSpPr>
+      <p:grpSpPr>
+        <a:xfrm>
+          <a:off x="0" y="0"/>
+          <a:ext cx="0" cy="0"/>
+          <a:chOff x="0" y="0"/>
+          <a:chExt cx="0" cy="0"/>
+        </a:xfrm>
+      </p:grpSpPr>
+      <p:sp>
+        <p:nvSpPr>
+          <p:cNvPr id="217" name="Google Shape;217;g2ba76c986c1_0_148:notes"/>
+          <p:cNvSpPr>
+            <a:spLocks noGrp="1" noRot="1" noChangeAspect="1"/>
+          </p:cNvSpPr>
+          <p:nvPr>
+            <p:ph type="sldImg" idx="2"/>
+          </p:nvPr>
+        </p:nvSpPr>
+        <p:spPr>
+          <a:xfrm>
+            <a:off x="1012825" y="685800"/>
+            <a:ext cx="4832350" cy="3429000"/>
+          </a:xfrm>
+          <a:custGeom>
+            <a:avLst/>
+            <a:gdLst/>
+            <a:ahLst/>
+            <a:cxnLst/>
+            <a:rect l="l" t="t" r="r" b="b"/>
+            <a:pathLst>
+              <a:path w="120000" h="120000" extrusionOk="0">
+                <a:moveTo>
+                  <a:pt x="0" y="0"/>
+                </a:moveTo>
+                <a:lnTo>
+                  <a:pt x="120000" y="0"/>
+                </a:lnTo>
+                <a:lnTo>
+                  <a:pt x="120000" y="120000"/>
+                </a:lnTo>
+                <a:lnTo>
+                  <a:pt x="0" y="120000"/>
+                </a:lnTo>
+                <a:close/>
+              </a:path>
+            </a:pathLst>
+          </a:custGeom>
+        </p:spPr>
+      </p:sp>
+      <p:sp>
+        <p:nvSpPr>
+          <p:cNvPr id="218" name="Google Shape;218;g2ba76c986c1_0_148:notes"/>
+          <p:cNvSpPr txBox="1">
+            <a:spLocks noGrp="1"/>
+          </p:cNvSpPr>
+          <p:nvPr>
+            <p:ph type="body" idx="1"/>
+          </p:nvPr>
+        </p:nvSpPr>
+        <p:spPr>
+          <a:xfrm>
+            <a:off x="685800" y="4343400"/>
+            <a:ext cx="5486400" cy="4114800"/>
+          </a:xfrm>
+          <a:prstGeom prst="rect">
+            <a:avLst/>
+          </a:prstGeom>
+        </p:spPr>
+        <p:txBody>
+          <a:bodyPr spcFirstLastPara="1" wrap="square" lIns="91425" tIns="91425" rIns="91425" bIns="91425" anchor="t" anchorCtr="0">
+            <a:noAutofit/>
+          </a:bodyPr>
+          <a:lstStyle/>
+          <a:p>
+            <a:pPr marL="0" lvl="0" indent="0" algn="l" rtl="0">
+              <a:spcBef>
+                <a:spcPts val="0"/>
+              </a:spcBef>
+              <a:spcAft>
+                <a:spcPts val="0"/>
+              </a:spcAft>
+              <a:buNone/>
+            </a:pPr>
+            <a:endParaRPr/>
+          </a:p>
+        </p:txBody>
+      </p:sp>
+    </p:spTree>
+    <p:extLst>
+      <p:ext uri="{BB962C8B-B14F-4D97-AF65-F5344CB8AC3E}">
+        <p14:creationId xmlns:p14="http://schemas.microsoft.com/office/powerpoint/2010/main" val="3903981959"/>
+      </p:ext>
+    </p:extLst>
+  </p:cSld>
+  <p:clrMapOvr>
+    <a:masterClrMapping/>
+  </p:clrMapOvr>
+</p:notes>
+</file>
+
+<file path=ppt/notesSlides/notesSlide11.xml><?xml version="1.0" encoding="utf-8"?>
+<p:notes xmlns:a="http://schemas.openxmlformats.org/drawingml/2006/main" xmlns:r="http://schemas.openxmlformats.org/officeDocument/2006/relationships" xmlns:p="http://schemas.openxmlformats.org/presentationml/2006/main" showMasterSp="0" showMasterPhAnim="0">
+  <p:cSld>
+    <p:spTree>
+      <p:nvGrpSpPr>
         <p:cNvPr id="1" name="Shape 271"/>
         <p:cNvGrpSpPr/>
         <p:nvPr/>
@@ -929,7 +1039,7 @@
 </p:notes>
 </file>
 
-<file path=ppt/notesSlides/notesSlide11.xml><?xml version="1.0" encoding="utf-8"?>
+<file path=ppt/notesSlides/notesSlide12.xml><?xml version="1.0" encoding="utf-8"?>
 <p:notes xmlns:a="http://schemas.openxmlformats.org/drawingml/2006/main" xmlns:r="http://schemas.openxmlformats.org/officeDocument/2006/relationships" xmlns:p="http://schemas.openxmlformats.org/presentationml/2006/main" showMasterSp="0" showMasterPhAnim="0">
   <p:cSld>
     <p:spTree>
@@ -1033,7 +1143,7 @@
 </p:notes>
 </file>
 
-<file path=ppt/notesSlides/notesSlide12.xml><?xml version="1.0" encoding="utf-8"?>
+<file path=ppt/notesSlides/notesSlide13.xml><?xml version="1.0" encoding="utf-8"?>
 <p:notes xmlns:a="http://schemas.openxmlformats.org/drawingml/2006/main" xmlns:r="http://schemas.openxmlformats.org/officeDocument/2006/relationships" xmlns:p="http://schemas.openxmlformats.org/presentationml/2006/main" showMasterSp="0" showMasterPhAnim="0">
   <p:cSld>
     <p:spTree>
@@ -1142,7 +1252,7 @@
 </p:notes>
 </file>
 
-<file path=ppt/notesSlides/notesSlide13.xml><?xml version="1.0" encoding="utf-8"?>
+<file path=ppt/notesSlides/notesSlide14.xml><?xml version="1.0" encoding="utf-8"?>
 <p:notes xmlns:a="http://schemas.openxmlformats.org/drawingml/2006/main" xmlns:r="http://schemas.openxmlformats.org/officeDocument/2006/relationships" xmlns:p="http://schemas.openxmlformats.org/presentationml/2006/main" showMasterSp="0" showMasterPhAnim="0">
   <p:cSld>
     <p:spTree>
@@ -2009,7 +2119,7 @@
   <p:cSld>
     <p:spTree>
       <p:nvGrpSpPr>
-        <p:cNvPr id="1" name="Shape 216"/>
+        <p:cNvPr id="1" name="Shape 185"/>
         <p:cNvGrpSpPr/>
         <p:nvPr/>
       </p:nvGrpSpPr>
@@ -2023,7 +2133,7 @@
       </p:grpSpPr>
       <p:sp>
         <p:nvSpPr>
-          <p:cNvPr id="217" name="Google Shape;217;g2ba76c986c1_0_148:notes"/>
+          <p:cNvPr id="186" name="Google Shape;186;g2ba76c986c1_0_123:notes"/>
           <p:cNvSpPr>
             <a:spLocks noGrp="1" noRot="1" noChangeAspect="1"/>
           </p:cNvSpPr>
@@ -2064,7 +2174,7 @@
       </p:sp>
       <p:sp>
         <p:nvSpPr>
-          <p:cNvPr id="218" name="Google Shape;218;g2ba76c986c1_0_148:notes"/>
+          <p:cNvPr id="187" name="Google Shape;187;g2ba76c986c1_0_123:notes"/>
           <p:cNvSpPr txBox="1">
             <a:spLocks noGrp="1"/>
           </p:cNvSpPr>
@@ -2103,7 +2213,7 @@
     </p:spTree>
     <p:extLst>
       <p:ext uri="{BB962C8B-B14F-4D97-AF65-F5344CB8AC3E}">
-        <p14:creationId xmlns:p14="http://schemas.microsoft.com/office/powerpoint/2010/main" val="3903981959"/>
+        <p14:creationId xmlns:p14="http://schemas.microsoft.com/office/powerpoint/2010/main" val="421951618"/>
       </p:ext>
     </p:extLst>
   </p:cSld>
@@ -7467,6 +7577,467 @@
   <p:cSld>
     <p:spTree>
       <p:nvGrpSpPr>
+        <p:cNvPr id="1" name="Shape 219"/>
+        <p:cNvGrpSpPr/>
+        <p:nvPr/>
+      </p:nvGrpSpPr>
+      <p:grpSpPr>
+        <a:xfrm>
+          <a:off x="0" y="0"/>
+          <a:ext cx="0" cy="0"/>
+          <a:chOff x="0" y="0"/>
+          <a:chExt cx="0" cy="0"/>
+        </a:xfrm>
+      </p:grpSpPr>
+      <p:sp>
+        <p:nvSpPr>
+          <p:cNvPr id="220" name="Google Shape;220;p26"/>
+          <p:cNvSpPr/>
+          <p:nvPr/>
+        </p:nvSpPr>
+        <p:spPr>
+          <a:xfrm>
+            <a:off x="6126162" y="5018087"/>
+            <a:ext cx="6600600" cy="1012200"/>
+          </a:xfrm>
+          <a:prstGeom prst="rect">
+            <a:avLst/>
+          </a:prstGeom>
+          <a:gradFill>
+            <a:gsLst>
+              <a:gs pos="0">
+                <a:srgbClr val="FFFFFF"/>
+              </a:gs>
+              <a:gs pos="100000">
+                <a:srgbClr val="5F616B"/>
+              </a:gs>
+            </a:gsLst>
+            <a:lin ang="10800025" scaled="0"/>
+          </a:gradFill>
+          <a:ln>
+            <a:noFill/>
+          </a:ln>
+        </p:spPr>
+        <p:txBody>
+          <a:bodyPr spcFirstLastPara="1" wrap="square" lIns="91425" tIns="91425" rIns="91425" bIns="91425" anchor="ctr" anchorCtr="0">
+            <a:noAutofit/>
+          </a:bodyPr>
+          <a:lstStyle/>
+          <a:p>
+            <a:endParaRPr/>
+          </a:p>
+        </p:txBody>
+      </p:sp>
+      <p:sp>
+        <p:nvSpPr>
+          <p:cNvPr id="221" name="Google Shape;221;p26"/>
+          <p:cNvSpPr txBox="1"/>
+          <p:nvPr/>
+        </p:nvSpPr>
+        <p:spPr>
+          <a:xfrm>
+            <a:off x="7030637" y="5093987"/>
+            <a:ext cx="5099100" cy="860400"/>
+          </a:xfrm>
+          <a:prstGeom prst="rect">
+            <a:avLst/>
+          </a:prstGeom>
+          <a:noFill/>
+          <a:ln>
+            <a:noFill/>
+          </a:ln>
+        </p:spPr>
+        <p:txBody>
+          <a:bodyPr spcFirstLastPara="1" wrap="square" lIns="91425" tIns="91425" rIns="91425" bIns="91425" anchor="t" anchorCtr="0">
+            <a:noAutofit/>
+          </a:bodyPr>
+          <a:lstStyle/>
+          <a:p>
+            <a:pPr>
+              <a:lnSpc>
+                <a:spcPct val="115000"/>
+              </a:lnSpc>
+            </a:pPr>
+            <a:r>
+              <a:rPr lang="en" sz="2000" b="1">
+                <a:solidFill>
+                  <a:srgbClr val="FFFFFF"/>
+                </a:solidFill>
+                <a:latin typeface="Comfortaa"/>
+                <a:ea typeface="Comfortaa"/>
+                <a:cs typeface="Comfortaa"/>
+                <a:sym typeface="Comfortaa"/>
+              </a:rPr>
+              <a:t>HARP</a:t>
+            </a:r>
+            <a:endParaRPr sz="2000" b="1">
+              <a:solidFill>
+                <a:srgbClr val="FFFFFF"/>
+              </a:solidFill>
+              <a:latin typeface="Comfortaa"/>
+              <a:ea typeface="Comfortaa"/>
+              <a:cs typeface="Comfortaa"/>
+              <a:sym typeface="Comfortaa"/>
+            </a:endParaRPr>
+          </a:p>
+          <a:p>
+            <a:pPr>
+              <a:lnSpc>
+                <a:spcPct val="115000"/>
+              </a:lnSpc>
+            </a:pPr>
+            <a:r>
+              <a:rPr lang="en" sz="2000" b="1">
+                <a:solidFill>
+                  <a:srgbClr val="FFFFFF"/>
+                </a:solidFill>
+                <a:latin typeface="Comfortaa"/>
+                <a:ea typeface="Comfortaa"/>
+                <a:cs typeface="Comfortaa"/>
+                <a:sym typeface="Comfortaa"/>
+              </a:rPr>
+              <a:t>Digital inputs</a:t>
+            </a:r>
+            <a:endParaRPr sz="2000" b="1">
+              <a:solidFill>
+                <a:srgbClr val="FFFFFF"/>
+              </a:solidFill>
+              <a:latin typeface="Comfortaa"/>
+              <a:ea typeface="Comfortaa"/>
+              <a:cs typeface="Comfortaa"/>
+              <a:sym typeface="Comfortaa"/>
+            </a:endParaRPr>
+          </a:p>
+          <a:p>
+            <a:pPr>
+              <a:lnSpc>
+                <a:spcPct val="115000"/>
+              </a:lnSpc>
+            </a:pPr>
+            <a:endParaRPr sz="2000">
+              <a:solidFill>
+                <a:srgbClr val="FFFFFF"/>
+              </a:solidFill>
+              <a:latin typeface="Comfortaa"/>
+              <a:ea typeface="Comfortaa"/>
+              <a:cs typeface="Comfortaa"/>
+              <a:sym typeface="Comfortaa"/>
+            </a:endParaRPr>
+          </a:p>
+        </p:txBody>
+      </p:sp>
+      <p:pic>
+        <p:nvPicPr>
+          <p:cNvPr id="222" name="Google Shape;222;p26"/>
+          <p:cNvPicPr preferRelativeResize="0"/>
+          <p:nvPr/>
+        </p:nvPicPr>
+        <p:blipFill>
+          <a:blip r:embed="rId3">
+            <a:alphaModFix/>
+          </a:blip>
+          <a:stretch>
+            <a:fillRect/>
+          </a:stretch>
+        </p:blipFill>
+        <p:spPr>
+          <a:xfrm>
+            <a:off x="6170237" y="5093987"/>
+            <a:ext cx="860400" cy="860400"/>
+          </a:xfrm>
+          <a:prstGeom prst="rect">
+            <a:avLst/>
+          </a:prstGeom>
+          <a:noFill/>
+          <a:ln>
+            <a:noFill/>
+          </a:ln>
+        </p:spPr>
+      </p:pic>
+      <p:pic>
+        <p:nvPicPr>
+          <p:cNvPr id="223" name="Google Shape;223;p26"/>
+          <p:cNvPicPr preferRelativeResize="0"/>
+          <p:nvPr/>
+        </p:nvPicPr>
+        <p:blipFill>
+          <a:blip r:embed="rId4">
+            <a:alphaModFix/>
+          </a:blip>
+          <a:stretch>
+            <a:fillRect/>
+          </a:stretch>
+        </p:blipFill>
+        <p:spPr>
+          <a:xfrm>
+            <a:off x="13638714" y="5214227"/>
+            <a:ext cx="1357225" cy="619925"/>
+          </a:xfrm>
+          <a:prstGeom prst="rect">
+            <a:avLst/>
+          </a:prstGeom>
+          <a:noFill/>
+          <a:ln>
+            <a:noFill/>
+          </a:ln>
+        </p:spPr>
+      </p:pic>
+      <p:pic>
+        <p:nvPicPr>
+          <p:cNvPr id="224" name="Google Shape;224;p26"/>
+          <p:cNvPicPr preferRelativeResize="0"/>
+          <p:nvPr/>
+        </p:nvPicPr>
+        <p:blipFill>
+          <a:blip r:embed="rId5">
+            <a:alphaModFix/>
+          </a:blip>
+          <a:stretch>
+            <a:fillRect/>
+          </a:stretch>
+        </p:blipFill>
+        <p:spPr>
+          <a:xfrm>
+            <a:off x="9396664" y="6418162"/>
+            <a:ext cx="2551871" cy="2350402"/>
+          </a:xfrm>
+          <a:prstGeom prst="rect">
+            <a:avLst/>
+          </a:prstGeom>
+          <a:noFill/>
+          <a:ln>
+            <a:noFill/>
+          </a:ln>
+        </p:spPr>
+      </p:pic>
+      <p:pic>
+        <p:nvPicPr>
+          <p:cNvPr id="225" name="Google Shape;225;p26"/>
+          <p:cNvPicPr preferRelativeResize="0"/>
+          <p:nvPr/>
+        </p:nvPicPr>
+        <p:blipFill>
+          <a:blip r:embed="rId6">
+            <a:alphaModFix/>
+          </a:blip>
+          <a:stretch>
+            <a:fillRect/>
+          </a:stretch>
+        </p:blipFill>
+        <p:spPr>
+          <a:xfrm>
+            <a:off x="12557265" y="6191935"/>
+            <a:ext cx="1357225" cy="1327330"/>
+          </a:xfrm>
+          <a:prstGeom prst="rect">
+            <a:avLst/>
+          </a:prstGeom>
+          <a:noFill/>
+          <a:ln>
+            <a:noFill/>
+          </a:ln>
+        </p:spPr>
+      </p:pic>
+      <p:sp>
+        <p:nvSpPr>
+          <p:cNvPr id="226" name="Google Shape;226;p26"/>
+          <p:cNvSpPr/>
+          <p:nvPr/>
+        </p:nvSpPr>
+        <p:spPr>
+          <a:xfrm>
+            <a:off x="11433689" y="7124862"/>
+            <a:ext cx="2205025" cy="1724850"/>
+          </a:xfrm>
+          <a:custGeom>
+            <a:avLst/>
+            <a:gdLst/>
+            <a:ahLst/>
+            <a:cxnLst/>
+            <a:rect l="l" t="t" r="r" b="b"/>
+            <a:pathLst>
+              <a:path w="130219" h="68994" extrusionOk="0">
+                <a:moveTo>
+                  <a:pt x="0" y="61681"/>
+                </a:moveTo>
+                <a:lnTo>
+                  <a:pt x="0" y="68994"/>
+                </a:lnTo>
+                <a:lnTo>
+                  <a:pt x="130219" y="68994"/>
+                </a:lnTo>
+                <a:lnTo>
+                  <a:pt x="129245" y="0"/>
+                </a:lnTo>
+              </a:path>
+            </a:pathLst>
+          </a:custGeom>
+          <a:noFill/>
+          <a:ln w="28575" cap="flat" cmpd="sng">
+            <a:solidFill>
+              <a:srgbClr val="FF0000"/>
+            </a:solidFill>
+            <a:prstDash val="solid"/>
+            <a:round/>
+            <a:headEnd type="none" w="med" len="med"/>
+            <a:tailEnd type="none" w="med" len="med"/>
+          </a:ln>
+        </p:spPr>
+      </p:sp>
+      <p:sp>
+        <p:nvSpPr>
+          <p:cNvPr id="227" name="Google Shape;227;p26"/>
+          <p:cNvSpPr/>
+          <p:nvPr/>
+        </p:nvSpPr>
+        <p:spPr>
+          <a:xfrm>
+            <a:off x="11700113" y="7051737"/>
+            <a:ext cx="1162455" cy="602546"/>
+          </a:xfrm>
+          <a:custGeom>
+            <a:avLst/>
+            <a:gdLst/>
+            <a:ahLst/>
+            <a:cxnLst/>
+            <a:rect l="l" t="t" r="r" b="b"/>
+            <a:pathLst>
+              <a:path w="89461" h="24620" extrusionOk="0">
+                <a:moveTo>
+                  <a:pt x="32" y="24620"/>
+                </a:moveTo>
+                <a:lnTo>
+                  <a:pt x="0" y="24542"/>
+                </a:lnTo>
+                <a:lnTo>
+                  <a:pt x="89461" y="24542"/>
+                </a:lnTo>
+                <a:lnTo>
+                  <a:pt x="89024" y="0"/>
+                </a:lnTo>
+              </a:path>
+            </a:pathLst>
+          </a:custGeom>
+          <a:noFill/>
+          <a:ln w="28575" cap="flat" cmpd="sng">
+            <a:solidFill>
+              <a:srgbClr val="FFC000"/>
+            </a:solidFill>
+            <a:prstDash val="solid"/>
+            <a:round/>
+            <a:headEnd type="none" w="med" len="med"/>
+            <a:tailEnd type="none" w="med" len="med"/>
+          </a:ln>
+        </p:spPr>
+      </p:sp>
+      <p:sp>
+        <p:nvSpPr>
+          <p:cNvPr id="228" name="Google Shape;228;p26"/>
+          <p:cNvSpPr/>
+          <p:nvPr/>
+        </p:nvSpPr>
+        <p:spPr>
+          <a:xfrm>
+            <a:off x="11300425" y="7555612"/>
+            <a:ext cx="467100" cy="181200"/>
+          </a:xfrm>
+          <a:prstGeom prst="rect">
+            <a:avLst/>
+          </a:prstGeom>
+          <a:noFill/>
+          <a:ln w="28575" cap="flat" cmpd="sng">
+            <a:solidFill>
+              <a:srgbClr val="DAC000"/>
+            </a:solidFill>
+            <a:prstDash val="solid"/>
+            <a:round/>
+            <a:headEnd type="none" w="sm" len="sm"/>
+            <a:tailEnd type="none" w="sm" len="sm"/>
+          </a:ln>
+        </p:spPr>
+        <p:txBody>
+          <a:bodyPr spcFirstLastPara="1" wrap="square" lIns="91425" tIns="91425" rIns="91425" bIns="91425" anchor="ctr" anchorCtr="0">
+            <a:noAutofit/>
+          </a:bodyPr>
+          <a:lstStyle/>
+          <a:p>
+            <a:pPr algn="ctr"/>
+            <a:endParaRPr>
+              <a:solidFill>
+                <a:srgbClr val="DAC000"/>
+              </a:solidFill>
+            </a:endParaRPr>
+          </a:p>
+        </p:txBody>
+      </p:sp>
+      <p:sp>
+        <p:nvSpPr>
+          <p:cNvPr id="229" name="Google Shape;229;p26"/>
+          <p:cNvSpPr txBox="1"/>
+          <p:nvPr/>
+        </p:nvSpPr>
+        <p:spPr>
+          <a:xfrm>
+            <a:off x="11615837" y="7681887"/>
+            <a:ext cx="572700" cy="369300"/>
+          </a:xfrm>
+          <a:prstGeom prst="rect">
+            <a:avLst/>
+          </a:prstGeom>
+          <a:noFill/>
+          <a:ln>
+            <a:noFill/>
+          </a:ln>
+        </p:spPr>
+        <p:txBody>
+          <a:bodyPr spcFirstLastPara="1" wrap="square" lIns="91425" tIns="91425" rIns="91425" bIns="91425" anchor="t" anchorCtr="0">
+            <a:spAutoFit/>
+          </a:bodyPr>
+          <a:lstStyle/>
+          <a:p>
+            <a:pPr algn="ctr"/>
+            <a:r>
+              <a:rPr lang="en" sz="1200" b="1" dirty="0">
+                <a:solidFill>
+                  <a:srgbClr val="C27BA0"/>
+                </a:solidFill>
+                <a:latin typeface="Comfortaa"/>
+                <a:ea typeface="Comfortaa"/>
+                <a:cs typeface="Comfortaa"/>
+                <a:sym typeface="Comfortaa"/>
+              </a:rPr>
+              <a:t>DI3 </a:t>
+            </a:r>
+            <a:endParaRPr sz="1200" b="1" dirty="0">
+              <a:solidFill>
+                <a:srgbClr val="C27BA0"/>
+              </a:solidFill>
+              <a:latin typeface="Comfortaa"/>
+              <a:ea typeface="Comfortaa"/>
+              <a:cs typeface="Comfortaa"/>
+              <a:sym typeface="Comfortaa"/>
+            </a:endParaRPr>
+          </a:p>
+        </p:txBody>
+      </p:sp>
+    </p:spTree>
+    <p:extLst>
+      <p:ext uri="{BB962C8B-B14F-4D97-AF65-F5344CB8AC3E}">
+        <p14:creationId xmlns:p14="http://schemas.microsoft.com/office/powerpoint/2010/main" val="759428788"/>
+      </p:ext>
+    </p:extLst>
+  </p:cSld>
+  <p:clrMapOvr>
+    <a:masterClrMapping/>
+  </p:clrMapOvr>
+</p:sld>
+</file>
+
+<file path=ppt/slides/slide11.xml><?xml version="1.0" encoding="utf-8"?>
+<p:sld xmlns:a="http://schemas.openxmlformats.org/drawingml/2006/main" xmlns:r="http://schemas.openxmlformats.org/officeDocument/2006/relationships" xmlns:p="http://schemas.openxmlformats.org/presentationml/2006/main">
+  <p:cSld>
+    <p:spTree>
+      <p:nvGrpSpPr>
         <p:cNvPr id="1" name="Shape 274"/>
         <p:cNvGrpSpPr/>
         <p:nvPr/>
@@ -8778,7 +9349,7 @@
 </p:sld>
 </file>
 
-<file path=ppt/slides/slide11.xml><?xml version="1.0" encoding="utf-8"?>
+<file path=ppt/slides/slide12.xml><?xml version="1.0" encoding="utf-8"?>
 <p:sld xmlns:a="http://schemas.openxmlformats.org/drawingml/2006/main" xmlns:r="http://schemas.openxmlformats.org/officeDocument/2006/relationships" xmlns:p="http://schemas.openxmlformats.org/presentationml/2006/main">
   <p:cSld>
     <p:spTree>
@@ -9579,7 +10150,7 @@
 </p:sld>
 </file>
 
-<file path=ppt/slides/slide12.xml><?xml version="1.0" encoding="utf-8"?>
+<file path=ppt/slides/slide13.xml><?xml version="1.0" encoding="utf-8"?>
 <p:sld xmlns:a="http://schemas.openxmlformats.org/drawingml/2006/main" xmlns:r="http://schemas.openxmlformats.org/officeDocument/2006/relationships" xmlns:p="http://schemas.openxmlformats.org/presentationml/2006/main">
   <p:cSld>
     <p:spTree>
@@ -10364,7 +10935,7 @@
 </p:sld>
 </file>
 
-<file path=ppt/slides/slide13.xml><?xml version="1.0" encoding="utf-8"?>
+<file path=ppt/slides/slide14.xml><?xml version="1.0" encoding="utf-8"?>
 <p:sld xmlns:a="http://schemas.openxmlformats.org/drawingml/2006/main" xmlns:r="http://schemas.openxmlformats.org/officeDocument/2006/relationships" xmlns:p="http://schemas.openxmlformats.org/presentationml/2006/main">
   <p:cSld>
     <p:spTree>
@@ -10878,7 +11449,7 @@
 </p:sld>
 </file>
 
-<file path=ppt/slides/slide14.xml><?xml version="1.0" encoding="utf-8"?>
+<file path=ppt/slides/slide15.xml><?xml version="1.0" encoding="utf-8"?>
 <p:sld xmlns:a="http://schemas.openxmlformats.org/drawingml/2006/main" xmlns:r="http://schemas.openxmlformats.org/officeDocument/2006/relationships" xmlns:p="http://schemas.openxmlformats.org/presentationml/2006/main">
   <p:cSld>
     <p:spTree>
@@ -13996,10 +14567,10 @@
       </p:grpSpPr>
       <p:grpSp>
         <p:nvGrpSpPr>
-          <p:cNvPr id="199" name="Group 198">
+          <p:cNvPr id="46" name="Group 45">
             <a:extLst>
               <a:ext uri="{FF2B5EF4-FFF2-40B4-BE49-F238E27FC236}">
-                <a16:creationId xmlns:a16="http://schemas.microsoft.com/office/drawing/2014/main" id="{A5C31640-0B47-D38D-6FD2-53529011BF8D}"/>
+                <a16:creationId xmlns:a16="http://schemas.microsoft.com/office/drawing/2014/main" id="{D2735D67-B12E-92C8-5B8F-5E899C7C2D0D}"/>
               </a:ext>
             </a:extLst>
           </p:cNvPr>
@@ -14008,10 +14579,10 @@
         </p:nvGrpSpPr>
         <p:grpSpPr>
           <a:xfrm>
-            <a:off x="316993" y="315315"/>
-            <a:ext cx="15653476" cy="14173195"/>
-            <a:chOff x="316993" y="315315"/>
-            <a:chExt cx="15653476" cy="14173195"/>
+            <a:off x="359855" y="315315"/>
+            <a:ext cx="16085058" cy="14173195"/>
+            <a:chOff x="359855" y="315315"/>
+            <a:chExt cx="16085058" cy="14173195"/>
           </a:xfrm>
         </p:grpSpPr>
         <p:sp>
@@ -14028,8 +14599,8 @@
           </p:nvSpPr>
           <p:spPr>
             <a:xfrm>
-              <a:off x="316993" y="315315"/>
-              <a:ext cx="15653476" cy="14173195"/>
+              <a:off x="359855" y="315315"/>
+              <a:ext cx="16085058" cy="14173195"/>
             </a:xfrm>
             <a:prstGeom prst="rect">
               <a:avLst/>
@@ -14066,124 +14637,98 @@
             </a:p>
           </p:txBody>
         </p:sp>
-        <p:grpSp>
-          <p:nvGrpSpPr>
-            <p:cNvPr id="196" name="Group 195">
+        <p:pic>
+          <p:nvPicPr>
+            <p:cNvPr id="2" name="Google Shape;225;p26">
               <a:extLst>
                 <a:ext uri="{FF2B5EF4-FFF2-40B4-BE49-F238E27FC236}">
-                  <a16:creationId xmlns:a16="http://schemas.microsoft.com/office/drawing/2014/main" id="{B828AA75-CD65-7FC0-1660-4779D2310F9C}"/>
+                  <a16:creationId xmlns:a16="http://schemas.microsoft.com/office/drawing/2014/main" id="{DC4C9C09-9D74-F137-A0D0-9CD59D51F398}"/>
                 </a:ext>
               </a:extLst>
             </p:cNvPr>
-            <p:cNvGrpSpPr/>
+            <p:cNvPicPr preferRelativeResize="0"/>
             <p:nvPr/>
-          </p:nvGrpSpPr>
-          <p:grpSpPr>
+          </p:nvPicPr>
+          <p:blipFill>
+            <a:blip r:embed="rId3">
+              <a:alphaModFix/>
+            </a:blip>
+            <a:stretch>
+              <a:fillRect/>
+            </a:stretch>
+          </p:blipFill>
+          <p:spPr>
             <a:xfrm>
-              <a:off x="522733" y="509603"/>
-              <a:ext cx="15131465" cy="12861111"/>
-              <a:chOff x="522733" y="194288"/>
-              <a:chExt cx="15131465" cy="12861111"/>
+              <a:off x="12073841" y="5548902"/>
+              <a:ext cx="4087218" cy="3997191"/>
             </a:xfrm>
-          </p:grpSpPr>
-          <p:pic>
-            <p:nvPicPr>
-              <p:cNvPr id="7" name="Picture 6">
-                <a:extLst>
-                  <a:ext uri="{FF2B5EF4-FFF2-40B4-BE49-F238E27FC236}">
-                    <a16:creationId xmlns:a16="http://schemas.microsoft.com/office/drawing/2014/main" id="{78C9D4C3-C4D6-028D-E12E-6CDD382D163C}"/>
-                  </a:ext>
-                </a:extLst>
-              </p:cNvPr>
-              <p:cNvPicPr>
-                <a:picLocks noChangeAspect="1"/>
-              </p:cNvPicPr>
-              <p:nvPr/>
-            </p:nvPicPr>
-            <p:blipFill rotWithShape="1">
-              <a:blip r:embed="rId3"/>
-              <a:srcRect l="10161" r="38058"/>
-              <a:stretch/>
-            </p:blipFill>
-            <p:spPr>
-              <a:xfrm>
-                <a:off x="12556426" y="3964794"/>
-                <a:ext cx="3097772" cy="5982520"/>
-              </a:xfrm>
-              <a:prstGeom prst="rect">
-                <a:avLst/>
-              </a:prstGeom>
-            </p:spPr>
-          </p:pic>
-          <p:pic>
-            <p:nvPicPr>
-              <p:cNvPr id="197" name="Google Shape;197;p24"/>
-              <p:cNvPicPr preferRelativeResize="0"/>
-              <p:nvPr/>
-            </p:nvPicPr>
-            <p:blipFill>
-              <a:blip r:embed="rId4">
-                <a:alphaModFix/>
-              </a:blip>
-              <a:stretch>
-                <a:fillRect/>
-              </a:stretch>
-            </p:blipFill>
-            <p:spPr>
-              <a:xfrm>
-                <a:off x="522733" y="194288"/>
-                <a:ext cx="11499204" cy="10591348"/>
-              </a:xfrm>
-              <a:prstGeom prst="rect">
-                <a:avLst/>
-              </a:prstGeom>
+            <a:prstGeom prst="rect">
+              <a:avLst/>
+            </a:prstGeom>
+            <a:noFill/>
+            <a:ln>
               <a:noFill/>
-              <a:ln>
-                <a:noFill/>
-                <a:prstDash val="sysDot"/>
-              </a:ln>
-            </p:spPr>
-          </p:pic>
-          <p:sp>
-            <p:nvSpPr>
-              <p:cNvPr id="198" name="Google Shape;198;p24"/>
-              <p:cNvSpPr txBox="1"/>
-              <p:nvPr/>
-            </p:nvSpPr>
-            <p:spPr>
-              <a:xfrm>
-                <a:off x="4570865" y="10389711"/>
-                <a:ext cx="1420511" cy="677078"/>
-              </a:xfrm>
-              <a:prstGeom prst="rect">
-                <a:avLst/>
-              </a:prstGeom>
+            </a:ln>
+          </p:spPr>
+        </p:pic>
+        <p:pic>
+          <p:nvPicPr>
+            <p:cNvPr id="197" name="Google Shape;197;p24"/>
+            <p:cNvPicPr preferRelativeResize="0"/>
+            <p:nvPr/>
+          </p:nvPicPr>
+          <p:blipFill>
+            <a:blip r:embed="rId4">
+              <a:alphaModFix/>
+            </a:blip>
+            <a:stretch>
+              <a:fillRect/>
+            </a:stretch>
+          </p:blipFill>
+          <p:spPr>
+            <a:xfrm>
+              <a:off x="574637" y="509603"/>
+              <a:ext cx="11499204" cy="10591348"/>
+            </a:xfrm>
+            <a:prstGeom prst="rect">
+              <a:avLst/>
+            </a:prstGeom>
+            <a:noFill/>
+            <a:ln>
               <a:noFill/>
-              <a:ln>
-                <a:noFill/>
-                <a:prstDash val="sysDot"/>
-              </a:ln>
-            </p:spPr>
-            <p:txBody>
-              <a:bodyPr spcFirstLastPara="1" wrap="square" lIns="91425" tIns="91425" rIns="91425" bIns="91425" anchor="t" anchorCtr="0">
-                <a:spAutoFit/>
-              </a:bodyPr>
-              <a:lstStyle/>
-              <a:p>
-                <a:pPr algn="ctr"/>
-                <a:r>
-                  <a:rPr lang="en" sz="3200" b="1" dirty="0">
-                    <a:solidFill>
-                      <a:srgbClr val="DAC000"/>
-                    </a:solidFill>
-                    <a:latin typeface="Comfortaa"/>
-                    <a:ea typeface="Comfortaa"/>
-                    <a:cs typeface="Comfortaa"/>
-                    <a:sym typeface="Comfortaa"/>
-                  </a:rPr>
-                  <a:t>Port2</a:t>
-                </a:r>
-                <a:endParaRPr sz="3200" b="1" dirty="0">
+              <a:prstDash val="sysDot"/>
+            </a:ln>
+          </p:spPr>
+        </p:pic>
+        <p:sp>
+          <p:nvSpPr>
+            <p:cNvPr id="198" name="Google Shape;198;p24"/>
+            <p:cNvSpPr txBox="1"/>
+            <p:nvPr/>
+          </p:nvSpPr>
+          <p:spPr>
+            <a:xfrm>
+              <a:off x="747421" y="10741586"/>
+              <a:ext cx="1420511" cy="677078"/>
+            </a:xfrm>
+            <a:prstGeom prst="rect">
+              <a:avLst/>
+            </a:prstGeom>
+            <a:noFill/>
+            <a:ln>
+              <a:noFill/>
+              <a:prstDash val="sysDot"/>
+            </a:ln>
+          </p:spPr>
+          <p:txBody>
+            <a:bodyPr spcFirstLastPara="1" wrap="square" lIns="91425" tIns="91425" rIns="91425" bIns="91425" anchor="t" anchorCtr="0">
+              <a:spAutoFit/>
+            </a:bodyPr>
+            <a:lstStyle/>
+            <a:p>
+              <a:pPr algn="ctr"/>
+              <a:r>
+                <a:rPr lang="en" sz="3200" b="1" dirty="0">
                   <a:solidFill>
                     <a:srgbClr val="DAC000"/>
                   </a:solidFill>
@@ -14191,944 +14736,925 @@
                   <a:ea typeface="Comfortaa"/>
                   <a:cs typeface="Comfortaa"/>
                   <a:sym typeface="Comfortaa"/>
-                </a:endParaRPr>
-              </a:p>
-            </p:txBody>
-          </p:sp>
-          <p:pic>
-            <p:nvPicPr>
-              <p:cNvPr id="22" name="Picture 21">
-                <a:extLst>
-                  <a:ext uri="{FF2B5EF4-FFF2-40B4-BE49-F238E27FC236}">
-                    <a16:creationId xmlns:a16="http://schemas.microsoft.com/office/drawing/2014/main" id="{5ABC6090-6E77-44DA-2E3E-6DAF471FA58D}"/>
-                  </a:ext>
-                </a:extLst>
-              </p:cNvPr>
-              <p:cNvPicPr>
-                <a:picLocks noChangeAspect="1"/>
-              </p:cNvPicPr>
-              <p:nvPr/>
-            </p:nvPicPr>
-            <p:blipFill rotWithShape="1">
-              <a:blip r:embed="rId5"/>
-              <a:srcRect l="12808" r="52093" b="27587"/>
-              <a:stretch/>
-            </p:blipFill>
-            <p:spPr>
-              <a:xfrm>
-                <a:off x="6149485" y="10563612"/>
-                <a:ext cx="1713049" cy="2491787"/>
-              </a:xfrm>
-              <a:prstGeom prst="rect">
-                <a:avLst/>
-              </a:prstGeom>
-            </p:spPr>
-          </p:pic>
-          <p:sp>
-            <p:nvSpPr>
-              <p:cNvPr id="23" name="Oval 22">
-                <a:extLst>
-                  <a:ext uri="{FF2B5EF4-FFF2-40B4-BE49-F238E27FC236}">
-                    <a16:creationId xmlns:a16="http://schemas.microsoft.com/office/drawing/2014/main" id="{8BCCEE3C-DBBD-D34D-CA54-96C4150B50AD}"/>
-                  </a:ext>
-                </a:extLst>
-              </p:cNvPr>
-              <p:cNvSpPr/>
-              <p:nvPr/>
-            </p:nvSpPr>
-            <p:spPr>
-              <a:xfrm>
-                <a:off x="6472192" y="12952823"/>
-                <a:ext cx="89012" cy="89012"/>
-              </a:xfrm>
-              <a:prstGeom prst="ellipse">
-                <a:avLst/>
-              </a:prstGeom>
+                </a:rPr>
+                <a:t>Port0</a:t>
+              </a:r>
+              <a:endParaRPr sz="3200" b="1" dirty="0">
+                <a:solidFill>
+                  <a:srgbClr val="DAC000"/>
+                </a:solidFill>
+                <a:latin typeface="Comfortaa"/>
+                <a:ea typeface="Comfortaa"/>
+                <a:cs typeface="Comfortaa"/>
+                <a:sym typeface="Comfortaa"/>
+              </a:endParaRPr>
+            </a:p>
+          </p:txBody>
+        </p:sp>
+        <p:pic>
+          <p:nvPicPr>
+            <p:cNvPr id="22" name="Picture 21">
+              <a:extLst>
+                <a:ext uri="{FF2B5EF4-FFF2-40B4-BE49-F238E27FC236}">
+                  <a16:creationId xmlns:a16="http://schemas.microsoft.com/office/drawing/2014/main" id="{5ABC6090-6E77-44DA-2E3E-6DAF471FA58D}"/>
+                </a:ext>
+              </a:extLst>
+            </p:cNvPr>
+            <p:cNvPicPr>
+              <a:picLocks noChangeAspect="1"/>
+            </p:cNvPicPr>
+            <p:nvPr/>
+          </p:nvPicPr>
+          <p:blipFill rotWithShape="1">
+            <a:blip r:embed="rId5"/>
+            <a:srcRect l="12808" r="52093" b="27587"/>
+            <a:stretch/>
+          </p:blipFill>
+          <p:spPr>
+            <a:xfrm>
+              <a:off x="2340715" y="10780004"/>
+              <a:ext cx="1713049" cy="2491787"/>
+            </a:xfrm>
+            <a:prstGeom prst="rect">
+              <a:avLst/>
+            </a:prstGeom>
+          </p:spPr>
+        </p:pic>
+        <p:sp>
+          <p:nvSpPr>
+            <p:cNvPr id="23" name="Oval 22">
+              <a:extLst>
+                <a:ext uri="{FF2B5EF4-FFF2-40B4-BE49-F238E27FC236}">
+                  <a16:creationId xmlns:a16="http://schemas.microsoft.com/office/drawing/2014/main" id="{8BCCEE3C-DBBD-D34D-CA54-96C4150B50AD}"/>
+                </a:ext>
+              </a:extLst>
+            </p:cNvPr>
+            <p:cNvSpPr/>
+            <p:nvPr/>
+          </p:nvSpPr>
+          <p:spPr>
+            <a:xfrm>
+              <a:off x="6524096" y="13268138"/>
+              <a:ext cx="89012" cy="89012"/>
+            </a:xfrm>
+            <a:prstGeom prst="ellipse">
+              <a:avLst/>
+            </a:prstGeom>
+            <a:noFill/>
+            <a:ln>
               <a:noFill/>
-              <a:ln>
-                <a:noFill/>
-              </a:ln>
-            </p:spPr>
-            <p:style>
-              <a:lnRef idx="2">
+            </a:ln>
+          </p:spPr>
+          <p:style>
+            <a:lnRef idx="2">
+              <a:schemeClr val="accent1">
+                <a:shade val="15000"/>
+              </a:schemeClr>
+            </a:lnRef>
+            <a:fillRef idx="1">
+              <a:schemeClr val="accent1"/>
+            </a:fillRef>
+            <a:effectRef idx="0">
+              <a:schemeClr val="accent1"/>
+            </a:effectRef>
+            <a:fontRef idx="minor">
+              <a:schemeClr val="lt1"/>
+            </a:fontRef>
+          </p:style>
+          <p:txBody>
+            <a:bodyPr rtlCol="0" anchor="ctr"/>
+            <a:lstStyle/>
+            <a:p>
+              <a:pPr algn="ctr"/>
+              <a:endParaRPr lang="en-US"/>
+            </a:p>
+          </p:txBody>
+        </p:sp>
+        <p:sp>
+          <p:nvSpPr>
+            <p:cNvPr id="24" name="Oval 23">
+              <a:extLst>
+                <a:ext uri="{FF2B5EF4-FFF2-40B4-BE49-F238E27FC236}">
+                  <a16:creationId xmlns:a16="http://schemas.microsoft.com/office/drawing/2014/main" id="{23A6A2B2-43B0-0C24-FB22-C6ABC51DF95A}"/>
+                </a:ext>
+              </a:extLst>
+            </p:cNvPr>
+            <p:cNvSpPr/>
+            <p:nvPr/>
+          </p:nvSpPr>
+          <p:spPr>
+            <a:xfrm>
+              <a:off x="6648409" y="13268138"/>
+              <a:ext cx="89012" cy="89012"/>
+            </a:xfrm>
+            <a:prstGeom prst="ellipse">
+              <a:avLst/>
+            </a:prstGeom>
+            <a:noFill/>
+            <a:ln>
+              <a:noFill/>
+            </a:ln>
+          </p:spPr>
+          <p:style>
+            <a:lnRef idx="2">
+              <a:schemeClr val="accent1">
+                <a:shade val="15000"/>
+              </a:schemeClr>
+            </a:lnRef>
+            <a:fillRef idx="1">
+              <a:schemeClr val="accent1"/>
+            </a:fillRef>
+            <a:effectRef idx="0">
+              <a:schemeClr val="accent1"/>
+            </a:effectRef>
+            <a:fontRef idx="minor">
+              <a:schemeClr val="lt1"/>
+            </a:fontRef>
+          </p:style>
+          <p:txBody>
+            <a:bodyPr rtlCol="0" anchor="ctr"/>
+            <a:lstStyle/>
+            <a:p>
+              <a:pPr algn="ctr"/>
+              <a:endParaRPr lang="en-US"/>
+            </a:p>
+          </p:txBody>
+        </p:sp>
+        <p:sp>
+          <p:nvSpPr>
+            <p:cNvPr id="25" name="Oval 24">
+              <a:extLst>
+                <a:ext uri="{FF2B5EF4-FFF2-40B4-BE49-F238E27FC236}">
+                  <a16:creationId xmlns:a16="http://schemas.microsoft.com/office/drawing/2014/main" id="{3D8973B0-0201-BF68-5C40-573D629D0465}"/>
+                </a:ext>
+              </a:extLst>
+            </p:cNvPr>
+            <p:cNvSpPr/>
+            <p:nvPr/>
+          </p:nvSpPr>
+          <p:spPr>
+            <a:xfrm>
+              <a:off x="6930438" y="13268138"/>
+              <a:ext cx="89012" cy="89012"/>
+            </a:xfrm>
+            <a:prstGeom prst="ellipse">
+              <a:avLst/>
+            </a:prstGeom>
+            <a:noFill/>
+            <a:ln>
+              <a:noFill/>
+            </a:ln>
+          </p:spPr>
+          <p:style>
+            <a:lnRef idx="2">
+              <a:schemeClr val="accent1">
+                <a:shade val="15000"/>
+              </a:schemeClr>
+            </a:lnRef>
+            <a:fillRef idx="1">
+              <a:schemeClr val="accent1"/>
+            </a:fillRef>
+            <a:effectRef idx="0">
+              <a:schemeClr val="accent1"/>
+            </a:effectRef>
+            <a:fontRef idx="minor">
+              <a:schemeClr val="lt1"/>
+            </a:fontRef>
+          </p:style>
+          <p:txBody>
+            <a:bodyPr rtlCol="0" anchor="ctr"/>
+            <a:lstStyle/>
+            <a:p>
+              <a:pPr algn="ctr"/>
+              <a:endParaRPr lang="en-US"/>
+            </a:p>
+          </p:txBody>
+        </p:sp>
+        <p:sp>
+          <p:nvSpPr>
+            <p:cNvPr id="26" name="Oval 25">
+              <a:extLst>
+                <a:ext uri="{FF2B5EF4-FFF2-40B4-BE49-F238E27FC236}">
+                  <a16:creationId xmlns:a16="http://schemas.microsoft.com/office/drawing/2014/main" id="{6A6366A5-C9A2-190E-83AB-1F22ED6F1FD5}"/>
+                </a:ext>
+              </a:extLst>
+            </p:cNvPr>
+            <p:cNvSpPr/>
+            <p:nvPr/>
+          </p:nvSpPr>
+          <p:spPr>
+            <a:xfrm>
+              <a:off x="7052976" y="13268138"/>
+              <a:ext cx="89012" cy="89012"/>
+            </a:xfrm>
+            <a:prstGeom prst="ellipse">
+              <a:avLst/>
+            </a:prstGeom>
+            <a:noFill/>
+            <a:ln>
+              <a:noFill/>
+            </a:ln>
+          </p:spPr>
+          <p:style>
+            <a:lnRef idx="2">
+              <a:schemeClr val="accent1">
+                <a:shade val="15000"/>
+              </a:schemeClr>
+            </a:lnRef>
+            <a:fillRef idx="1">
+              <a:schemeClr val="accent1"/>
+            </a:fillRef>
+            <a:effectRef idx="0">
+              <a:schemeClr val="accent1"/>
+            </a:effectRef>
+            <a:fontRef idx="minor">
+              <a:schemeClr val="lt1"/>
+            </a:fontRef>
+          </p:style>
+          <p:txBody>
+            <a:bodyPr rtlCol="0" anchor="ctr"/>
+            <a:lstStyle/>
+            <a:p>
+              <a:pPr algn="ctr"/>
+              <a:endParaRPr lang="en-US"/>
+            </a:p>
+          </p:txBody>
+        </p:sp>
+        <p:sp>
+          <p:nvSpPr>
+            <p:cNvPr id="27" name="Oval 26">
+              <a:extLst>
+                <a:ext uri="{FF2B5EF4-FFF2-40B4-BE49-F238E27FC236}">
+                  <a16:creationId xmlns:a16="http://schemas.microsoft.com/office/drawing/2014/main" id="{703AD329-CF63-9BDE-E216-AC077058CC92}"/>
+                </a:ext>
+              </a:extLst>
+            </p:cNvPr>
+            <p:cNvSpPr/>
+            <p:nvPr/>
+          </p:nvSpPr>
+          <p:spPr>
+            <a:xfrm>
+              <a:off x="13516498" y="9971637"/>
+              <a:ext cx="89012" cy="89012"/>
+            </a:xfrm>
+            <a:prstGeom prst="ellipse">
+              <a:avLst/>
+            </a:prstGeom>
+            <a:noFill/>
+            <a:ln>
+              <a:noFill/>
+            </a:ln>
+          </p:spPr>
+          <p:style>
+            <a:lnRef idx="2">
+              <a:schemeClr val="accent1">
+                <a:shade val="15000"/>
+              </a:schemeClr>
+            </a:lnRef>
+            <a:fillRef idx="1">
+              <a:schemeClr val="accent1"/>
+            </a:fillRef>
+            <a:effectRef idx="0">
+              <a:schemeClr val="accent1"/>
+            </a:effectRef>
+            <a:fontRef idx="minor">
+              <a:schemeClr val="lt1"/>
+            </a:fontRef>
+          </p:style>
+          <p:txBody>
+            <a:bodyPr rtlCol="0" anchor="ctr"/>
+            <a:lstStyle/>
+            <a:p>
+              <a:pPr algn="ctr"/>
+              <a:endParaRPr lang="en-US"/>
+            </a:p>
+          </p:txBody>
+        </p:sp>
+        <p:sp>
+          <p:nvSpPr>
+            <p:cNvPr id="31" name="Oval 30">
+              <a:extLst>
+                <a:ext uri="{FF2B5EF4-FFF2-40B4-BE49-F238E27FC236}">
+                  <a16:creationId xmlns:a16="http://schemas.microsoft.com/office/drawing/2014/main" id="{66C37D68-948F-219A-CFD0-301BED959199}"/>
+                </a:ext>
+              </a:extLst>
+            </p:cNvPr>
+            <p:cNvSpPr/>
+            <p:nvPr/>
+          </p:nvSpPr>
+          <p:spPr>
+            <a:xfrm>
+              <a:off x="13103047" y="9861445"/>
+              <a:ext cx="89012" cy="89012"/>
+            </a:xfrm>
+            <a:prstGeom prst="ellipse">
+              <a:avLst/>
+            </a:prstGeom>
+            <a:noFill/>
+            <a:ln>
+              <a:noFill/>
+            </a:ln>
+          </p:spPr>
+          <p:style>
+            <a:lnRef idx="2">
+              <a:schemeClr val="accent1">
+                <a:shade val="15000"/>
+              </a:schemeClr>
+            </a:lnRef>
+            <a:fillRef idx="1">
+              <a:schemeClr val="accent1"/>
+            </a:fillRef>
+            <a:effectRef idx="0">
+              <a:schemeClr val="accent1"/>
+            </a:effectRef>
+            <a:fontRef idx="minor">
+              <a:schemeClr val="lt1"/>
+            </a:fontRef>
+          </p:style>
+          <p:txBody>
+            <a:bodyPr rtlCol="0" anchor="ctr"/>
+            <a:lstStyle/>
+            <a:p>
+              <a:pPr algn="ctr"/>
+              <a:endParaRPr lang="en-US"/>
+            </a:p>
+          </p:txBody>
+        </p:sp>
+        <p:sp>
+          <p:nvSpPr>
+            <p:cNvPr id="32" name="Oval 31">
+              <a:extLst>
+                <a:ext uri="{FF2B5EF4-FFF2-40B4-BE49-F238E27FC236}">
+                  <a16:creationId xmlns:a16="http://schemas.microsoft.com/office/drawing/2014/main" id="{185E5B51-9EA6-0168-4C34-8FDC2EF00878}"/>
+                </a:ext>
+              </a:extLst>
+            </p:cNvPr>
+            <p:cNvSpPr/>
+            <p:nvPr/>
+          </p:nvSpPr>
+          <p:spPr>
+            <a:xfrm>
+              <a:off x="13741656" y="10032938"/>
+              <a:ext cx="89012" cy="89012"/>
+            </a:xfrm>
+            <a:prstGeom prst="ellipse">
+              <a:avLst/>
+            </a:prstGeom>
+            <a:noFill/>
+            <a:ln>
+              <a:noFill/>
+            </a:ln>
+          </p:spPr>
+          <p:style>
+            <a:lnRef idx="2">
+              <a:schemeClr val="accent1">
+                <a:shade val="15000"/>
+              </a:schemeClr>
+            </a:lnRef>
+            <a:fillRef idx="1">
+              <a:schemeClr val="accent1"/>
+            </a:fillRef>
+            <a:effectRef idx="0">
+              <a:schemeClr val="accent1"/>
+            </a:effectRef>
+            <a:fontRef idx="minor">
+              <a:schemeClr val="lt1"/>
+            </a:fontRef>
+          </p:style>
+          <p:txBody>
+            <a:bodyPr rtlCol="0" anchor="ctr"/>
+            <a:lstStyle/>
+            <a:p>
+              <a:pPr algn="ctr"/>
+              <a:endParaRPr lang="en-US"/>
+            </a:p>
+          </p:txBody>
+        </p:sp>
+        <p:sp>
+          <p:nvSpPr>
+            <p:cNvPr id="33" name="Oval 32">
+              <a:extLst>
+                <a:ext uri="{FF2B5EF4-FFF2-40B4-BE49-F238E27FC236}">
+                  <a16:creationId xmlns:a16="http://schemas.microsoft.com/office/drawing/2014/main" id="{B1F6F8DF-5617-A57A-E4FE-12A7223DB748}"/>
+                </a:ext>
+              </a:extLst>
+            </p:cNvPr>
+            <p:cNvSpPr/>
+            <p:nvPr/>
+          </p:nvSpPr>
+          <p:spPr>
+            <a:xfrm>
+              <a:off x="13938640" y="10094475"/>
+              <a:ext cx="89012" cy="89012"/>
+            </a:xfrm>
+            <a:prstGeom prst="ellipse">
+              <a:avLst/>
+            </a:prstGeom>
+            <a:noFill/>
+            <a:ln>
+              <a:noFill/>
+            </a:ln>
+          </p:spPr>
+          <p:style>
+            <a:lnRef idx="2">
+              <a:schemeClr val="accent1">
+                <a:shade val="15000"/>
+              </a:schemeClr>
+            </a:lnRef>
+            <a:fillRef idx="1">
+              <a:schemeClr val="accent1"/>
+            </a:fillRef>
+            <a:effectRef idx="0">
+              <a:schemeClr val="accent1"/>
+            </a:effectRef>
+            <a:fontRef idx="minor">
+              <a:schemeClr val="lt1"/>
+            </a:fontRef>
+          </p:style>
+          <p:txBody>
+            <a:bodyPr rtlCol="0" anchor="ctr"/>
+            <a:lstStyle/>
+            <a:p>
+              <a:pPr algn="ctr"/>
+              <a:endParaRPr lang="en-US"/>
+            </a:p>
+          </p:txBody>
+        </p:sp>
+        <p:cxnSp>
+          <p:nvCxnSpPr>
+            <p:cNvPr id="38" name="Connector: Elbow 37">
+              <a:extLst>
+                <a:ext uri="{FF2B5EF4-FFF2-40B4-BE49-F238E27FC236}">
+                  <a16:creationId xmlns:a16="http://schemas.microsoft.com/office/drawing/2014/main" id="{B116D393-D896-DC98-0A5F-443D2C4E22A2}"/>
+                </a:ext>
+              </a:extLst>
+            </p:cNvPr>
+            <p:cNvCxnSpPr>
+              <a:cxnSpLocks/>
+              <a:stCxn id="21" idx="4"/>
+              <a:endCxn id="37" idx="4"/>
+            </p:cNvCxnSpPr>
+            <p:nvPr/>
+          </p:nvCxnSpPr>
+          <p:spPr>
+            <a:xfrm rot="5400000">
+              <a:off x="6825655" y="4868076"/>
+              <a:ext cx="4407503" cy="12435476"/>
+            </a:xfrm>
+            <a:prstGeom prst="bentConnector3">
+              <a:avLst>
+                <a:gd name="adj1" fmla="val 111994"/>
+              </a:avLst>
+            </a:prstGeom>
+            <a:ln w="57150">
+              <a:solidFill>
+                <a:srgbClr val="F68712"/>
+              </a:solidFill>
+            </a:ln>
+          </p:spPr>
+          <p:style>
+            <a:lnRef idx="1">
+              <a:schemeClr val="accent1"/>
+            </a:lnRef>
+            <a:fillRef idx="0">
+              <a:schemeClr val="accent1"/>
+            </a:fillRef>
+            <a:effectRef idx="0">
+              <a:schemeClr val="accent1"/>
+            </a:effectRef>
+            <a:fontRef idx="minor">
+              <a:schemeClr val="tx1"/>
+            </a:fontRef>
+          </p:style>
+        </p:cxnSp>
+        <p:cxnSp>
+          <p:nvCxnSpPr>
+            <p:cNvPr id="54" name="Connector: Elbow 53">
+              <a:extLst>
+                <a:ext uri="{FF2B5EF4-FFF2-40B4-BE49-F238E27FC236}">
+                  <a16:creationId xmlns:a16="http://schemas.microsoft.com/office/drawing/2014/main" id="{B12D968F-3141-840B-4609-B18FE5096DE8}"/>
+                </a:ext>
+              </a:extLst>
+            </p:cNvPr>
+            <p:cNvCxnSpPr>
+              <a:cxnSpLocks/>
+              <a:stCxn id="20" idx="4"/>
+              <a:endCxn id="39" idx="4"/>
+            </p:cNvCxnSpPr>
+            <p:nvPr/>
+          </p:nvCxnSpPr>
+          <p:spPr>
+            <a:xfrm rot="5400000">
+              <a:off x="5728096" y="6041501"/>
+              <a:ext cx="4797361" cy="9735528"/>
+            </a:xfrm>
+            <a:prstGeom prst="bentConnector3">
+              <a:avLst>
+                <a:gd name="adj1" fmla="val 107148"/>
+              </a:avLst>
+            </a:prstGeom>
+            <a:ln w="57150">
+              <a:solidFill>
                 <a:schemeClr val="accent1">
-                  <a:shade val="15000"/>
+                  <a:lumMod val="75000"/>
                 </a:schemeClr>
-              </a:lnRef>
-              <a:fillRef idx="1">
-                <a:schemeClr val="accent1"/>
-              </a:fillRef>
-              <a:effectRef idx="0">
-                <a:schemeClr val="accent1"/>
-              </a:effectRef>
-              <a:fontRef idx="minor">
-                <a:schemeClr val="lt1"/>
-              </a:fontRef>
-            </p:style>
-            <p:txBody>
-              <a:bodyPr rtlCol="0" anchor="ctr"/>
-              <a:lstStyle/>
-              <a:p>
-                <a:pPr algn="ctr"/>
-                <a:endParaRPr lang="en-US"/>
-              </a:p>
-            </p:txBody>
-          </p:sp>
-          <p:sp>
-            <p:nvSpPr>
-              <p:cNvPr id="24" name="Oval 23">
-                <a:extLst>
-                  <a:ext uri="{FF2B5EF4-FFF2-40B4-BE49-F238E27FC236}">
-                    <a16:creationId xmlns:a16="http://schemas.microsoft.com/office/drawing/2014/main" id="{23A6A2B2-43B0-0C24-FB22-C6ABC51DF95A}"/>
-                  </a:ext>
-                </a:extLst>
-              </p:cNvPr>
-              <p:cNvSpPr/>
-              <p:nvPr/>
-            </p:nvSpPr>
-            <p:spPr>
-              <a:xfrm>
-                <a:off x="6596505" y="12952823"/>
-                <a:ext cx="89012" cy="89012"/>
-              </a:xfrm>
-              <a:prstGeom prst="ellipse">
-                <a:avLst/>
-              </a:prstGeom>
-              <a:noFill/>
-              <a:ln>
-                <a:noFill/>
-              </a:ln>
-            </p:spPr>
-            <p:style>
-              <a:lnRef idx="2">
-                <a:schemeClr val="accent1">
-                  <a:shade val="15000"/>
-                </a:schemeClr>
-              </a:lnRef>
-              <a:fillRef idx="1">
-                <a:schemeClr val="accent1"/>
-              </a:fillRef>
-              <a:effectRef idx="0">
-                <a:schemeClr val="accent1"/>
-              </a:effectRef>
-              <a:fontRef idx="minor">
-                <a:schemeClr val="lt1"/>
-              </a:fontRef>
-            </p:style>
-            <p:txBody>
-              <a:bodyPr rtlCol="0" anchor="ctr"/>
-              <a:lstStyle/>
-              <a:p>
-                <a:pPr algn="ctr"/>
-                <a:endParaRPr lang="en-US"/>
-              </a:p>
-            </p:txBody>
-          </p:sp>
-          <p:sp>
-            <p:nvSpPr>
-              <p:cNvPr id="25" name="Oval 24">
-                <a:extLst>
-                  <a:ext uri="{FF2B5EF4-FFF2-40B4-BE49-F238E27FC236}">
-                    <a16:creationId xmlns:a16="http://schemas.microsoft.com/office/drawing/2014/main" id="{3D8973B0-0201-BF68-5C40-573D629D0465}"/>
-                  </a:ext>
-                </a:extLst>
-              </p:cNvPr>
-              <p:cNvSpPr/>
-              <p:nvPr/>
-            </p:nvSpPr>
-            <p:spPr>
-              <a:xfrm>
-                <a:off x="6878534" y="12952823"/>
-                <a:ext cx="89012" cy="89012"/>
-              </a:xfrm>
-              <a:prstGeom prst="ellipse">
-                <a:avLst/>
-              </a:prstGeom>
-              <a:noFill/>
-              <a:ln>
-                <a:noFill/>
-              </a:ln>
-            </p:spPr>
-            <p:style>
-              <a:lnRef idx="2">
-                <a:schemeClr val="accent1">
-                  <a:shade val="15000"/>
-                </a:schemeClr>
-              </a:lnRef>
-              <a:fillRef idx="1">
-                <a:schemeClr val="accent1"/>
-              </a:fillRef>
-              <a:effectRef idx="0">
-                <a:schemeClr val="accent1"/>
-              </a:effectRef>
-              <a:fontRef idx="minor">
-                <a:schemeClr val="lt1"/>
-              </a:fontRef>
-            </p:style>
-            <p:txBody>
-              <a:bodyPr rtlCol="0" anchor="ctr"/>
-              <a:lstStyle/>
-              <a:p>
-                <a:pPr algn="ctr"/>
-                <a:endParaRPr lang="en-US"/>
-              </a:p>
-            </p:txBody>
-          </p:sp>
-          <p:sp>
-            <p:nvSpPr>
-              <p:cNvPr id="26" name="Oval 25">
-                <a:extLst>
-                  <a:ext uri="{FF2B5EF4-FFF2-40B4-BE49-F238E27FC236}">
-                    <a16:creationId xmlns:a16="http://schemas.microsoft.com/office/drawing/2014/main" id="{6A6366A5-C9A2-190E-83AB-1F22ED6F1FD5}"/>
-                  </a:ext>
-                </a:extLst>
-              </p:cNvPr>
-              <p:cNvSpPr/>
-              <p:nvPr/>
-            </p:nvSpPr>
-            <p:spPr>
-              <a:xfrm>
-                <a:off x="7001072" y="12952823"/>
-                <a:ext cx="89012" cy="89012"/>
-              </a:xfrm>
-              <a:prstGeom prst="ellipse">
-                <a:avLst/>
-              </a:prstGeom>
-              <a:noFill/>
-              <a:ln>
-                <a:noFill/>
-              </a:ln>
-            </p:spPr>
-            <p:style>
-              <a:lnRef idx="2">
-                <a:schemeClr val="accent1">
-                  <a:shade val="15000"/>
-                </a:schemeClr>
-              </a:lnRef>
-              <a:fillRef idx="1">
-                <a:schemeClr val="accent1"/>
-              </a:fillRef>
-              <a:effectRef idx="0">
-                <a:schemeClr val="accent1"/>
-              </a:effectRef>
-              <a:fontRef idx="minor">
-                <a:schemeClr val="lt1"/>
-              </a:fontRef>
-            </p:style>
-            <p:txBody>
-              <a:bodyPr rtlCol="0" anchor="ctr"/>
-              <a:lstStyle/>
-              <a:p>
-                <a:pPr algn="ctr"/>
-                <a:endParaRPr lang="en-US"/>
-              </a:p>
-            </p:txBody>
-          </p:sp>
-          <p:sp>
-            <p:nvSpPr>
-              <p:cNvPr id="27" name="Oval 26">
-                <a:extLst>
-                  <a:ext uri="{FF2B5EF4-FFF2-40B4-BE49-F238E27FC236}">
-                    <a16:creationId xmlns:a16="http://schemas.microsoft.com/office/drawing/2014/main" id="{703AD329-CF63-9BDE-E216-AC077058CC92}"/>
-                  </a:ext>
-                </a:extLst>
-              </p:cNvPr>
-              <p:cNvSpPr/>
-              <p:nvPr/>
-            </p:nvSpPr>
-            <p:spPr>
-              <a:xfrm>
-                <a:off x="13464594" y="9656322"/>
-                <a:ext cx="89012" cy="89012"/>
-              </a:xfrm>
-              <a:prstGeom prst="ellipse">
-                <a:avLst/>
-              </a:prstGeom>
-              <a:noFill/>
-              <a:ln>
-                <a:noFill/>
-              </a:ln>
-            </p:spPr>
-            <p:style>
-              <a:lnRef idx="2">
-                <a:schemeClr val="accent1">
-                  <a:shade val="15000"/>
-                </a:schemeClr>
-              </a:lnRef>
-              <a:fillRef idx="1">
-                <a:schemeClr val="accent1"/>
-              </a:fillRef>
-              <a:effectRef idx="0">
-                <a:schemeClr val="accent1"/>
-              </a:effectRef>
-              <a:fontRef idx="minor">
-                <a:schemeClr val="lt1"/>
-              </a:fontRef>
-            </p:style>
-            <p:txBody>
-              <a:bodyPr rtlCol="0" anchor="ctr"/>
-              <a:lstStyle/>
-              <a:p>
-                <a:pPr algn="ctr"/>
-                <a:endParaRPr lang="en-US"/>
-              </a:p>
-            </p:txBody>
-          </p:sp>
-          <p:sp>
-            <p:nvSpPr>
-              <p:cNvPr id="31" name="Oval 30">
-                <a:extLst>
-                  <a:ext uri="{FF2B5EF4-FFF2-40B4-BE49-F238E27FC236}">
-                    <a16:creationId xmlns:a16="http://schemas.microsoft.com/office/drawing/2014/main" id="{66C37D68-948F-219A-CFD0-301BED959199}"/>
-                  </a:ext>
-                </a:extLst>
-              </p:cNvPr>
-              <p:cNvSpPr/>
-              <p:nvPr/>
-            </p:nvSpPr>
-            <p:spPr>
-              <a:xfrm>
-                <a:off x="13051143" y="9546130"/>
-                <a:ext cx="89012" cy="89012"/>
-              </a:xfrm>
-              <a:prstGeom prst="ellipse">
-                <a:avLst/>
-              </a:prstGeom>
-              <a:noFill/>
-              <a:ln>
-                <a:noFill/>
-              </a:ln>
-            </p:spPr>
-            <p:style>
-              <a:lnRef idx="2">
-                <a:schemeClr val="accent1">
-                  <a:shade val="15000"/>
-                </a:schemeClr>
-              </a:lnRef>
-              <a:fillRef idx="1">
-                <a:schemeClr val="accent1"/>
-              </a:fillRef>
-              <a:effectRef idx="0">
-                <a:schemeClr val="accent1"/>
-              </a:effectRef>
-              <a:fontRef idx="minor">
-                <a:schemeClr val="lt1"/>
-              </a:fontRef>
-            </p:style>
-            <p:txBody>
-              <a:bodyPr rtlCol="0" anchor="ctr"/>
-              <a:lstStyle/>
-              <a:p>
-                <a:pPr algn="ctr"/>
-                <a:endParaRPr lang="en-US"/>
-              </a:p>
-            </p:txBody>
-          </p:sp>
-          <p:sp>
-            <p:nvSpPr>
-              <p:cNvPr id="32" name="Oval 31">
-                <a:extLst>
-                  <a:ext uri="{FF2B5EF4-FFF2-40B4-BE49-F238E27FC236}">
-                    <a16:creationId xmlns:a16="http://schemas.microsoft.com/office/drawing/2014/main" id="{185E5B51-9EA6-0168-4C34-8FDC2EF00878}"/>
-                  </a:ext>
-                </a:extLst>
-              </p:cNvPr>
-              <p:cNvSpPr/>
-              <p:nvPr/>
-            </p:nvSpPr>
-            <p:spPr>
-              <a:xfrm>
-                <a:off x="13689752" y="9717623"/>
-                <a:ext cx="89012" cy="89012"/>
-              </a:xfrm>
-              <a:prstGeom prst="ellipse">
-                <a:avLst/>
-              </a:prstGeom>
-              <a:noFill/>
-              <a:ln>
-                <a:noFill/>
-              </a:ln>
-            </p:spPr>
-            <p:style>
-              <a:lnRef idx="2">
-                <a:schemeClr val="accent1">
-                  <a:shade val="15000"/>
-                </a:schemeClr>
-              </a:lnRef>
-              <a:fillRef idx="1">
-                <a:schemeClr val="accent1"/>
-              </a:fillRef>
-              <a:effectRef idx="0">
-                <a:schemeClr val="accent1"/>
-              </a:effectRef>
-              <a:fontRef idx="minor">
-                <a:schemeClr val="lt1"/>
-              </a:fontRef>
-            </p:style>
-            <p:txBody>
-              <a:bodyPr rtlCol="0" anchor="ctr"/>
-              <a:lstStyle/>
-              <a:p>
-                <a:pPr algn="ctr"/>
-                <a:endParaRPr lang="en-US"/>
-              </a:p>
-            </p:txBody>
-          </p:sp>
-          <p:sp>
-            <p:nvSpPr>
-              <p:cNvPr id="33" name="Oval 32">
-                <a:extLst>
-                  <a:ext uri="{FF2B5EF4-FFF2-40B4-BE49-F238E27FC236}">
-                    <a16:creationId xmlns:a16="http://schemas.microsoft.com/office/drawing/2014/main" id="{B1F6F8DF-5617-A57A-E4FE-12A7223DB748}"/>
-                  </a:ext>
-                </a:extLst>
-              </p:cNvPr>
-              <p:cNvSpPr/>
-              <p:nvPr/>
-            </p:nvSpPr>
-            <p:spPr>
-              <a:xfrm>
-                <a:off x="13886736" y="9779160"/>
-                <a:ext cx="89012" cy="89012"/>
-              </a:xfrm>
-              <a:prstGeom prst="ellipse">
-                <a:avLst/>
-              </a:prstGeom>
-              <a:noFill/>
-              <a:ln>
-                <a:noFill/>
-              </a:ln>
-            </p:spPr>
-            <p:style>
-              <a:lnRef idx="2">
-                <a:schemeClr val="accent1">
-                  <a:shade val="15000"/>
-                </a:schemeClr>
-              </a:lnRef>
-              <a:fillRef idx="1">
-                <a:schemeClr val="accent1"/>
-              </a:fillRef>
-              <a:effectRef idx="0">
-                <a:schemeClr val="accent1"/>
-              </a:effectRef>
-              <a:fontRef idx="minor">
-                <a:schemeClr val="lt1"/>
-              </a:fontRef>
-            </p:style>
-            <p:txBody>
-              <a:bodyPr rtlCol="0" anchor="ctr"/>
-              <a:lstStyle/>
-              <a:p>
-                <a:pPr algn="ctr"/>
-                <a:endParaRPr lang="en-US"/>
-              </a:p>
-            </p:txBody>
-          </p:sp>
-          <p:cxnSp>
-            <p:nvCxnSpPr>
-              <p:cNvPr id="35" name="Connector: Elbow 34">
-                <a:extLst>
-                  <a:ext uri="{FF2B5EF4-FFF2-40B4-BE49-F238E27FC236}">
-                    <a16:creationId xmlns:a16="http://schemas.microsoft.com/office/drawing/2014/main" id="{059F7F98-190E-9EBF-23AE-8257B1653D15}"/>
-                  </a:ext>
-                </a:extLst>
-              </p:cNvPr>
-              <p:cNvCxnSpPr>
-                <a:cxnSpLocks/>
-                <a:stCxn id="33" idx="4"/>
-                <a:endCxn id="23" idx="4"/>
-              </p:cNvCxnSpPr>
-              <p:nvPr/>
-            </p:nvCxnSpPr>
-            <p:spPr>
-              <a:xfrm rot="5400000">
-                <a:off x="8637139" y="7747731"/>
-                <a:ext cx="3173663" cy="7414544"/>
-              </a:xfrm>
-              <a:prstGeom prst="bentConnector3">
-                <a:avLst>
-                  <a:gd name="adj1" fmla="val 126666"/>
-                </a:avLst>
-              </a:prstGeom>
-              <a:ln w="57150">
-                <a:solidFill>
-                  <a:srgbClr val="F68712"/>
-                </a:solidFill>
-                <a:prstDash val="sysDot"/>
-              </a:ln>
-            </p:spPr>
-            <p:style>
-              <a:lnRef idx="1">
-                <a:schemeClr val="accent1"/>
-              </a:lnRef>
-              <a:fillRef idx="0">
-                <a:schemeClr val="accent1"/>
-              </a:fillRef>
-              <a:effectRef idx="0">
-                <a:schemeClr val="accent1"/>
-              </a:effectRef>
-              <a:fontRef idx="minor">
-                <a:schemeClr val="tx1"/>
-              </a:fontRef>
-            </p:style>
-          </p:cxnSp>
-          <p:cxnSp>
-            <p:nvCxnSpPr>
-              <p:cNvPr id="38" name="Connector: Elbow 37">
-                <a:extLst>
-                  <a:ext uri="{FF2B5EF4-FFF2-40B4-BE49-F238E27FC236}">
-                    <a16:creationId xmlns:a16="http://schemas.microsoft.com/office/drawing/2014/main" id="{B116D393-D896-DC98-0A5F-443D2C4E22A2}"/>
-                  </a:ext>
-                </a:extLst>
-              </p:cNvPr>
-              <p:cNvCxnSpPr>
-                <a:cxnSpLocks/>
-                <a:stCxn id="27" idx="4"/>
-                <a:endCxn id="24" idx="4"/>
-              </p:cNvCxnSpPr>
-              <p:nvPr/>
-            </p:nvCxnSpPr>
-            <p:spPr>
-              <a:xfrm rot="5400000">
-                <a:off x="8426806" y="7959540"/>
-                <a:ext cx="3296501" cy="6868089"/>
-              </a:xfrm>
-              <a:prstGeom prst="bentConnector3">
-                <a:avLst>
-                  <a:gd name="adj1" fmla="val 121447"/>
-                </a:avLst>
-              </a:prstGeom>
-              <a:ln w="57150">
-                <a:solidFill>
-                  <a:srgbClr val="F68712"/>
-                </a:solidFill>
-              </a:ln>
-            </p:spPr>
-            <p:style>
-              <a:lnRef idx="1">
-                <a:schemeClr val="accent1"/>
-              </a:lnRef>
-              <a:fillRef idx="0">
-                <a:schemeClr val="accent1"/>
-              </a:fillRef>
-              <a:effectRef idx="0">
-                <a:schemeClr val="accent1"/>
-              </a:effectRef>
-              <a:fontRef idx="minor">
-                <a:schemeClr val="tx1"/>
-              </a:fontRef>
-            </p:style>
-          </p:cxnSp>
-          <p:cxnSp>
-            <p:nvCxnSpPr>
-              <p:cNvPr id="50" name="Connector: Elbow 49">
-                <a:extLst>
-                  <a:ext uri="{FF2B5EF4-FFF2-40B4-BE49-F238E27FC236}">
-                    <a16:creationId xmlns:a16="http://schemas.microsoft.com/office/drawing/2014/main" id="{16F16696-2434-C718-176A-1232D81F7A32}"/>
-                  </a:ext>
-                </a:extLst>
-              </p:cNvPr>
-              <p:cNvCxnSpPr>
-                <a:cxnSpLocks/>
-                <a:stCxn id="32" idx="4"/>
-                <a:endCxn id="25" idx="4"/>
-              </p:cNvCxnSpPr>
-              <p:nvPr/>
-            </p:nvCxnSpPr>
-            <p:spPr>
-              <a:xfrm rot="5400000">
-                <a:off x="8711049" y="8018626"/>
-                <a:ext cx="3235200" cy="6811218"/>
-              </a:xfrm>
-              <a:prstGeom prst="bentConnector3">
-                <a:avLst>
-                  <a:gd name="adj1" fmla="val 118110"/>
-                </a:avLst>
-              </a:prstGeom>
-              <a:ln w="57150">
-                <a:solidFill>
-                  <a:schemeClr val="accent1">
-                    <a:lumMod val="75000"/>
-                  </a:schemeClr>
-                </a:solidFill>
-              </a:ln>
-            </p:spPr>
-            <p:style>
-              <a:lnRef idx="1">
-                <a:schemeClr val="accent1"/>
-              </a:lnRef>
-              <a:fillRef idx="0">
-                <a:schemeClr val="accent1"/>
-              </a:fillRef>
-              <a:effectRef idx="0">
-                <a:schemeClr val="accent1"/>
-              </a:effectRef>
-              <a:fontRef idx="minor">
-                <a:schemeClr val="tx1"/>
-              </a:fontRef>
-            </p:style>
-          </p:cxnSp>
-          <p:cxnSp>
-            <p:nvCxnSpPr>
-              <p:cNvPr id="54" name="Connector: Elbow 53">
-                <a:extLst>
-                  <a:ext uri="{FF2B5EF4-FFF2-40B4-BE49-F238E27FC236}">
-                    <a16:creationId xmlns:a16="http://schemas.microsoft.com/office/drawing/2014/main" id="{B12D968F-3141-840B-4609-B18FE5096DE8}"/>
-                  </a:ext>
-                </a:extLst>
-              </p:cNvPr>
-              <p:cNvCxnSpPr>
-                <a:cxnSpLocks/>
-                <a:stCxn id="31" idx="4"/>
-                <a:endCxn id="26" idx="4"/>
-              </p:cNvCxnSpPr>
-              <p:nvPr/>
-            </p:nvCxnSpPr>
-            <p:spPr>
-              <a:xfrm rot="5400000">
-                <a:off x="8367268" y="8313453"/>
-                <a:ext cx="3406693" cy="6050071"/>
-              </a:xfrm>
-              <a:prstGeom prst="bentConnector3">
-                <a:avLst>
-                  <a:gd name="adj1" fmla="val 113287"/>
-                </a:avLst>
-              </a:prstGeom>
-              <a:ln w="57150">
-                <a:solidFill>
-                  <a:schemeClr val="accent1">
-                    <a:lumMod val="75000"/>
-                  </a:schemeClr>
-                </a:solidFill>
-                <a:prstDash val="sysDot"/>
-              </a:ln>
-            </p:spPr>
-            <p:style>
-              <a:lnRef idx="1">
-                <a:schemeClr val="accent1"/>
-              </a:lnRef>
-              <a:fillRef idx="0">
-                <a:schemeClr val="accent1"/>
-              </a:fillRef>
-              <a:effectRef idx="0">
-                <a:schemeClr val="accent1"/>
-              </a:effectRef>
-              <a:fontRef idx="minor">
-                <a:schemeClr val="tx1"/>
-              </a:fontRef>
-            </p:style>
-          </p:cxnSp>
-          <p:sp>
-            <p:nvSpPr>
-              <p:cNvPr id="14" name="Oval 13">
-                <a:extLst>
-                  <a:ext uri="{FF2B5EF4-FFF2-40B4-BE49-F238E27FC236}">
-                    <a16:creationId xmlns:a16="http://schemas.microsoft.com/office/drawing/2014/main" id="{69114BFC-EBDB-4C3F-5B9B-7C78E088B297}"/>
-                  </a:ext>
-                </a:extLst>
-              </p:cNvPr>
-              <p:cNvSpPr/>
-              <p:nvPr/>
-            </p:nvSpPr>
-            <p:spPr>
-              <a:xfrm>
-                <a:off x="13566754" y="10795578"/>
-                <a:ext cx="271211" cy="271211"/>
-              </a:xfrm>
-              <a:prstGeom prst="ellipse">
-                <a:avLst/>
-              </a:prstGeom>
+              </a:solidFill>
+              <a:prstDash val="sysDot"/>
+            </a:ln>
+          </p:spPr>
+          <p:style>
+            <a:lnRef idx="1">
+              <a:schemeClr val="accent1"/>
+            </a:lnRef>
+            <a:fillRef idx="0">
+              <a:schemeClr val="accent1"/>
+            </a:fillRef>
+            <a:effectRef idx="0">
+              <a:schemeClr val="accent1"/>
+            </a:effectRef>
+            <a:fontRef idx="minor">
+              <a:schemeClr val="tx1"/>
+            </a:fontRef>
+          </p:style>
+        </p:cxnSp>
+        <p:sp>
+          <p:nvSpPr>
+            <p:cNvPr id="14" name="Oval 13">
+              <a:extLst>
+                <a:ext uri="{FF2B5EF4-FFF2-40B4-BE49-F238E27FC236}">
+                  <a16:creationId xmlns:a16="http://schemas.microsoft.com/office/drawing/2014/main" id="{69114BFC-EBDB-4C3F-5B9B-7C78E088B297}"/>
+                </a:ext>
+              </a:extLst>
+            </p:cNvPr>
+            <p:cNvSpPr/>
+            <p:nvPr/>
+          </p:nvSpPr>
+          <p:spPr>
+            <a:xfrm>
+              <a:off x="14854489" y="9168359"/>
+              <a:ext cx="271211" cy="271211"/>
+            </a:xfrm>
+            <a:prstGeom prst="ellipse">
+              <a:avLst/>
+            </a:prstGeom>
+            <a:solidFill>
+              <a:schemeClr val="bg1"/>
+            </a:solidFill>
+            <a:ln>
               <a:solidFill>
                 <a:schemeClr val="bg1"/>
               </a:solidFill>
-              <a:ln>
-                <a:solidFill>
-                  <a:schemeClr val="bg1"/>
-                </a:solidFill>
-              </a:ln>
-            </p:spPr>
-            <p:style>
-              <a:lnRef idx="2">
-                <a:schemeClr val="accent1">
-                  <a:shade val="15000"/>
-                </a:schemeClr>
-              </a:lnRef>
-              <a:fillRef idx="1">
-                <a:schemeClr val="accent1"/>
-              </a:fillRef>
-              <a:effectRef idx="0">
-                <a:schemeClr val="accent1"/>
-              </a:effectRef>
-              <a:fontRef idx="minor">
-                <a:schemeClr val="lt1"/>
-              </a:fontRef>
-            </p:style>
-            <p:txBody>
-              <a:bodyPr rtlCol="0" anchor="ctr"/>
-              <a:lstStyle/>
-              <a:p>
-                <a:pPr algn="ctr"/>
-                <a:r>
-                  <a:rPr lang="pt-PT" sz="2400" dirty="0">
-                    <a:solidFill>
-                      <a:schemeClr val="tx1"/>
-                    </a:solidFill>
-                  </a:rPr>
-                  <a:t>+</a:t>
-                </a:r>
-                <a:endParaRPr lang="en-US" sz="2400" dirty="0">
+            </a:ln>
+          </p:spPr>
+          <p:style>
+            <a:lnRef idx="2">
+              <a:schemeClr val="accent1">
+                <a:shade val="15000"/>
+              </a:schemeClr>
+            </a:lnRef>
+            <a:fillRef idx="1">
+              <a:schemeClr val="accent1"/>
+            </a:fillRef>
+            <a:effectRef idx="0">
+              <a:schemeClr val="accent1"/>
+            </a:effectRef>
+            <a:fontRef idx="minor">
+              <a:schemeClr val="lt1"/>
+            </a:fontRef>
+          </p:style>
+          <p:txBody>
+            <a:bodyPr rtlCol="0" anchor="ctr"/>
+            <a:lstStyle/>
+            <a:p>
+              <a:pPr algn="ctr"/>
+              <a:r>
+                <a:rPr lang="pt-PT" sz="3600" dirty="0">
                   <a:solidFill>
                     <a:schemeClr val="tx1"/>
                   </a:solidFill>
-                </a:endParaRPr>
-              </a:p>
-            </p:txBody>
-          </p:sp>
-          <p:sp>
-            <p:nvSpPr>
-              <p:cNvPr id="16" name="Oval 15">
-                <a:extLst>
-                  <a:ext uri="{FF2B5EF4-FFF2-40B4-BE49-F238E27FC236}">
-                    <a16:creationId xmlns:a16="http://schemas.microsoft.com/office/drawing/2014/main" id="{EE23870B-1A66-2829-C506-61266633708D}"/>
-                  </a:ext>
-                </a:extLst>
-              </p:cNvPr>
-              <p:cNvSpPr/>
-              <p:nvPr/>
-            </p:nvSpPr>
-            <p:spPr>
-              <a:xfrm>
-                <a:off x="12983869" y="10149187"/>
-                <a:ext cx="234320" cy="234320"/>
-              </a:xfrm>
-              <a:prstGeom prst="ellipse">
-                <a:avLst/>
-              </a:prstGeom>
+                </a:rPr>
+                <a:t>+</a:t>
+              </a:r>
+              <a:endParaRPr lang="en-US" sz="3600" dirty="0">
+                <a:solidFill>
+                  <a:schemeClr val="tx1"/>
+                </a:solidFill>
+              </a:endParaRPr>
+            </a:p>
+          </p:txBody>
+        </p:sp>
+        <p:sp>
+          <p:nvSpPr>
+            <p:cNvPr id="16" name="Oval 15">
+              <a:extLst>
+                <a:ext uri="{FF2B5EF4-FFF2-40B4-BE49-F238E27FC236}">
+                  <a16:creationId xmlns:a16="http://schemas.microsoft.com/office/drawing/2014/main" id="{EE23870B-1A66-2829-C506-61266633708D}"/>
+                </a:ext>
+              </a:extLst>
+            </p:cNvPr>
+            <p:cNvSpPr/>
+            <p:nvPr/>
+          </p:nvSpPr>
+          <p:spPr>
+            <a:xfrm>
+              <a:off x="13121499" y="8664267"/>
+              <a:ext cx="234320" cy="234320"/>
+            </a:xfrm>
+            <a:prstGeom prst="ellipse">
+              <a:avLst/>
+            </a:prstGeom>
+            <a:solidFill>
+              <a:schemeClr val="bg1"/>
+            </a:solidFill>
+            <a:ln>
               <a:solidFill>
                 <a:schemeClr val="bg1"/>
               </a:solidFill>
-              <a:ln>
-                <a:solidFill>
-                  <a:schemeClr val="bg1"/>
-                </a:solidFill>
-              </a:ln>
-            </p:spPr>
-            <p:style>
-              <a:lnRef idx="2">
-                <a:schemeClr val="accent1">
-                  <a:shade val="15000"/>
-                </a:schemeClr>
-              </a:lnRef>
-              <a:fillRef idx="1">
-                <a:schemeClr val="accent1"/>
-              </a:fillRef>
-              <a:effectRef idx="0">
-                <a:schemeClr val="accent1"/>
-              </a:effectRef>
-              <a:fontRef idx="minor">
-                <a:schemeClr val="lt1"/>
-              </a:fontRef>
-            </p:style>
-            <p:txBody>
-              <a:bodyPr rtlCol="0" anchor="ctr"/>
-              <a:lstStyle/>
-              <a:p>
-                <a:pPr algn="ctr"/>
-                <a:r>
-                  <a:rPr lang="pt-PT" sz="2400" dirty="0">
-                    <a:solidFill>
-                      <a:schemeClr val="tx1"/>
-                    </a:solidFill>
-                  </a:rPr>
-                  <a:t>-</a:t>
-                </a:r>
-                <a:endParaRPr lang="en-US" sz="2400" dirty="0">
+            </a:ln>
+          </p:spPr>
+          <p:style>
+            <a:lnRef idx="2">
+              <a:schemeClr val="accent1">
+                <a:shade val="15000"/>
+              </a:schemeClr>
+            </a:lnRef>
+            <a:fillRef idx="1">
+              <a:schemeClr val="accent1"/>
+            </a:fillRef>
+            <a:effectRef idx="0">
+              <a:schemeClr val="accent1"/>
+            </a:effectRef>
+            <a:fontRef idx="minor">
+              <a:schemeClr val="lt1"/>
+            </a:fontRef>
+          </p:style>
+          <p:txBody>
+            <a:bodyPr rtlCol="0" anchor="ctr"/>
+            <a:lstStyle/>
+            <a:p>
+              <a:pPr algn="ctr"/>
+              <a:r>
+                <a:rPr lang="pt-PT" sz="3600" dirty="0">
                   <a:solidFill>
                     <a:schemeClr val="tx1"/>
                   </a:solidFill>
-                </a:endParaRPr>
-              </a:p>
-            </p:txBody>
-          </p:sp>
-          <p:sp>
-            <p:nvSpPr>
-              <p:cNvPr id="17" name="Oval 16">
-                <a:extLst>
-                  <a:ext uri="{FF2B5EF4-FFF2-40B4-BE49-F238E27FC236}">
-                    <a16:creationId xmlns:a16="http://schemas.microsoft.com/office/drawing/2014/main" id="{94E78E6C-ED35-4CCD-B545-1A0DE5025702}"/>
-                  </a:ext>
-                </a:extLst>
-              </p:cNvPr>
-              <p:cNvSpPr/>
-              <p:nvPr/>
-            </p:nvSpPr>
-            <p:spPr>
-              <a:xfrm>
-                <a:off x="13387926" y="10507095"/>
-                <a:ext cx="257715" cy="257715"/>
-              </a:xfrm>
-              <a:prstGeom prst="ellipse">
-                <a:avLst/>
-              </a:prstGeom>
+                </a:rPr>
+                <a:t>-</a:t>
+              </a:r>
+              <a:endParaRPr lang="en-US" sz="3600" dirty="0">
+                <a:solidFill>
+                  <a:schemeClr val="tx1"/>
+                </a:solidFill>
+              </a:endParaRPr>
+            </a:p>
+          </p:txBody>
+        </p:sp>
+        <p:sp>
+          <p:nvSpPr>
+            <p:cNvPr id="6" name="Google Shape;228;p26">
+              <a:extLst>
+                <a:ext uri="{FF2B5EF4-FFF2-40B4-BE49-F238E27FC236}">
+                  <a16:creationId xmlns:a16="http://schemas.microsoft.com/office/drawing/2014/main" id="{F094411B-B967-268C-6A43-E41A3C532821}"/>
+                </a:ext>
+              </a:extLst>
+            </p:cNvPr>
+            <p:cNvSpPr/>
+            <p:nvPr/>
+          </p:nvSpPr>
+          <p:spPr>
+            <a:xfrm>
+              <a:off x="2275904" y="8109634"/>
+              <a:ext cx="1880261" cy="2712776"/>
+            </a:xfrm>
+            <a:prstGeom prst="rect">
+              <a:avLst/>
+            </a:prstGeom>
+            <a:noFill/>
+            <a:ln w="57150" cap="flat" cmpd="sng">
               <a:solidFill>
-                <a:schemeClr val="bg1"/>
+                <a:srgbClr val="DAC000"/>
               </a:solidFill>
-              <a:ln>
-                <a:solidFill>
-                  <a:schemeClr val="bg1"/>
-                </a:solidFill>
-              </a:ln>
-            </p:spPr>
-            <p:style>
-              <a:lnRef idx="2">
-                <a:schemeClr val="accent1">
-                  <a:shade val="15000"/>
-                </a:schemeClr>
-              </a:lnRef>
-              <a:fillRef idx="1">
-                <a:schemeClr val="accent1"/>
-              </a:fillRef>
-              <a:effectRef idx="0">
-                <a:schemeClr val="accent1"/>
-              </a:effectRef>
-              <a:fontRef idx="minor">
-                <a:schemeClr val="lt1"/>
-              </a:fontRef>
-            </p:style>
-            <p:txBody>
-              <a:bodyPr rtlCol="0" anchor="ctr"/>
-              <a:lstStyle/>
-              <a:p>
-                <a:pPr algn="ctr"/>
-                <a:r>
-                  <a:rPr lang="pt-PT" sz="2000" dirty="0">
-                    <a:solidFill>
-                      <a:schemeClr val="tx1"/>
-                    </a:solidFill>
-                  </a:rPr>
-                  <a:t>B</a:t>
-                </a:r>
-                <a:endParaRPr lang="en-US" sz="2000" dirty="0">
-                  <a:solidFill>
-                    <a:schemeClr val="tx1"/>
-                  </a:solidFill>
-                </a:endParaRPr>
-              </a:p>
-            </p:txBody>
-          </p:sp>
-          <p:sp>
-            <p:nvSpPr>
-              <p:cNvPr id="18" name="Oval 17">
-                <a:extLst>
-                  <a:ext uri="{FF2B5EF4-FFF2-40B4-BE49-F238E27FC236}">
-                    <a16:creationId xmlns:a16="http://schemas.microsoft.com/office/drawing/2014/main" id="{207428FE-B1D9-5404-DCD5-FB6F33FA36B9}"/>
-                  </a:ext>
-                </a:extLst>
-              </p:cNvPr>
-              <p:cNvSpPr/>
-              <p:nvPr/>
-            </p:nvSpPr>
-            <p:spPr>
-              <a:xfrm>
-                <a:off x="13791129" y="11054020"/>
-                <a:ext cx="271211" cy="271211"/>
-              </a:xfrm>
-              <a:prstGeom prst="ellipse">
-                <a:avLst/>
-              </a:prstGeom>
-              <a:solidFill>
-                <a:schemeClr val="bg1"/>
-              </a:solidFill>
-              <a:ln>
-                <a:solidFill>
-                  <a:schemeClr val="bg1"/>
-                </a:solidFill>
-              </a:ln>
-            </p:spPr>
-            <p:style>
-              <a:lnRef idx="2">
-                <a:schemeClr val="accent1">
-                  <a:shade val="15000"/>
-                </a:schemeClr>
-              </a:lnRef>
-              <a:fillRef idx="1">
-                <a:schemeClr val="accent1"/>
-              </a:fillRef>
-              <a:effectRef idx="0">
-                <a:schemeClr val="accent1"/>
-              </a:effectRef>
-              <a:fontRef idx="minor">
-                <a:schemeClr val="lt1"/>
-              </a:fontRef>
-            </p:style>
-            <p:txBody>
-              <a:bodyPr rtlCol="0" anchor="ctr"/>
-              <a:lstStyle/>
-              <a:p>
-                <a:pPr algn="ctr"/>
-                <a:r>
-                  <a:rPr lang="pt-PT" sz="2000" dirty="0">
-                    <a:solidFill>
-                      <a:schemeClr val="tx1"/>
-                    </a:solidFill>
-                  </a:rPr>
-                  <a:t>A</a:t>
-                </a:r>
-                <a:endParaRPr lang="en-US" sz="2000" dirty="0">
-                  <a:solidFill>
-                    <a:schemeClr val="tx1"/>
-                  </a:solidFill>
-                </a:endParaRPr>
-              </a:p>
-            </p:txBody>
-          </p:sp>
-          <p:sp>
-            <p:nvSpPr>
-              <p:cNvPr id="6" name="Google Shape;228;p26">
-                <a:extLst>
-                  <a:ext uri="{FF2B5EF4-FFF2-40B4-BE49-F238E27FC236}">
-                    <a16:creationId xmlns:a16="http://schemas.microsoft.com/office/drawing/2014/main" id="{F094411B-B967-268C-6A43-E41A3C532821}"/>
-                  </a:ext>
-                </a:extLst>
-              </p:cNvPr>
-              <p:cNvSpPr/>
-              <p:nvPr/>
-            </p:nvSpPr>
-            <p:spPr>
-              <a:xfrm>
-                <a:off x="6053533" y="7794320"/>
-                <a:ext cx="1880261" cy="2712776"/>
-              </a:xfrm>
-              <a:prstGeom prst="rect">
-                <a:avLst/>
-              </a:prstGeom>
-              <a:noFill/>
-              <a:ln w="57150" cap="flat" cmpd="sng">
+              <a:prstDash val="solid"/>
+              <a:round/>
+              <a:headEnd type="none" w="sm" len="sm"/>
+              <a:tailEnd type="none" w="sm" len="sm"/>
+            </a:ln>
+          </p:spPr>
+          <p:txBody>
+            <a:bodyPr spcFirstLastPara="1" wrap="square" lIns="91425" tIns="91425" rIns="91425" bIns="91425" anchor="ctr" anchorCtr="0">
+              <a:noAutofit/>
+            </a:bodyPr>
+            <a:lstStyle/>
+            <a:p>
+              <a:pPr algn="ctr"/>
+              <a:endParaRPr dirty="0">
                 <a:solidFill>
                   <a:srgbClr val="DAC000"/>
                 </a:solidFill>
-                <a:prstDash val="solid"/>
-                <a:round/>
-                <a:headEnd type="none" w="sm" len="sm"/>
-                <a:tailEnd type="none" w="sm" len="sm"/>
-              </a:ln>
-            </p:spPr>
-            <p:txBody>
-              <a:bodyPr spcFirstLastPara="1" wrap="square" lIns="91425" tIns="91425" rIns="91425" bIns="91425" anchor="ctr" anchorCtr="0">
-                <a:noAutofit/>
-              </a:bodyPr>
-              <a:lstStyle/>
-              <a:p>
-                <a:pPr algn="ctr"/>
-                <a:endParaRPr dirty="0">
-                  <a:solidFill>
-                    <a:srgbClr val="DAC000"/>
-                  </a:solidFill>
-                </a:endParaRPr>
-              </a:p>
-            </p:txBody>
-          </p:sp>
-        </p:grpSp>
+              </a:endParaRPr>
+            </a:p>
+          </p:txBody>
+        </p:sp>
+        <p:sp>
+          <p:nvSpPr>
+            <p:cNvPr id="20" name="Oval 19">
+              <a:extLst>
+                <a:ext uri="{FF2B5EF4-FFF2-40B4-BE49-F238E27FC236}">
+                  <a16:creationId xmlns:a16="http://schemas.microsoft.com/office/drawing/2014/main" id="{D1C2B51D-3680-34A9-4B6D-4622030126B5}"/>
+                </a:ext>
+              </a:extLst>
+            </p:cNvPr>
+            <p:cNvSpPr/>
+            <p:nvPr/>
+          </p:nvSpPr>
+          <p:spPr>
+            <a:xfrm>
+              <a:off x="12873096" y="8267697"/>
+              <a:ext cx="242888" cy="242888"/>
+            </a:xfrm>
+            <a:prstGeom prst="ellipse">
+              <a:avLst/>
+            </a:prstGeom>
+            <a:noFill/>
+            <a:ln>
+              <a:noFill/>
+            </a:ln>
+          </p:spPr>
+          <p:style>
+            <a:lnRef idx="2">
+              <a:schemeClr val="accent1">
+                <a:shade val="15000"/>
+              </a:schemeClr>
+            </a:lnRef>
+            <a:fillRef idx="1">
+              <a:schemeClr val="accent1"/>
+            </a:fillRef>
+            <a:effectRef idx="0">
+              <a:schemeClr val="accent1"/>
+            </a:effectRef>
+            <a:fontRef idx="minor">
+              <a:schemeClr val="lt1"/>
+            </a:fontRef>
+          </p:style>
+          <p:txBody>
+            <a:bodyPr rtlCol="0" anchor="ctr"/>
+            <a:lstStyle/>
+            <a:p>
+              <a:pPr algn="ctr"/>
+              <a:endParaRPr lang="en-US"/>
+            </a:p>
+          </p:txBody>
+        </p:sp>
+        <p:sp>
+          <p:nvSpPr>
+            <p:cNvPr id="21" name="Oval 20">
+              <a:extLst>
+                <a:ext uri="{FF2B5EF4-FFF2-40B4-BE49-F238E27FC236}">
+                  <a16:creationId xmlns:a16="http://schemas.microsoft.com/office/drawing/2014/main" id="{3FAF165C-BE6A-B3E9-726F-383EED3F7517}"/>
+                </a:ext>
+              </a:extLst>
+            </p:cNvPr>
+            <p:cNvSpPr/>
+            <p:nvPr/>
+          </p:nvSpPr>
+          <p:spPr>
+            <a:xfrm>
+              <a:off x="15125700" y="8639175"/>
+              <a:ext cx="242888" cy="242888"/>
+            </a:xfrm>
+            <a:prstGeom prst="ellipse">
+              <a:avLst/>
+            </a:prstGeom>
+            <a:noFill/>
+            <a:ln>
+              <a:noFill/>
+            </a:ln>
+          </p:spPr>
+          <p:style>
+            <a:lnRef idx="2">
+              <a:schemeClr val="accent1">
+                <a:shade val="15000"/>
+              </a:schemeClr>
+            </a:lnRef>
+            <a:fillRef idx="1">
+              <a:schemeClr val="accent1"/>
+            </a:fillRef>
+            <a:effectRef idx="0">
+              <a:schemeClr val="accent1"/>
+            </a:effectRef>
+            <a:fontRef idx="minor">
+              <a:schemeClr val="lt1"/>
+            </a:fontRef>
+          </p:style>
+          <p:txBody>
+            <a:bodyPr rtlCol="0" anchor="ctr"/>
+            <a:lstStyle/>
+            <a:p>
+              <a:pPr algn="ctr"/>
+              <a:endParaRPr lang="en-US"/>
+            </a:p>
+          </p:txBody>
+        </p:sp>
+        <p:sp>
+          <p:nvSpPr>
+            <p:cNvPr id="37" name="Oval 36">
+              <a:extLst>
+                <a:ext uri="{FF2B5EF4-FFF2-40B4-BE49-F238E27FC236}">
+                  <a16:creationId xmlns:a16="http://schemas.microsoft.com/office/drawing/2014/main" id="{F468F897-1106-E95E-D440-0834272C5EC9}"/>
+                </a:ext>
+              </a:extLst>
+            </p:cNvPr>
+            <p:cNvSpPr/>
+            <p:nvPr/>
+          </p:nvSpPr>
+          <p:spPr>
+            <a:xfrm>
+              <a:off x="2690224" y="13046678"/>
+              <a:ext cx="242888" cy="242888"/>
+            </a:xfrm>
+            <a:prstGeom prst="ellipse">
+              <a:avLst/>
+            </a:prstGeom>
+            <a:noFill/>
+            <a:ln>
+              <a:noFill/>
+            </a:ln>
+          </p:spPr>
+          <p:style>
+            <a:lnRef idx="2">
+              <a:schemeClr val="accent1">
+                <a:shade val="15000"/>
+              </a:schemeClr>
+            </a:lnRef>
+            <a:fillRef idx="1">
+              <a:schemeClr val="accent1"/>
+            </a:fillRef>
+            <a:effectRef idx="0">
+              <a:schemeClr val="accent1"/>
+            </a:effectRef>
+            <a:fontRef idx="minor">
+              <a:schemeClr val="lt1"/>
+            </a:fontRef>
+          </p:style>
+          <p:txBody>
+            <a:bodyPr rtlCol="0" anchor="ctr"/>
+            <a:lstStyle/>
+            <a:p>
+              <a:pPr algn="ctr"/>
+              <a:endParaRPr lang="en-US"/>
+            </a:p>
+          </p:txBody>
+        </p:sp>
+        <p:sp>
+          <p:nvSpPr>
+            <p:cNvPr id="39" name="Oval 38">
+              <a:extLst>
+                <a:ext uri="{FF2B5EF4-FFF2-40B4-BE49-F238E27FC236}">
+                  <a16:creationId xmlns:a16="http://schemas.microsoft.com/office/drawing/2014/main" id="{848971D9-FD6B-887A-106F-0102E446ED6E}"/>
+                </a:ext>
+              </a:extLst>
+            </p:cNvPr>
+            <p:cNvSpPr/>
+            <p:nvPr/>
+          </p:nvSpPr>
+          <p:spPr>
+            <a:xfrm>
+              <a:off x="3137568" y="13065058"/>
+              <a:ext cx="242888" cy="242888"/>
+            </a:xfrm>
+            <a:prstGeom prst="ellipse">
+              <a:avLst/>
+            </a:prstGeom>
+            <a:noFill/>
+            <a:ln>
+              <a:noFill/>
+            </a:ln>
+          </p:spPr>
+          <p:style>
+            <a:lnRef idx="2">
+              <a:schemeClr val="accent1">
+                <a:shade val="15000"/>
+              </a:schemeClr>
+            </a:lnRef>
+            <a:fillRef idx="1">
+              <a:schemeClr val="accent1"/>
+            </a:fillRef>
+            <a:effectRef idx="0">
+              <a:schemeClr val="accent1"/>
+            </a:effectRef>
+            <a:fontRef idx="minor">
+              <a:schemeClr val="lt1"/>
+            </a:fontRef>
+          </p:style>
+          <p:txBody>
+            <a:bodyPr rtlCol="0" anchor="ctr"/>
+            <a:lstStyle/>
+            <a:p>
+              <a:pPr algn="ctr"/>
+              <a:endParaRPr lang="en-US"/>
+            </a:p>
+          </p:txBody>
+        </p:sp>
       </p:grpSp>
     </p:spTree>
     <p:extLst>
@@ -15148,7 +15674,7 @@
   <p:cSld>
     <p:spTree>
       <p:nvGrpSpPr>
-        <p:cNvPr id="1" name="Shape 219"/>
+        <p:cNvPr id="1" name="Shape 188"/>
         <p:cNvGrpSpPr/>
         <p:nvPr/>
       </p:nvGrpSpPr>
@@ -15162,439 +15688,1094 @@
       </p:grpSpPr>
       <p:sp>
         <p:nvSpPr>
-          <p:cNvPr id="220" name="Google Shape;220;p26"/>
+          <p:cNvPr id="8" name="Rectangle 7">
+            <a:extLst>
+              <a:ext uri="{FF2B5EF4-FFF2-40B4-BE49-F238E27FC236}">
+                <a16:creationId xmlns:a16="http://schemas.microsoft.com/office/drawing/2014/main" id="{044AA52B-C464-1524-B063-283DE254853B}"/>
+              </a:ext>
+            </a:extLst>
+          </p:cNvPr>
           <p:cNvSpPr/>
           <p:nvPr/>
         </p:nvSpPr>
         <p:spPr>
           <a:xfrm>
-            <a:off x="6126162" y="5018087"/>
-            <a:ext cx="6600600" cy="1012200"/>
+            <a:off x="316993" y="315315"/>
+            <a:ext cx="15653476" cy="14173195"/>
           </a:xfrm>
           <a:prstGeom prst="rect">
             <a:avLst/>
           </a:prstGeom>
-          <a:gradFill>
-            <a:gsLst>
-              <a:gs pos="0">
-                <a:srgbClr val="FFFFFF"/>
-              </a:gs>
-              <a:gs pos="100000">
-                <a:srgbClr val="5F616B"/>
-              </a:gs>
-            </a:gsLst>
-            <a:lin ang="10800025" scaled="0"/>
-          </a:gradFill>
+          <a:solidFill>
+            <a:schemeClr val="bg1"/>
+          </a:solidFill>
           <a:ln>
             <a:noFill/>
           </a:ln>
         </p:spPr>
+        <p:style>
+          <a:lnRef idx="2">
+            <a:schemeClr val="accent1">
+              <a:shade val="15000"/>
+            </a:schemeClr>
+          </a:lnRef>
+          <a:fillRef idx="1">
+            <a:schemeClr val="accent1"/>
+          </a:fillRef>
+          <a:effectRef idx="0">
+            <a:schemeClr val="accent1"/>
+          </a:effectRef>
+          <a:fontRef idx="minor">
+            <a:schemeClr val="lt1"/>
+          </a:fontRef>
+        </p:style>
         <p:txBody>
-          <a:bodyPr spcFirstLastPara="1" wrap="square" lIns="91425" tIns="91425" rIns="91425" bIns="91425" anchor="ctr" anchorCtr="0">
-            <a:noAutofit/>
-          </a:bodyPr>
+          <a:bodyPr rtlCol="0" anchor="ctr"/>
           <a:lstStyle/>
           <a:p>
-            <a:endParaRPr/>
+            <a:pPr algn="ctr"/>
+            <a:endParaRPr lang="en-US"/>
           </a:p>
         </p:txBody>
       </p:sp>
-      <p:sp>
-        <p:nvSpPr>
-          <p:cNvPr id="221" name="Google Shape;221;p26"/>
-          <p:cNvSpPr txBox="1"/>
+      <p:grpSp>
+        <p:nvGrpSpPr>
+          <p:cNvPr id="196" name="Group 195">
+            <a:extLst>
+              <a:ext uri="{FF2B5EF4-FFF2-40B4-BE49-F238E27FC236}">
+                <a16:creationId xmlns:a16="http://schemas.microsoft.com/office/drawing/2014/main" id="{B828AA75-CD65-7FC0-1660-4779D2310F9C}"/>
+              </a:ext>
+            </a:extLst>
+          </p:cNvPr>
+          <p:cNvGrpSpPr/>
           <p:nvPr/>
-        </p:nvSpPr>
-        <p:spPr>
+        </p:nvGrpSpPr>
+        <p:grpSpPr>
           <a:xfrm>
-            <a:off x="7030637" y="5093987"/>
-            <a:ext cx="5099100" cy="860400"/>
+            <a:off x="522733" y="509603"/>
+            <a:ext cx="13539607" cy="12861111"/>
+            <a:chOff x="522733" y="194288"/>
+            <a:chExt cx="13539607" cy="12861111"/>
           </a:xfrm>
-          <a:prstGeom prst="rect">
-            <a:avLst/>
-          </a:prstGeom>
-          <a:noFill/>
-          <a:ln>
+        </p:grpSpPr>
+        <p:pic>
+          <p:nvPicPr>
+            <p:cNvPr id="197" name="Google Shape;197;p24"/>
+            <p:cNvPicPr preferRelativeResize="0"/>
+            <p:nvPr/>
+          </p:nvPicPr>
+          <p:blipFill>
+            <a:blip r:embed="rId3">
+              <a:alphaModFix/>
+            </a:blip>
+            <a:stretch>
+              <a:fillRect/>
+            </a:stretch>
+          </p:blipFill>
+          <p:spPr>
+            <a:xfrm>
+              <a:off x="522733" y="194288"/>
+              <a:ext cx="11499204" cy="10591348"/>
+            </a:xfrm>
+            <a:prstGeom prst="rect">
+              <a:avLst/>
+            </a:prstGeom>
             <a:noFill/>
-          </a:ln>
-        </p:spPr>
-        <p:txBody>
-          <a:bodyPr spcFirstLastPara="1" wrap="square" lIns="91425" tIns="91425" rIns="91425" bIns="91425" anchor="t" anchorCtr="0">
-            <a:noAutofit/>
-          </a:bodyPr>
-          <a:lstStyle/>
-          <a:p>
-            <a:pPr>
-              <a:lnSpc>
-                <a:spcPct val="115000"/>
-              </a:lnSpc>
-            </a:pPr>
-            <a:r>
-              <a:rPr lang="en" sz="2000" b="1">
+            <a:ln>
+              <a:noFill/>
+              <a:prstDash val="sysDot"/>
+            </a:ln>
+          </p:spPr>
+        </p:pic>
+        <p:sp>
+          <p:nvSpPr>
+            <p:cNvPr id="198" name="Google Shape;198;p24"/>
+            <p:cNvSpPr txBox="1"/>
+            <p:nvPr/>
+          </p:nvSpPr>
+          <p:spPr>
+            <a:xfrm>
+              <a:off x="4570865" y="10389711"/>
+              <a:ext cx="1420511" cy="677078"/>
+            </a:xfrm>
+            <a:prstGeom prst="rect">
+              <a:avLst/>
+            </a:prstGeom>
+            <a:noFill/>
+            <a:ln>
+              <a:noFill/>
+              <a:prstDash val="sysDot"/>
+            </a:ln>
+          </p:spPr>
+          <p:txBody>
+            <a:bodyPr spcFirstLastPara="1" wrap="square" lIns="91425" tIns="91425" rIns="91425" bIns="91425" anchor="t" anchorCtr="0">
+              <a:spAutoFit/>
+            </a:bodyPr>
+            <a:lstStyle/>
+            <a:p>
+              <a:pPr algn="ctr"/>
+              <a:r>
+                <a:rPr lang="en" sz="3200" b="1" dirty="0">
+                  <a:solidFill>
+                    <a:srgbClr val="DAC000"/>
+                  </a:solidFill>
+                  <a:latin typeface="Comfortaa"/>
+                  <a:ea typeface="Comfortaa"/>
+                  <a:cs typeface="Comfortaa"/>
+                  <a:sym typeface="Comfortaa"/>
+                </a:rPr>
+                <a:t>Port2</a:t>
+              </a:r>
+              <a:endParaRPr sz="3200" b="1" dirty="0">
                 <a:solidFill>
-                  <a:srgbClr val="FFFFFF"/>
+                  <a:srgbClr val="DAC000"/>
                 </a:solidFill>
                 <a:latin typeface="Comfortaa"/>
                 <a:ea typeface="Comfortaa"/>
                 <a:cs typeface="Comfortaa"/>
                 <a:sym typeface="Comfortaa"/>
-              </a:rPr>
-              <a:t>HARP</a:t>
-            </a:r>
-            <a:endParaRPr sz="2000" b="1">
+              </a:endParaRPr>
+            </a:p>
+          </p:txBody>
+        </p:sp>
+        <p:pic>
+          <p:nvPicPr>
+            <p:cNvPr id="22" name="Picture 21">
+              <a:extLst>
+                <a:ext uri="{FF2B5EF4-FFF2-40B4-BE49-F238E27FC236}">
+                  <a16:creationId xmlns:a16="http://schemas.microsoft.com/office/drawing/2014/main" id="{5ABC6090-6E77-44DA-2E3E-6DAF471FA58D}"/>
+                </a:ext>
+              </a:extLst>
+            </p:cNvPr>
+            <p:cNvPicPr>
+              <a:picLocks noChangeAspect="1"/>
+            </p:cNvPicPr>
+            <p:nvPr/>
+          </p:nvPicPr>
+          <p:blipFill rotWithShape="1">
+            <a:blip r:embed="rId4"/>
+            <a:srcRect l="12808" r="52093" b="27587"/>
+            <a:stretch/>
+          </p:blipFill>
+          <p:spPr>
+            <a:xfrm>
+              <a:off x="6149485" y="10563612"/>
+              <a:ext cx="1713049" cy="2491787"/>
+            </a:xfrm>
+            <a:prstGeom prst="rect">
+              <a:avLst/>
+            </a:prstGeom>
+          </p:spPr>
+        </p:pic>
+        <p:sp>
+          <p:nvSpPr>
+            <p:cNvPr id="23" name="Oval 22">
+              <a:extLst>
+                <a:ext uri="{FF2B5EF4-FFF2-40B4-BE49-F238E27FC236}">
+                  <a16:creationId xmlns:a16="http://schemas.microsoft.com/office/drawing/2014/main" id="{8BCCEE3C-DBBD-D34D-CA54-96C4150B50AD}"/>
+                </a:ext>
+              </a:extLst>
+            </p:cNvPr>
+            <p:cNvSpPr/>
+            <p:nvPr/>
+          </p:nvSpPr>
+          <p:spPr>
+            <a:xfrm>
+              <a:off x="6472192" y="12952823"/>
+              <a:ext cx="89012" cy="89012"/>
+            </a:xfrm>
+            <a:prstGeom prst="ellipse">
+              <a:avLst/>
+            </a:prstGeom>
+            <a:noFill/>
+            <a:ln>
+              <a:noFill/>
+            </a:ln>
+          </p:spPr>
+          <p:style>
+            <a:lnRef idx="2">
+              <a:schemeClr val="accent1">
+                <a:shade val="15000"/>
+              </a:schemeClr>
+            </a:lnRef>
+            <a:fillRef idx="1">
+              <a:schemeClr val="accent1"/>
+            </a:fillRef>
+            <a:effectRef idx="0">
+              <a:schemeClr val="accent1"/>
+            </a:effectRef>
+            <a:fontRef idx="minor">
+              <a:schemeClr val="lt1"/>
+            </a:fontRef>
+          </p:style>
+          <p:txBody>
+            <a:bodyPr rtlCol="0" anchor="ctr"/>
+            <a:lstStyle/>
+            <a:p>
+              <a:pPr algn="ctr"/>
+              <a:endParaRPr lang="en-US"/>
+            </a:p>
+          </p:txBody>
+        </p:sp>
+        <p:sp>
+          <p:nvSpPr>
+            <p:cNvPr id="24" name="Oval 23">
+              <a:extLst>
+                <a:ext uri="{FF2B5EF4-FFF2-40B4-BE49-F238E27FC236}">
+                  <a16:creationId xmlns:a16="http://schemas.microsoft.com/office/drawing/2014/main" id="{23A6A2B2-43B0-0C24-FB22-C6ABC51DF95A}"/>
+                </a:ext>
+              </a:extLst>
+            </p:cNvPr>
+            <p:cNvSpPr/>
+            <p:nvPr/>
+          </p:nvSpPr>
+          <p:spPr>
+            <a:xfrm>
+              <a:off x="6596505" y="12952823"/>
+              <a:ext cx="89012" cy="89012"/>
+            </a:xfrm>
+            <a:prstGeom prst="ellipse">
+              <a:avLst/>
+            </a:prstGeom>
+            <a:noFill/>
+            <a:ln>
+              <a:noFill/>
+            </a:ln>
+          </p:spPr>
+          <p:style>
+            <a:lnRef idx="2">
+              <a:schemeClr val="accent1">
+                <a:shade val="15000"/>
+              </a:schemeClr>
+            </a:lnRef>
+            <a:fillRef idx="1">
+              <a:schemeClr val="accent1"/>
+            </a:fillRef>
+            <a:effectRef idx="0">
+              <a:schemeClr val="accent1"/>
+            </a:effectRef>
+            <a:fontRef idx="minor">
+              <a:schemeClr val="lt1"/>
+            </a:fontRef>
+          </p:style>
+          <p:txBody>
+            <a:bodyPr rtlCol="0" anchor="ctr"/>
+            <a:lstStyle/>
+            <a:p>
+              <a:pPr algn="ctr"/>
+              <a:endParaRPr lang="en-US"/>
+            </a:p>
+          </p:txBody>
+        </p:sp>
+        <p:sp>
+          <p:nvSpPr>
+            <p:cNvPr id="25" name="Oval 24">
+              <a:extLst>
+                <a:ext uri="{FF2B5EF4-FFF2-40B4-BE49-F238E27FC236}">
+                  <a16:creationId xmlns:a16="http://schemas.microsoft.com/office/drawing/2014/main" id="{3D8973B0-0201-BF68-5C40-573D629D0465}"/>
+                </a:ext>
+              </a:extLst>
+            </p:cNvPr>
+            <p:cNvSpPr/>
+            <p:nvPr/>
+          </p:nvSpPr>
+          <p:spPr>
+            <a:xfrm>
+              <a:off x="6878534" y="12952823"/>
+              <a:ext cx="89012" cy="89012"/>
+            </a:xfrm>
+            <a:prstGeom prst="ellipse">
+              <a:avLst/>
+            </a:prstGeom>
+            <a:noFill/>
+            <a:ln>
+              <a:noFill/>
+            </a:ln>
+          </p:spPr>
+          <p:style>
+            <a:lnRef idx="2">
+              <a:schemeClr val="accent1">
+                <a:shade val="15000"/>
+              </a:schemeClr>
+            </a:lnRef>
+            <a:fillRef idx="1">
+              <a:schemeClr val="accent1"/>
+            </a:fillRef>
+            <a:effectRef idx="0">
+              <a:schemeClr val="accent1"/>
+            </a:effectRef>
+            <a:fontRef idx="minor">
+              <a:schemeClr val="lt1"/>
+            </a:fontRef>
+          </p:style>
+          <p:txBody>
+            <a:bodyPr rtlCol="0" anchor="ctr"/>
+            <a:lstStyle/>
+            <a:p>
+              <a:pPr algn="ctr"/>
+              <a:endParaRPr lang="en-US"/>
+            </a:p>
+          </p:txBody>
+        </p:sp>
+        <p:sp>
+          <p:nvSpPr>
+            <p:cNvPr id="26" name="Oval 25">
+              <a:extLst>
+                <a:ext uri="{FF2B5EF4-FFF2-40B4-BE49-F238E27FC236}">
+                  <a16:creationId xmlns:a16="http://schemas.microsoft.com/office/drawing/2014/main" id="{6A6366A5-C9A2-190E-83AB-1F22ED6F1FD5}"/>
+                </a:ext>
+              </a:extLst>
+            </p:cNvPr>
+            <p:cNvSpPr/>
+            <p:nvPr/>
+          </p:nvSpPr>
+          <p:spPr>
+            <a:xfrm>
+              <a:off x="7001072" y="12952823"/>
+              <a:ext cx="89012" cy="89012"/>
+            </a:xfrm>
+            <a:prstGeom prst="ellipse">
+              <a:avLst/>
+            </a:prstGeom>
+            <a:noFill/>
+            <a:ln>
+              <a:noFill/>
+            </a:ln>
+          </p:spPr>
+          <p:style>
+            <a:lnRef idx="2">
+              <a:schemeClr val="accent1">
+                <a:shade val="15000"/>
+              </a:schemeClr>
+            </a:lnRef>
+            <a:fillRef idx="1">
+              <a:schemeClr val="accent1"/>
+            </a:fillRef>
+            <a:effectRef idx="0">
+              <a:schemeClr val="accent1"/>
+            </a:effectRef>
+            <a:fontRef idx="minor">
+              <a:schemeClr val="lt1"/>
+            </a:fontRef>
+          </p:style>
+          <p:txBody>
+            <a:bodyPr rtlCol="0" anchor="ctr"/>
+            <a:lstStyle/>
+            <a:p>
+              <a:pPr algn="ctr"/>
+              <a:endParaRPr lang="en-US"/>
+            </a:p>
+          </p:txBody>
+        </p:sp>
+        <p:sp>
+          <p:nvSpPr>
+            <p:cNvPr id="27" name="Oval 26">
+              <a:extLst>
+                <a:ext uri="{FF2B5EF4-FFF2-40B4-BE49-F238E27FC236}">
+                  <a16:creationId xmlns:a16="http://schemas.microsoft.com/office/drawing/2014/main" id="{703AD329-CF63-9BDE-E216-AC077058CC92}"/>
+                </a:ext>
+              </a:extLst>
+            </p:cNvPr>
+            <p:cNvSpPr/>
+            <p:nvPr/>
+          </p:nvSpPr>
+          <p:spPr>
+            <a:xfrm>
+              <a:off x="13464594" y="9656322"/>
+              <a:ext cx="89012" cy="89012"/>
+            </a:xfrm>
+            <a:prstGeom prst="ellipse">
+              <a:avLst/>
+            </a:prstGeom>
+            <a:noFill/>
+            <a:ln>
+              <a:noFill/>
+            </a:ln>
+          </p:spPr>
+          <p:style>
+            <a:lnRef idx="2">
+              <a:schemeClr val="accent1">
+                <a:shade val="15000"/>
+              </a:schemeClr>
+            </a:lnRef>
+            <a:fillRef idx="1">
+              <a:schemeClr val="accent1"/>
+            </a:fillRef>
+            <a:effectRef idx="0">
+              <a:schemeClr val="accent1"/>
+            </a:effectRef>
+            <a:fontRef idx="minor">
+              <a:schemeClr val="lt1"/>
+            </a:fontRef>
+          </p:style>
+          <p:txBody>
+            <a:bodyPr rtlCol="0" anchor="ctr"/>
+            <a:lstStyle/>
+            <a:p>
+              <a:pPr algn="ctr"/>
+              <a:endParaRPr lang="en-US"/>
+            </a:p>
+          </p:txBody>
+        </p:sp>
+        <p:sp>
+          <p:nvSpPr>
+            <p:cNvPr id="31" name="Oval 30">
+              <a:extLst>
+                <a:ext uri="{FF2B5EF4-FFF2-40B4-BE49-F238E27FC236}">
+                  <a16:creationId xmlns:a16="http://schemas.microsoft.com/office/drawing/2014/main" id="{66C37D68-948F-219A-CFD0-301BED959199}"/>
+                </a:ext>
+              </a:extLst>
+            </p:cNvPr>
+            <p:cNvSpPr/>
+            <p:nvPr/>
+          </p:nvSpPr>
+          <p:spPr>
+            <a:xfrm>
+              <a:off x="13051143" y="9546130"/>
+              <a:ext cx="89012" cy="89012"/>
+            </a:xfrm>
+            <a:prstGeom prst="ellipse">
+              <a:avLst/>
+            </a:prstGeom>
+            <a:noFill/>
+            <a:ln>
+              <a:noFill/>
+            </a:ln>
+          </p:spPr>
+          <p:style>
+            <a:lnRef idx="2">
+              <a:schemeClr val="accent1">
+                <a:shade val="15000"/>
+              </a:schemeClr>
+            </a:lnRef>
+            <a:fillRef idx="1">
+              <a:schemeClr val="accent1"/>
+            </a:fillRef>
+            <a:effectRef idx="0">
+              <a:schemeClr val="accent1"/>
+            </a:effectRef>
+            <a:fontRef idx="minor">
+              <a:schemeClr val="lt1"/>
+            </a:fontRef>
+          </p:style>
+          <p:txBody>
+            <a:bodyPr rtlCol="0" anchor="ctr"/>
+            <a:lstStyle/>
+            <a:p>
+              <a:pPr algn="ctr"/>
+              <a:endParaRPr lang="en-US"/>
+            </a:p>
+          </p:txBody>
+        </p:sp>
+        <p:sp>
+          <p:nvSpPr>
+            <p:cNvPr id="32" name="Oval 31">
+              <a:extLst>
+                <a:ext uri="{FF2B5EF4-FFF2-40B4-BE49-F238E27FC236}">
+                  <a16:creationId xmlns:a16="http://schemas.microsoft.com/office/drawing/2014/main" id="{185E5B51-9EA6-0168-4C34-8FDC2EF00878}"/>
+                </a:ext>
+              </a:extLst>
+            </p:cNvPr>
+            <p:cNvSpPr/>
+            <p:nvPr/>
+          </p:nvSpPr>
+          <p:spPr>
+            <a:xfrm>
+              <a:off x="13689752" y="9717623"/>
+              <a:ext cx="89012" cy="89012"/>
+            </a:xfrm>
+            <a:prstGeom prst="ellipse">
+              <a:avLst/>
+            </a:prstGeom>
+            <a:noFill/>
+            <a:ln>
+              <a:noFill/>
+            </a:ln>
+          </p:spPr>
+          <p:style>
+            <a:lnRef idx="2">
+              <a:schemeClr val="accent1">
+                <a:shade val="15000"/>
+              </a:schemeClr>
+            </a:lnRef>
+            <a:fillRef idx="1">
+              <a:schemeClr val="accent1"/>
+            </a:fillRef>
+            <a:effectRef idx="0">
+              <a:schemeClr val="accent1"/>
+            </a:effectRef>
+            <a:fontRef idx="minor">
+              <a:schemeClr val="lt1"/>
+            </a:fontRef>
+          </p:style>
+          <p:txBody>
+            <a:bodyPr rtlCol="0" anchor="ctr"/>
+            <a:lstStyle/>
+            <a:p>
+              <a:pPr algn="ctr"/>
+              <a:endParaRPr lang="en-US"/>
+            </a:p>
+          </p:txBody>
+        </p:sp>
+        <p:sp>
+          <p:nvSpPr>
+            <p:cNvPr id="33" name="Oval 32">
+              <a:extLst>
+                <a:ext uri="{FF2B5EF4-FFF2-40B4-BE49-F238E27FC236}">
+                  <a16:creationId xmlns:a16="http://schemas.microsoft.com/office/drawing/2014/main" id="{B1F6F8DF-5617-A57A-E4FE-12A7223DB748}"/>
+                </a:ext>
+              </a:extLst>
+            </p:cNvPr>
+            <p:cNvSpPr/>
+            <p:nvPr/>
+          </p:nvSpPr>
+          <p:spPr>
+            <a:xfrm>
+              <a:off x="13886736" y="9779160"/>
+              <a:ext cx="89012" cy="89012"/>
+            </a:xfrm>
+            <a:prstGeom prst="ellipse">
+              <a:avLst/>
+            </a:prstGeom>
+            <a:noFill/>
+            <a:ln>
+              <a:noFill/>
+            </a:ln>
+          </p:spPr>
+          <p:style>
+            <a:lnRef idx="2">
+              <a:schemeClr val="accent1">
+                <a:shade val="15000"/>
+              </a:schemeClr>
+            </a:lnRef>
+            <a:fillRef idx="1">
+              <a:schemeClr val="accent1"/>
+            </a:fillRef>
+            <a:effectRef idx="0">
+              <a:schemeClr val="accent1"/>
+            </a:effectRef>
+            <a:fontRef idx="minor">
+              <a:schemeClr val="lt1"/>
+            </a:fontRef>
+          </p:style>
+          <p:txBody>
+            <a:bodyPr rtlCol="0" anchor="ctr"/>
+            <a:lstStyle/>
+            <a:p>
+              <a:pPr algn="ctr"/>
+              <a:endParaRPr lang="en-US"/>
+            </a:p>
+          </p:txBody>
+        </p:sp>
+        <p:cxnSp>
+          <p:nvCxnSpPr>
+            <p:cNvPr id="35" name="Connector: Elbow 34">
+              <a:extLst>
+                <a:ext uri="{FF2B5EF4-FFF2-40B4-BE49-F238E27FC236}">
+                  <a16:creationId xmlns:a16="http://schemas.microsoft.com/office/drawing/2014/main" id="{059F7F98-190E-9EBF-23AE-8257B1653D15}"/>
+                </a:ext>
+              </a:extLst>
+            </p:cNvPr>
+            <p:cNvCxnSpPr>
+              <a:cxnSpLocks/>
+              <a:stCxn id="33" idx="4"/>
+              <a:endCxn id="23" idx="4"/>
+            </p:cNvCxnSpPr>
+            <p:nvPr/>
+          </p:nvCxnSpPr>
+          <p:spPr>
+            <a:xfrm rot="5400000">
+              <a:off x="8637139" y="7747731"/>
+              <a:ext cx="3173663" cy="7414544"/>
+            </a:xfrm>
+            <a:prstGeom prst="bentConnector3">
+              <a:avLst>
+                <a:gd name="adj1" fmla="val 126666"/>
+              </a:avLst>
+            </a:prstGeom>
+            <a:ln w="57150">
               <a:solidFill>
-                <a:srgbClr val="FFFFFF"/>
+                <a:srgbClr val="F68712"/>
               </a:solidFill>
-              <a:latin typeface="Comfortaa"/>
-              <a:ea typeface="Comfortaa"/>
-              <a:cs typeface="Comfortaa"/>
-              <a:sym typeface="Comfortaa"/>
-            </a:endParaRPr>
-          </a:p>
-          <a:p>
-            <a:pPr>
-              <a:lnSpc>
-                <a:spcPct val="115000"/>
-              </a:lnSpc>
-            </a:pPr>
-            <a:r>
-              <a:rPr lang="en" sz="2000" b="1">
+              <a:prstDash val="sysDot"/>
+            </a:ln>
+          </p:spPr>
+          <p:style>
+            <a:lnRef idx="1">
+              <a:schemeClr val="accent1"/>
+            </a:lnRef>
+            <a:fillRef idx="0">
+              <a:schemeClr val="accent1"/>
+            </a:fillRef>
+            <a:effectRef idx="0">
+              <a:schemeClr val="accent1"/>
+            </a:effectRef>
+            <a:fontRef idx="minor">
+              <a:schemeClr val="tx1"/>
+            </a:fontRef>
+          </p:style>
+        </p:cxnSp>
+        <p:cxnSp>
+          <p:nvCxnSpPr>
+            <p:cNvPr id="38" name="Connector: Elbow 37">
+              <a:extLst>
+                <a:ext uri="{FF2B5EF4-FFF2-40B4-BE49-F238E27FC236}">
+                  <a16:creationId xmlns:a16="http://schemas.microsoft.com/office/drawing/2014/main" id="{B116D393-D896-DC98-0A5F-443D2C4E22A2}"/>
+                </a:ext>
+              </a:extLst>
+            </p:cNvPr>
+            <p:cNvCxnSpPr>
+              <a:cxnSpLocks/>
+              <a:stCxn id="27" idx="4"/>
+              <a:endCxn id="24" idx="4"/>
+            </p:cNvCxnSpPr>
+            <p:nvPr/>
+          </p:nvCxnSpPr>
+          <p:spPr>
+            <a:xfrm rot="5400000">
+              <a:off x="8426806" y="7959540"/>
+              <a:ext cx="3296501" cy="6868089"/>
+            </a:xfrm>
+            <a:prstGeom prst="bentConnector3">
+              <a:avLst>
+                <a:gd name="adj1" fmla="val 121447"/>
+              </a:avLst>
+            </a:prstGeom>
+            <a:ln w="57150">
+              <a:solidFill>
+                <a:srgbClr val="F68712"/>
+              </a:solidFill>
+            </a:ln>
+          </p:spPr>
+          <p:style>
+            <a:lnRef idx="1">
+              <a:schemeClr val="accent1"/>
+            </a:lnRef>
+            <a:fillRef idx="0">
+              <a:schemeClr val="accent1"/>
+            </a:fillRef>
+            <a:effectRef idx="0">
+              <a:schemeClr val="accent1"/>
+            </a:effectRef>
+            <a:fontRef idx="minor">
+              <a:schemeClr val="tx1"/>
+            </a:fontRef>
+          </p:style>
+        </p:cxnSp>
+        <p:cxnSp>
+          <p:nvCxnSpPr>
+            <p:cNvPr id="50" name="Connector: Elbow 49">
+              <a:extLst>
+                <a:ext uri="{FF2B5EF4-FFF2-40B4-BE49-F238E27FC236}">
+                  <a16:creationId xmlns:a16="http://schemas.microsoft.com/office/drawing/2014/main" id="{16F16696-2434-C718-176A-1232D81F7A32}"/>
+                </a:ext>
+              </a:extLst>
+            </p:cNvPr>
+            <p:cNvCxnSpPr>
+              <a:cxnSpLocks/>
+              <a:stCxn id="32" idx="4"/>
+              <a:endCxn id="25" idx="4"/>
+            </p:cNvCxnSpPr>
+            <p:nvPr/>
+          </p:nvCxnSpPr>
+          <p:spPr>
+            <a:xfrm rot="5400000">
+              <a:off x="8711049" y="8018626"/>
+              <a:ext cx="3235200" cy="6811218"/>
+            </a:xfrm>
+            <a:prstGeom prst="bentConnector3">
+              <a:avLst>
+                <a:gd name="adj1" fmla="val 118110"/>
+              </a:avLst>
+            </a:prstGeom>
+            <a:ln w="57150">
+              <a:solidFill>
+                <a:schemeClr val="accent1">
+                  <a:lumMod val="75000"/>
+                </a:schemeClr>
+              </a:solidFill>
+            </a:ln>
+          </p:spPr>
+          <p:style>
+            <a:lnRef idx="1">
+              <a:schemeClr val="accent1"/>
+            </a:lnRef>
+            <a:fillRef idx="0">
+              <a:schemeClr val="accent1"/>
+            </a:fillRef>
+            <a:effectRef idx="0">
+              <a:schemeClr val="accent1"/>
+            </a:effectRef>
+            <a:fontRef idx="minor">
+              <a:schemeClr val="tx1"/>
+            </a:fontRef>
+          </p:style>
+        </p:cxnSp>
+        <p:cxnSp>
+          <p:nvCxnSpPr>
+            <p:cNvPr id="54" name="Connector: Elbow 53">
+              <a:extLst>
+                <a:ext uri="{FF2B5EF4-FFF2-40B4-BE49-F238E27FC236}">
+                  <a16:creationId xmlns:a16="http://schemas.microsoft.com/office/drawing/2014/main" id="{B12D968F-3141-840B-4609-B18FE5096DE8}"/>
+                </a:ext>
+              </a:extLst>
+            </p:cNvPr>
+            <p:cNvCxnSpPr>
+              <a:cxnSpLocks/>
+              <a:stCxn id="31" idx="4"/>
+              <a:endCxn id="26" idx="4"/>
+            </p:cNvCxnSpPr>
+            <p:nvPr/>
+          </p:nvCxnSpPr>
+          <p:spPr>
+            <a:xfrm rot="5400000">
+              <a:off x="8367268" y="8313453"/>
+              <a:ext cx="3406693" cy="6050071"/>
+            </a:xfrm>
+            <a:prstGeom prst="bentConnector3">
+              <a:avLst>
+                <a:gd name="adj1" fmla="val 113287"/>
+              </a:avLst>
+            </a:prstGeom>
+            <a:ln w="57150">
+              <a:solidFill>
+                <a:schemeClr val="accent1">
+                  <a:lumMod val="75000"/>
+                </a:schemeClr>
+              </a:solidFill>
+              <a:prstDash val="sysDot"/>
+            </a:ln>
+          </p:spPr>
+          <p:style>
+            <a:lnRef idx="1">
+              <a:schemeClr val="accent1"/>
+            </a:lnRef>
+            <a:fillRef idx="0">
+              <a:schemeClr val="accent1"/>
+            </a:fillRef>
+            <a:effectRef idx="0">
+              <a:schemeClr val="accent1"/>
+            </a:effectRef>
+            <a:fontRef idx="minor">
+              <a:schemeClr val="tx1"/>
+            </a:fontRef>
+          </p:style>
+        </p:cxnSp>
+        <p:sp>
+          <p:nvSpPr>
+            <p:cNvPr id="14" name="Oval 13">
+              <a:extLst>
+                <a:ext uri="{FF2B5EF4-FFF2-40B4-BE49-F238E27FC236}">
+                  <a16:creationId xmlns:a16="http://schemas.microsoft.com/office/drawing/2014/main" id="{69114BFC-EBDB-4C3F-5B9B-7C78E088B297}"/>
+                </a:ext>
+              </a:extLst>
+            </p:cNvPr>
+            <p:cNvSpPr/>
+            <p:nvPr/>
+          </p:nvSpPr>
+          <p:spPr>
+            <a:xfrm>
+              <a:off x="13566754" y="10795578"/>
+              <a:ext cx="271211" cy="271211"/>
+            </a:xfrm>
+            <a:prstGeom prst="ellipse">
+              <a:avLst/>
+            </a:prstGeom>
+            <a:solidFill>
+              <a:schemeClr val="bg1"/>
+            </a:solidFill>
+            <a:ln>
+              <a:solidFill>
+                <a:schemeClr val="bg1"/>
+              </a:solidFill>
+            </a:ln>
+          </p:spPr>
+          <p:style>
+            <a:lnRef idx="2">
+              <a:schemeClr val="accent1">
+                <a:shade val="15000"/>
+              </a:schemeClr>
+            </a:lnRef>
+            <a:fillRef idx="1">
+              <a:schemeClr val="accent1"/>
+            </a:fillRef>
+            <a:effectRef idx="0">
+              <a:schemeClr val="accent1"/>
+            </a:effectRef>
+            <a:fontRef idx="minor">
+              <a:schemeClr val="lt1"/>
+            </a:fontRef>
+          </p:style>
+          <p:txBody>
+            <a:bodyPr rtlCol="0" anchor="ctr"/>
+            <a:lstStyle/>
+            <a:p>
+              <a:pPr algn="ctr"/>
+              <a:r>
+                <a:rPr lang="pt-PT" sz="2400" dirty="0">
+                  <a:solidFill>
+                    <a:schemeClr val="tx1"/>
+                  </a:solidFill>
+                </a:rPr>
+                <a:t>+</a:t>
+              </a:r>
+              <a:endParaRPr lang="en-US" sz="2400" dirty="0">
                 <a:solidFill>
-                  <a:srgbClr val="FFFFFF"/>
+                  <a:schemeClr val="tx1"/>
                 </a:solidFill>
-                <a:latin typeface="Comfortaa"/>
-                <a:ea typeface="Comfortaa"/>
-                <a:cs typeface="Comfortaa"/>
-                <a:sym typeface="Comfortaa"/>
-              </a:rPr>
-              <a:t>Digital inputs</a:t>
-            </a:r>
-            <a:endParaRPr sz="2000" b="1">
+              </a:endParaRPr>
+            </a:p>
+          </p:txBody>
+        </p:sp>
+        <p:sp>
+          <p:nvSpPr>
+            <p:cNvPr id="16" name="Oval 15">
+              <a:extLst>
+                <a:ext uri="{FF2B5EF4-FFF2-40B4-BE49-F238E27FC236}">
+                  <a16:creationId xmlns:a16="http://schemas.microsoft.com/office/drawing/2014/main" id="{EE23870B-1A66-2829-C506-61266633708D}"/>
+                </a:ext>
+              </a:extLst>
+            </p:cNvPr>
+            <p:cNvSpPr/>
+            <p:nvPr/>
+          </p:nvSpPr>
+          <p:spPr>
+            <a:xfrm>
+              <a:off x="12983869" y="10149187"/>
+              <a:ext cx="234320" cy="234320"/>
+            </a:xfrm>
+            <a:prstGeom prst="ellipse">
+              <a:avLst/>
+            </a:prstGeom>
+            <a:solidFill>
+              <a:schemeClr val="bg1"/>
+            </a:solidFill>
+            <a:ln>
               <a:solidFill>
-                <a:srgbClr val="FFFFFF"/>
+                <a:schemeClr val="bg1"/>
               </a:solidFill>
-              <a:latin typeface="Comfortaa"/>
-              <a:ea typeface="Comfortaa"/>
-              <a:cs typeface="Comfortaa"/>
-              <a:sym typeface="Comfortaa"/>
-            </a:endParaRPr>
-          </a:p>
-          <a:p>
-            <a:pPr>
-              <a:lnSpc>
-                <a:spcPct val="115000"/>
-              </a:lnSpc>
-            </a:pPr>
-            <a:endParaRPr sz="2000">
+            </a:ln>
+          </p:spPr>
+          <p:style>
+            <a:lnRef idx="2">
+              <a:schemeClr val="accent1">
+                <a:shade val="15000"/>
+              </a:schemeClr>
+            </a:lnRef>
+            <a:fillRef idx="1">
+              <a:schemeClr val="accent1"/>
+            </a:fillRef>
+            <a:effectRef idx="0">
+              <a:schemeClr val="accent1"/>
+            </a:effectRef>
+            <a:fontRef idx="minor">
+              <a:schemeClr val="lt1"/>
+            </a:fontRef>
+          </p:style>
+          <p:txBody>
+            <a:bodyPr rtlCol="0" anchor="ctr"/>
+            <a:lstStyle/>
+            <a:p>
+              <a:pPr algn="ctr"/>
+              <a:r>
+                <a:rPr lang="pt-PT" sz="2400" dirty="0">
+                  <a:solidFill>
+                    <a:schemeClr val="tx1"/>
+                  </a:solidFill>
+                </a:rPr>
+                <a:t>-</a:t>
+              </a:r>
+              <a:endParaRPr lang="en-US" sz="2400" dirty="0">
+                <a:solidFill>
+                  <a:schemeClr val="tx1"/>
+                </a:solidFill>
+              </a:endParaRPr>
+            </a:p>
+          </p:txBody>
+        </p:sp>
+        <p:sp>
+          <p:nvSpPr>
+            <p:cNvPr id="17" name="Oval 16">
+              <a:extLst>
+                <a:ext uri="{FF2B5EF4-FFF2-40B4-BE49-F238E27FC236}">
+                  <a16:creationId xmlns:a16="http://schemas.microsoft.com/office/drawing/2014/main" id="{94E78E6C-ED35-4CCD-B545-1A0DE5025702}"/>
+                </a:ext>
+              </a:extLst>
+            </p:cNvPr>
+            <p:cNvSpPr/>
+            <p:nvPr/>
+          </p:nvSpPr>
+          <p:spPr>
+            <a:xfrm>
+              <a:off x="13387926" y="10507095"/>
+              <a:ext cx="257715" cy="257715"/>
+            </a:xfrm>
+            <a:prstGeom prst="ellipse">
+              <a:avLst/>
+            </a:prstGeom>
+            <a:solidFill>
+              <a:schemeClr val="bg1"/>
+            </a:solidFill>
+            <a:ln>
               <a:solidFill>
-                <a:srgbClr val="FFFFFF"/>
+                <a:schemeClr val="bg1"/>
               </a:solidFill>
-              <a:latin typeface="Comfortaa"/>
-              <a:ea typeface="Comfortaa"/>
-              <a:cs typeface="Comfortaa"/>
-              <a:sym typeface="Comfortaa"/>
-            </a:endParaRPr>
-          </a:p>
-        </p:txBody>
-      </p:sp>
-      <p:pic>
-        <p:nvPicPr>
-          <p:cNvPr id="222" name="Google Shape;222;p26"/>
-          <p:cNvPicPr preferRelativeResize="0"/>
-          <p:nvPr/>
-        </p:nvPicPr>
-        <p:blipFill>
-          <a:blip r:embed="rId3">
-            <a:alphaModFix/>
-          </a:blip>
-          <a:stretch>
-            <a:fillRect/>
-          </a:stretch>
-        </p:blipFill>
-        <p:spPr>
-          <a:xfrm>
-            <a:off x="6170237" y="5093987"/>
-            <a:ext cx="860400" cy="860400"/>
-          </a:xfrm>
-          <a:prstGeom prst="rect">
-            <a:avLst/>
-          </a:prstGeom>
-          <a:noFill/>
-          <a:ln>
+            </a:ln>
+          </p:spPr>
+          <p:style>
+            <a:lnRef idx="2">
+              <a:schemeClr val="accent1">
+                <a:shade val="15000"/>
+              </a:schemeClr>
+            </a:lnRef>
+            <a:fillRef idx="1">
+              <a:schemeClr val="accent1"/>
+            </a:fillRef>
+            <a:effectRef idx="0">
+              <a:schemeClr val="accent1"/>
+            </a:effectRef>
+            <a:fontRef idx="minor">
+              <a:schemeClr val="lt1"/>
+            </a:fontRef>
+          </p:style>
+          <p:txBody>
+            <a:bodyPr rtlCol="0" anchor="ctr"/>
+            <a:lstStyle/>
+            <a:p>
+              <a:pPr algn="ctr"/>
+              <a:r>
+                <a:rPr lang="pt-PT" sz="2000" dirty="0">
+                  <a:solidFill>
+                    <a:schemeClr val="tx1"/>
+                  </a:solidFill>
+                </a:rPr>
+                <a:t>B</a:t>
+              </a:r>
+              <a:endParaRPr lang="en-US" sz="2000" dirty="0">
+                <a:solidFill>
+                  <a:schemeClr val="tx1"/>
+                </a:solidFill>
+              </a:endParaRPr>
+            </a:p>
+          </p:txBody>
+        </p:sp>
+        <p:sp>
+          <p:nvSpPr>
+            <p:cNvPr id="18" name="Oval 17">
+              <a:extLst>
+                <a:ext uri="{FF2B5EF4-FFF2-40B4-BE49-F238E27FC236}">
+                  <a16:creationId xmlns:a16="http://schemas.microsoft.com/office/drawing/2014/main" id="{207428FE-B1D9-5404-DCD5-FB6F33FA36B9}"/>
+                </a:ext>
+              </a:extLst>
+            </p:cNvPr>
+            <p:cNvSpPr/>
+            <p:nvPr/>
+          </p:nvSpPr>
+          <p:spPr>
+            <a:xfrm>
+              <a:off x="13791129" y="11054020"/>
+              <a:ext cx="271211" cy="271211"/>
+            </a:xfrm>
+            <a:prstGeom prst="ellipse">
+              <a:avLst/>
+            </a:prstGeom>
+            <a:solidFill>
+              <a:schemeClr val="bg1"/>
+            </a:solidFill>
+            <a:ln>
+              <a:solidFill>
+                <a:schemeClr val="bg1"/>
+              </a:solidFill>
+            </a:ln>
+          </p:spPr>
+          <p:style>
+            <a:lnRef idx="2">
+              <a:schemeClr val="accent1">
+                <a:shade val="15000"/>
+              </a:schemeClr>
+            </a:lnRef>
+            <a:fillRef idx="1">
+              <a:schemeClr val="accent1"/>
+            </a:fillRef>
+            <a:effectRef idx="0">
+              <a:schemeClr val="accent1"/>
+            </a:effectRef>
+            <a:fontRef idx="minor">
+              <a:schemeClr val="lt1"/>
+            </a:fontRef>
+          </p:style>
+          <p:txBody>
+            <a:bodyPr rtlCol="0" anchor="ctr"/>
+            <a:lstStyle/>
+            <a:p>
+              <a:pPr algn="ctr"/>
+              <a:r>
+                <a:rPr lang="pt-PT" sz="2000" dirty="0">
+                  <a:solidFill>
+                    <a:schemeClr val="tx1"/>
+                  </a:solidFill>
+                </a:rPr>
+                <a:t>A</a:t>
+              </a:r>
+              <a:endParaRPr lang="en-US" sz="2000" dirty="0">
+                <a:solidFill>
+                  <a:schemeClr val="tx1"/>
+                </a:solidFill>
+              </a:endParaRPr>
+            </a:p>
+          </p:txBody>
+        </p:sp>
+        <p:sp>
+          <p:nvSpPr>
+            <p:cNvPr id="6" name="Google Shape;228;p26">
+              <a:extLst>
+                <a:ext uri="{FF2B5EF4-FFF2-40B4-BE49-F238E27FC236}">
+                  <a16:creationId xmlns:a16="http://schemas.microsoft.com/office/drawing/2014/main" id="{F094411B-B967-268C-6A43-E41A3C532821}"/>
+                </a:ext>
+              </a:extLst>
+            </p:cNvPr>
+            <p:cNvSpPr/>
+            <p:nvPr/>
+          </p:nvSpPr>
+          <p:spPr>
+            <a:xfrm>
+              <a:off x="6053533" y="7794320"/>
+              <a:ext cx="1880261" cy="2712776"/>
+            </a:xfrm>
+            <a:prstGeom prst="rect">
+              <a:avLst/>
+            </a:prstGeom>
             <a:noFill/>
-          </a:ln>
-        </p:spPr>
-      </p:pic>
-      <p:pic>
-        <p:nvPicPr>
-          <p:cNvPr id="223" name="Google Shape;223;p26"/>
-          <p:cNvPicPr preferRelativeResize="0"/>
-          <p:nvPr/>
-        </p:nvPicPr>
-        <p:blipFill>
-          <a:blip r:embed="rId4">
-            <a:alphaModFix/>
-          </a:blip>
-          <a:stretch>
-            <a:fillRect/>
-          </a:stretch>
-        </p:blipFill>
-        <p:spPr>
-          <a:xfrm>
-            <a:off x="13638714" y="5214227"/>
-            <a:ext cx="1357225" cy="619925"/>
-          </a:xfrm>
-          <a:prstGeom prst="rect">
-            <a:avLst/>
-          </a:prstGeom>
-          <a:noFill/>
-          <a:ln>
-            <a:noFill/>
-          </a:ln>
-        </p:spPr>
-      </p:pic>
-      <p:pic>
-        <p:nvPicPr>
-          <p:cNvPr id="224" name="Google Shape;224;p26"/>
-          <p:cNvPicPr preferRelativeResize="0"/>
-          <p:nvPr/>
-        </p:nvPicPr>
-        <p:blipFill>
-          <a:blip r:embed="rId5">
-            <a:alphaModFix/>
-          </a:blip>
-          <a:stretch>
-            <a:fillRect/>
-          </a:stretch>
-        </p:blipFill>
-        <p:spPr>
-          <a:xfrm>
-            <a:off x="9396664" y="6418162"/>
-            <a:ext cx="2551871" cy="2350402"/>
-          </a:xfrm>
-          <a:prstGeom prst="rect">
-            <a:avLst/>
-          </a:prstGeom>
-          <a:noFill/>
-          <a:ln>
-            <a:noFill/>
-          </a:ln>
-        </p:spPr>
-      </p:pic>
-      <p:pic>
-        <p:nvPicPr>
-          <p:cNvPr id="225" name="Google Shape;225;p26"/>
-          <p:cNvPicPr preferRelativeResize="0"/>
-          <p:nvPr/>
-        </p:nvPicPr>
-        <p:blipFill>
-          <a:blip r:embed="rId6">
-            <a:alphaModFix/>
-          </a:blip>
-          <a:stretch>
-            <a:fillRect/>
-          </a:stretch>
-        </p:blipFill>
-        <p:spPr>
-          <a:xfrm>
-            <a:off x="12557265" y="6191935"/>
-            <a:ext cx="1357225" cy="1327330"/>
-          </a:xfrm>
-          <a:prstGeom prst="rect">
-            <a:avLst/>
-          </a:prstGeom>
-          <a:noFill/>
-          <a:ln>
-            <a:noFill/>
-          </a:ln>
-        </p:spPr>
-      </p:pic>
-      <p:sp>
-        <p:nvSpPr>
-          <p:cNvPr id="226" name="Google Shape;226;p26"/>
-          <p:cNvSpPr/>
-          <p:nvPr/>
-        </p:nvSpPr>
-        <p:spPr>
-          <a:xfrm>
-            <a:off x="11433689" y="7124862"/>
-            <a:ext cx="2205025" cy="1724850"/>
-          </a:xfrm>
-          <a:custGeom>
-            <a:avLst/>
-            <a:gdLst/>
-            <a:ahLst/>
-            <a:cxnLst/>
-            <a:rect l="l" t="t" r="r" b="b"/>
-            <a:pathLst>
-              <a:path w="130219" h="68994" extrusionOk="0">
-                <a:moveTo>
-                  <a:pt x="0" y="61681"/>
-                </a:moveTo>
-                <a:lnTo>
-                  <a:pt x="0" y="68994"/>
-                </a:lnTo>
-                <a:lnTo>
-                  <a:pt x="130219" y="68994"/>
-                </a:lnTo>
-                <a:lnTo>
-                  <a:pt x="129245" y="0"/>
-                </a:lnTo>
-              </a:path>
-            </a:pathLst>
-          </a:custGeom>
-          <a:noFill/>
-          <a:ln w="28575" cap="flat" cmpd="sng">
-            <a:solidFill>
-              <a:srgbClr val="FF0000"/>
-            </a:solidFill>
-            <a:prstDash val="solid"/>
-            <a:round/>
-            <a:headEnd type="none" w="med" len="med"/>
-            <a:tailEnd type="none" w="med" len="med"/>
-          </a:ln>
-        </p:spPr>
-      </p:sp>
-      <p:sp>
-        <p:nvSpPr>
-          <p:cNvPr id="227" name="Google Shape;227;p26"/>
-          <p:cNvSpPr/>
-          <p:nvPr/>
-        </p:nvSpPr>
-        <p:spPr>
-          <a:xfrm>
-            <a:off x="11700113" y="7051737"/>
-            <a:ext cx="1162455" cy="602546"/>
-          </a:xfrm>
-          <a:custGeom>
-            <a:avLst/>
-            <a:gdLst/>
-            <a:ahLst/>
-            <a:cxnLst/>
-            <a:rect l="l" t="t" r="r" b="b"/>
-            <a:pathLst>
-              <a:path w="89461" h="24620" extrusionOk="0">
-                <a:moveTo>
-                  <a:pt x="32" y="24620"/>
-                </a:moveTo>
-                <a:lnTo>
-                  <a:pt x="0" y="24542"/>
-                </a:lnTo>
-                <a:lnTo>
-                  <a:pt x="89461" y="24542"/>
-                </a:lnTo>
-                <a:lnTo>
-                  <a:pt x="89024" y="0"/>
-                </a:lnTo>
-              </a:path>
-            </a:pathLst>
-          </a:custGeom>
-          <a:noFill/>
-          <a:ln w="28575" cap="flat" cmpd="sng">
-            <a:solidFill>
-              <a:srgbClr val="FFC000"/>
-            </a:solidFill>
-            <a:prstDash val="solid"/>
-            <a:round/>
-            <a:headEnd type="none" w="med" len="med"/>
-            <a:tailEnd type="none" w="med" len="med"/>
-          </a:ln>
-        </p:spPr>
-      </p:sp>
-      <p:sp>
-        <p:nvSpPr>
-          <p:cNvPr id="228" name="Google Shape;228;p26"/>
-          <p:cNvSpPr/>
-          <p:nvPr/>
-        </p:nvSpPr>
-        <p:spPr>
-          <a:xfrm>
-            <a:off x="11300425" y="7555612"/>
-            <a:ext cx="467100" cy="181200"/>
-          </a:xfrm>
-          <a:prstGeom prst="rect">
-            <a:avLst/>
-          </a:prstGeom>
-          <a:noFill/>
-          <a:ln w="28575" cap="flat" cmpd="sng">
-            <a:solidFill>
-              <a:srgbClr val="DAC000"/>
-            </a:solidFill>
-            <a:prstDash val="solid"/>
-            <a:round/>
-            <a:headEnd type="none" w="sm" len="sm"/>
-            <a:tailEnd type="none" w="sm" len="sm"/>
-          </a:ln>
-        </p:spPr>
-        <p:txBody>
-          <a:bodyPr spcFirstLastPara="1" wrap="square" lIns="91425" tIns="91425" rIns="91425" bIns="91425" anchor="ctr" anchorCtr="0">
-            <a:noAutofit/>
-          </a:bodyPr>
-          <a:lstStyle/>
-          <a:p>
-            <a:pPr algn="ctr"/>
-            <a:endParaRPr>
+            <a:ln w="57150" cap="flat" cmpd="sng">
               <a:solidFill>
                 <a:srgbClr val="DAC000"/>
               </a:solidFill>
-            </a:endParaRPr>
-          </a:p>
-        </p:txBody>
-      </p:sp>
-      <p:sp>
-        <p:nvSpPr>
-          <p:cNvPr id="229" name="Google Shape;229;p26"/>
-          <p:cNvSpPr txBox="1"/>
-          <p:nvPr/>
-        </p:nvSpPr>
-        <p:spPr>
-          <a:xfrm>
-            <a:off x="11615837" y="7681887"/>
-            <a:ext cx="572700" cy="369300"/>
-          </a:xfrm>
-          <a:prstGeom prst="rect">
-            <a:avLst/>
-          </a:prstGeom>
-          <a:noFill/>
-          <a:ln>
-            <a:noFill/>
-          </a:ln>
-        </p:spPr>
-        <p:txBody>
-          <a:bodyPr spcFirstLastPara="1" wrap="square" lIns="91425" tIns="91425" rIns="91425" bIns="91425" anchor="t" anchorCtr="0">
-            <a:spAutoFit/>
-          </a:bodyPr>
-          <a:lstStyle/>
-          <a:p>
-            <a:pPr algn="ctr"/>
-            <a:r>
-              <a:rPr lang="en" sz="1200" b="1" dirty="0">
+              <a:prstDash val="solid"/>
+              <a:round/>
+              <a:headEnd type="none" w="sm" len="sm"/>
+              <a:tailEnd type="none" w="sm" len="sm"/>
+            </a:ln>
+          </p:spPr>
+          <p:txBody>
+            <a:bodyPr spcFirstLastPara="1" wrap="square" lIns="91425" tIns="91425" rIns="91425" bIns="91425" anchor="ctr" anchorCtr="0">
+              <a:noAutofit/>
+            </a:bodyPr>
+            <a:lstStyle/>
+            <a:p>
+              <a:pPr algn="ctr"/>
+              <a:endParaRPr dirty="0">
                 <a:solidFill>
-                  <a:srgbClr val="C27BA0"/>
+                  <a:srgbClr val="DAC000"/>
                 </a:solidFill>
-                <a:latin typeface="Comfortaa"/>
-                <a:ea typeface="Comfortaa"/>
-                <a:cs typeface="Comfortaa"/>
-                <a:sym typeface="Comfortaa"/>
-              </a:rPr>
-              <a:t>DI3 </a:t>
-            </a:r>
-            <a:endParaRPr sz="1200" b="1" dirty="0">
-              <a:solidFill>
-                <a:srgbClr val="C27BA0"/>
-              </a:solidFill>
-              <a:latin typeface="Comfortaa"/>
-              <a:ea typeface="Comfortaa"/>
-              <a:cs typeface="Comfortaa"/>
-              <a:sym typeface="Comfortaa"/>
-            </a:endParaRPr>
-          </a:p>
-        </p:txBody>
-      </p:sp>
+              </a:endParaRPr>
+            </a:p>
+          </p:txBody>
+        </p:sp>
+      </p:grpSp>
     </p:spTree>
     <p:extLst>
       <p:ext uri="{BB962C8B-B14F-4D97-AF65-F5344CB8AC3E}">
-        <p14:creationId xmlns:p14="http://schemas.microsoft.com/office/powerpoint/2010/main" val="759428788"/>
+        <p14:creationId xmlns:p14="http://schemas.microsoft.com/office/powerpoint/2010/main" val="1123644722"/>
       </p:ext>
     </p:extLst>
   </p:cSld>

</xml_diff>